<commit_message>
Changed Production Incident Trend to Production Incident Count
</commit_message>
<xml_diff>
--- a/Measuring Outcome v2 - 2020 update.pptx
+++ b/Measuring Outcome v2 - 2020 update.pptx
@@ -210,7 +210,7 @@
 
 <file path=ppt/commentAuthors.xml><?xml version="1.0" encoding="utf-8"?>
 <p:cmAuthorLst xmlns:a="http://schemas.openxmlformats.org/drawingml/2006/main" xmlns:r="http://schemas.openxmlformats.org/officeDocument/2006/relationships" xmlns:p="http://schemas.openxmlformats.org/presentationml/2006/main">
-  <p:cmAuthor id="1" name="Sjoerd Kranendonk" initials="SK" lastIdx="4" clrIdx="0">
+  <p:cmAuthor id="1" name="Sjoerd Kranendonk" initials="SK" lastIdx="5" clrIdx="0">
     <p:extLst>
       <p:ext uri="{19B8F6BF-5375-455C-9EA6-DF929625EA0E}">
         <p15:presenceInfo xmlns:p15="http://schemas.microsoft.com/office/powerpoint/2012/main" userId="acef0a9426a7f6dc" providerId="Windows Live"/>
@@ -242,6 +242,17 @@
     <p:extLst>
       <p:ext uri="{C676402C-5697-4E1C-873F-D02D1690AC5C}">
         <p15:threadingInfo xmlns:p15="http://schemas.microsoft.com/office/powerpoint/2012/main" timeZoneBias="-60"/>
+      </p:ext>
+    </p:extLst>
+  </p:cm>
+  <p:cm authorId="1" dt="2021-01-03T21:02:07.781" idx="5">
+    <p:pos x="10" y="146"/>
+    <p:text>changed trend to count</p:text>
+    <p:extLst>
+      <p:ext uri="{C676402C-5697-4E1C-873F-D02D1690AC5C}">
+        <p15:threadingInfo xmlns:p15="http://schemas.microsoft.com/office/powerpoint/2012/main" timeZoneBias="-60">
+          <p15:parentCm authorId="1" idx="3"/>
+        </p15:threadingInfo>
       </p:ext>
     </p:extLst>
   </p:cm>
@@ -8213,7 +8224,7 @@
                   </a:solidFill>
                   <a:latin typeface="Ubuntu" panose="020B0504030602030204" pitchFamily="34" charset="0"/>
                 </a:rPr>
-                <a:t>Production Incident Trends</a:t>
+                <a:t>Production Incident Count</a:t>
               </a:r>
             </a:p>
           </p:txBody>

</xml_diff>

<commit_message>
Split up "active Branches/time Spent merging" into two new cards with slight rewording
</commit_message>
<xml_diff>
--- a/Measuring Outcome v2 - 2020 update.pptx
+++ b/Measuring Outcome v2 - 2020 update.pptx
@@ -5,7 +5,7 @@
     <p:sldMasterId id="2147483660" r:id="rId1"/>
   </p:sldMasterIdLst>
   <p:notesMasterIdLst>
-    <p:notesMasterId r:id="rId66"/>
+    <p:notesMasterId r:id="rId68"/>
   </p:notesMasterIdLst>
   <p:sldIdLst>
     <p:sldId id="256" r:id="rId2"/>
@@ -60,49 +60,51 @@
     <p:sldId id="353" r:id="rId51"/>
     <p:sldId id="354" r:id="rId52"/>
     <p:sldId id="355" r:id="rId53"/>
-    <p:sldId id="345" r:id="rId54"/>
-    <p:sldId id="346" r:id="rId55"/>
-    <p:sldId id="347" r:id="rId56"/>
-    <p:sldId id="348" r:id="rId57"/>
-    <p:sldId id="328" r:id="rId58"/>
-    <p:sldId id="329" r:id="rId59"/>
-    <p:sldId id="334" r:id="rId60"/>
-    <p:sldId id="331" r:id="rId61"/>
-    <p:sldId id="335" r:id="rId62"/>
-    <p:sldId id="333" r:id="rId63"/>
-    <p:sldId id="356" r:id="rId64"/>
-    <p:sldId id="351" r:id="rId65"/>
+    <p:sldId id="357" r:id="rId54"/>
+    <p:sldId id="358" r:id="rId55"/>
+    <p:sldId id="345" r:id="rId56"/>
+    <p:sldId id="346" r:id="rId57"/>
+    <p:sldId id="347" r:id="rId58"/>
+    <p:sldId id="348" r:id="rId59"/>
+    <p:sldId id="328" r:id="rId60"/>
+    <p:sldId id="329" r:id="rId61"/>
+    <p:sldId id="334" r:id="rId62"/>
+    <p:sldId id="331" r:id="rId63"/>
+    <p:sldId id="335" r:id="rId64"/>
+    <p:sldId id="333" r:id="rId65"/>
+    <p:sldId id="356" r:id="rId66"/>
+    <p:sldId id="351" r:id="rId67"/>
   </p:sldIdLst>
   <p:sldSz cx="7559675" cy="5327650"/>
   <p:notesSz cx="6858000" cy="9144000"/>
   <p:embeddedFontLst>
     <p:embeddedFont>
       <p:font typeface="Calibri" panose="020F0502020204030204" pitchFamily="34" charset="0"/>
-      <p:regular r:id="rId67"/>
-      <p:bold r:id="rId67"/>
-      <p:italic r:id="rId67"/>
-      <p:boldItalic r:id="rId67"/>
+      <p:regular r:id="rId69"/>
+      <p:bold r:id="rId69"/>
+      <p:italic r:id="rId69"/>
+      <p:boldItalic r:id="rId69"/>
     </p:embeddedFont>
     <p:embeddedFont>
       <p:font typeface="Calibri Light" panose="020F0302020204030204" pitchFamily="34" charset="0"/>
-      <p:regular r:id="rId67"/>
-      <p:italic r:id="rId67"/>
+      <p:regular r:id="rId69"/>
+      <p:italic r:id="rId69"/>
     </p:embeddedFont>
     <p:embeddedFont>
       <p:font typeface="Marvel" pitchFamily="2" charset="0"/>
-      <p:regular r:id="rId67"/>
+      <p:regular r:id="rId69"/>
     </p:embeddedFont>
     <p:embeddedFont>
       <p:font typeface="Ubuntu" panose="020B0504030602030204" pitchFamily="34" charset="0"/>
-      <p:regular r:id="rId67"/>
-      <p:bold r:id="rId67"/>
-      <p:italic r:id="rId67"/>
-      <p:boldItalic r:id="rId67"/>
+      <p:regular r:id="rId69"/>
+      <p:bold r:id="rId69"/>
+      <p:italic r:id="rId69"/>
+      <p:boldItalic r:id="rId69"/>
     </p:embeddedFont>
     <p:embeddedFont>
       <p:font typeface="Ubuntu Light" panose="020B0304030602030204" pitchFamily="34" charset="0"/>
-      <p:regular r:id="rId67"/>
-      <p:italic r:id="rId67"/>
+      <p:regular r:id="rId69"/>
+      <p:italic r:id="rId69"/>
     </p:embeddedFont>
   </p:embeddedFontLst>
   <p:defaultTextStyle>
@@ -210,7 +212,7 @@
 
 <file path=ppt/commentAuthors.xml><?xml version="1.0" encoding="utf-8"?>
 <p:cmAuthorLst xmlns:a="http://schemas.openxmlformats.org/drawingml/2006/main" xmlns:r="http://schemas.openxmlformats.org/officeDocument/2006/relationships" xmlns:p="http://schemas.openxmlformats.org/presentationml/2006/main">
-  <p:cmAuthor id="1" name="Sjoerd Kranendonk" initials="SK" lastIdx="5" clrIdx="0">
+  <p:cmAuthor id="1" name="Sjoerd Kranendonk" initials="SK" lastIdx="7" clrIdx="0">
     <p:extLst>
       <p:ext uri="{19B8F6BF-5375-455C-9EA6-DF929625EA0E}">
         <p15:presenceInfo xmlns:p15="http://schemas.microsoft.com/office/powerpoint/2012/main" userId="acef0a9426a7f6dc" providerId="Windows Live"/>
@@ -281,6 +283,42 @@
     <p:extLst>
       <p:ext uri="{C676402C-5697-4E1C-873F-D02D1690AC5C}">
         <p15:threadingInfo xmlns:p15="http://schemas.microsoft.com/office/powerpoint/2012/main" timeZoneBias="-60"/>
+      </p:ext>
+    </p:extLst>
+  </p:cm>
+  <p:cm authorId="1" dt="2021-01-03T21:03:57.328" idx="7">
+    <p:pos x="10" y="146"/>
+    <p:text>split and reworded</p:text>
+    <p:extLst>
+      <p:ext uri="{C676402C-5697-4E1C-873F-D02D1690AC5C}">
+        <p15:threadingInfo xmlns:p15="http://schemas.microsoft.com/office/powerpoint/2012/main" timeZoneBias="-60">
+          <p15:parentCm authorId="1" idx="4"/>
+        </p15:threadingInfo>
+      </p:ext>
+    </p:extLst>
+  </p:cm>
+</p:cmLst>
+</file>
+
+<file path=ppt/comments/comment5.xml><?xml version="1.0" encoding="utf-8"?>
+<p:cmLst xmlns:a="http://schemas.openxmlformats.org/drawingml/2006/main" xmlns:r="http://schemas.openxmlformats.org/officeDocument/2006/relationships" xmlns:p="http://schemas.openxmlformats.org/presentationml/2006/main">
+  <p:cm authorId="1" dt="2021-01-03T20:59:01.215" idx="4">
+    <p:pos x="10" y="10"/>
+    <p:text>To be changed for 2020 update</p:text>
+    <p:extLst>
+      <p:ext uri="{C676402C-5697-4E1C-873F-D02D1690AC5C}">
+        <p15:threadingInfo xmlns:p15="http://schemas.microsoft.com/office/powerpoint/2012/main" timeZoneBias="-60"/>
+      </p:ext>
+    </p:extLst>
+  </p:cm>
+  <p:cm authorId="1" dt="2021-01-03T21:03:48.450" idx="6">
+    <p:pos x="10" y="146"/>
+    <p:text>Split and reworded</p:text>
+    <p:extLst>
+      <p:ext uri="{C676402C-5697-4E1C-873F-D02D1690AC5C}">
+        <p15:threadingInfo xmlns:p15="http://schemas.microsoft.com/office/powerpoint/2012/main" timeZoneBias="-60">
+          <p15:parentCm authorId="1" idx="4"/>
+        </p15:threadingInfo>
       </p:ext>
     </p:extLst>
   </p:cm>
@@ -981,7 +1019,7 @@
           <a:p>
             <a:fld id="{240114D0-54EC-2541-891C-414F49E4331F}" type="slidenum">
               <a:rPr lang="en-NL" smtClean="0"/>
-              <a:t>63</a:t>
+              <a:t>65</a:t>
             </a:fld>
             <a:endParaRPr lang="en-NL"/>
           </a:p>
@@ -17260,10 +17298,10 @@
         </p:nvGrpSpPr>
         <p:grpSpPr>
           <a:xfrm>
-            <a:off x="883471" y="825139"/>
-            <a:ext cx="5792732" cy="3677371"/>
-            <a:chOff x="883471" y="673017"/>
-            <a:chExt cx="5792732" cy="3677371"/>
+            <a:off x="883471" y="1598021"/>
+            <a:ext cx="5792732" cy="2131608"/>
+            <a:chOff x="883471" y="2218780"/>
+            <a:chExt cx="5792732" cy="2131608"/>
           </a:xfrm>
         </p:grpSpPr>
         <p:sp>
@@ -17280,8 +17318,8 @@
           </p:nvSpPr>
           <p:spPr>
             <a:xfrm>
-              <a:off x="883471" y="673017"/>
-              <a:ext cx="5792732" cy="3170099"/>
+              <a:off x="883471" y="2218780"/>
+              <a:ext cx="5792732" cy="1631216"/>
             </a:xfrm>
             <a:prstGeom prst="rect">
               <a:avLst/>
@@ -17302,7 +17340,7 @@
                   </a:solidFill>
                   <a:latin typeface="Ubuntu" panose="020B0504030602030204" pitchFamily="34" charset="0"/>
                 </a:rPr>
-                <a:t>Active Code Branches / Time Spent Merging Branched Code</a:t>
+                <a:t>Active (Product) Code Branches</a:t>
               </a:r>
             </a:p>
           </p:txBody>
@@ -17653,6 +17691,483 @@
 </file>
 
 <file path=ppt/slides/slide53.xml><?xml version="1.0" encoding="utf-8"?>
+<p:sld xmlns:a="http://schemas.openxmlformats.org/drawingml/2006/main" xmlns:r="http://schemas.openxmlformats.org/officeDocument/2006/relationships" xmlns:p="http://schemas.openxmlformats.org/presentationml/2006/main">
+  <p:cSld>
+    <p:spTree>
+      <p:nvGrpSpPr>
+        <p:cNvPr id="1" name=""/>
+        <p:cNvGrpSpPr/>
+        <p:nvPr/>
+      </p:nvGrpSpPr>
+      <p:grpSpPr>
+        <a:xfrm>
+          <a:off x="0" y="0"/>
+          <a:ext cx="0" cy="0"/>
+          <a:chOff x="0" y="0"/>
+          <a:chExt cx="0" cy="0"/>
+        </a:xfrm>
+      </p:grpSpPr>
+      <p:sp>
+        <p:nvSpPr>
+          <p:cNvPr id="5" name="Rounded Rectangle 4">
+            <a:extLst>
+              <a:ext uri="{FF2B5EF4-FFF2-40B4-BE49-F238E27FC236}">
+                <a16:creationId xmlns:a16="http://schemas.microsoft.com/office/drawing/2014/main" id="{2F616033-11DC-F247-B322-D23C66626F7B}"/>
+              </a:ext>
+            </a:extLst>
+          </p:cNvPr>
+          <p:cNvSpPr/>
+          <p:nvPr/>
+        </p:nvSpPr>
+        <p:spPr>
+          <a:xfrm>
+            <a:off x="0" y="0"/>
+            <a:ext cx="7559675" cy="5327650"/>
+          </a:xfrm>
+          <a:prstGeom prst="roundRect">
+            <a:avLst>
+              <a:gd name="adj" fmla="val 0"/>
+            </a:avLst>
+          </a:prstGeom>
+          <a:solidFill>
+            <a:srgbClr val="7030A0"/>
+          </a:solidFill>
+          <a:ln>
+            <a:noFill/>
+          </a:ln>
+        </p:spPr>
+        <p:style>
+          <a:lnRef idx="2">
+            <a:schemeClr val="accent1">
+              <a:shade val="50000"/>
+            </a:schemeClr>
+          </a:lnRef>
+          <a:fillRef idx="1">
+            <a:schemeClr val="accent1"/>
+          </a:fillRef>
+          <a:effectRef idx="0">
+            <a:schemeClr val="accent1"/>
+          </a:effectRef>
+          <a:fontRef idx="minor">
+            <a:schemeClr val="lt1"/>
+          </a:fontRef>
+        </p:style>
+        <p:txBody>
+          <a:bodyPr rtlCol="0" anchor="ctr"/>
+          <a:lstStyle/>
+          <a:p>
+            <a:pPr algn="ctr"/>
+            <a:endParaRPr lang="en-NL"/>
+          </a:p>
+        </p:txBody>
+      </p:sp>
+      <p:grpSp>
+        <p:nvGrpSpPr>
+          <p:cNvPr id="2" name="Group 1">
+            <a:extLst>
+              <a:ext uri="{FF2B5EF4-FFF2-40B4-BE49-F238E27FC236}">
+                <a16:creationId xmlns:a16="http://schemas.microsoft.com/office/drawing/2014/main" id="{F3783B8A-057E-8847-A5F9-66E9C395C45B}"/>
+              </a:ext>
+            </a:extLst>
+          </p:cNvPr>
+          <p:cNvGrpSpPr/>
+          <p:nvPr/>
+        </p:nvGrpSpPr>
+        <p:grpSpPr>
+          <a:xfrm>
+            <a:off x="883471" y="825139"/>
+            <a:ext cx="5792732" cy="3677371"/>
+            <a:chOff x="883471" y="673017"/>
+            <a:chExt cx="5792732" cy="3677371"/>
+          </a:xfrm>
+        </p:grpSpPr>
+        <p:sp>
+          <p:nvSpPr>
+            <p:cNvPr id="4" name="TextBox 3">
+              <a:extLst>
+                <a:ext uri="{FF2B5EF4-FFF2-40B4-BE49-F238E27FC236}">
+                  <a16:creationId xmlns:a16="http://schemas.microsoft.com/office/drawing/2014/main" id="{AF29F9D5-B3D4-3946-BEBF-95420A2CE6E9}"/>
+                </a:ext>
+              </a:extLst>
+            </p:cNvPr>
+            <p:cNvSpPr txBox="1"/>
+            <p:nvPr/>
+          </p:nvSpPr>
+          <p:spPr>
+            <a:xfrm>
+              <a:off x="883471" y="673017"/>
+              <a:ext cx="5792732" cy="3170099"/>
+            </a:xfrm>
+            <a:prstGeom prst="rect">
+              <a:avLst/>
+            </a:prstGeom>
+            <a:noFill/>
+          </p:spPr>
+          <p:txBody>
+            <a:bodyPr wrap="square" rtlCol="0">
+              <a:spAutoFit/>
+            </a:bodyPr>
+            <a:lstStyle/>
+            <a:p>
+              <a:pPr algn="ctr"/>
+              <a:r>
+                <a:rPr lang="en-NL" sz="5000" b="1" dirty="0">
+                  <a:solidFill>
+                    <a:schemeClr val="bg1"/>
+                  </a:solidFill>
+                  <a:latin typeface="Ubuntu" panose="020B0504030602030204" pitchFamily="34" charset="0"/>
+                </a:rPr>
+                <a:t>Time Spent Merging Code Between Branches</a:t>
+              </a:r>
+            </a:p>
+          </p:txBody>
+        </p:sp>
+        <p:sp>
+          <p:nvSpPr>
+            <p:cNvPr id="10" name="Oval 9">
+              <a:extLst>
+                <a:ext uri="{FF2B5EF4-FFF2-40B4-BE49-F238E27FC236}">
+                  <a16:creationId xmlns:a16="http://schemas.microsoft.com/office/drawing/2014/main" id="{8E6CB132-B323-8640-8026-1DF125BD5E21}"/>
+                </a:ext>
+              </a:extLst>
+            </p:cNvPr>
+            <p:cNvSpPr/>
+            <p:nvPr/>
+          </p:nvSpPr>
+          <p:spPr>
+            <a:xfrm>
+              <a:off x="3169403" y="3986241"/>
+              <a:ext cx="364210" cy="364147"/>
+            </a:xfrm>
+            <a:prstGeom prst="ellipse">
+              <a:avLst/>
+            </a:prstGeom>
+            <a:solidFill>
+              <a:schemeClr val="bg1"/>
+            </a:solidFill>
+            <a:ln>
+              <a:solidFill>
+                <a:schemeClr val="bg1"/>
+              </a:solidFill>
+            </a:ln>
+          </p:spPr>
+          <p:style>
+            <a:lnRef idx="2">
+              <a:schemeClr val="accent1">
+                <a:shade val="50000"/>
+              </a:schemeClr>
+            </a:lnRef>
+            <a:fillRef idx="1">
+              <a:schemeClr val="accent1"/>
+            </a:fillRef>
+            <a:effectRef idx="0">
+              <a:schemeClr val="accent1"/>
+            </a:effectRef>
+            <a:fontRef idx="minor">
+              <a:schemeClr val="lt1"/>
+            </a:fontRef>
+          </p:style>
+          <p:txBody>
+            <a:bodyPr rtlCol="0" anchor="ctr"/>
+            <a:lstStyle/>
+            <a:p>
+              <a:pPr algn="ctr"/>
+              <a:endParaRPr lang="en-NL"/>
+            </a:p>
+          </p:txBody>
+        </p:sp>
+        <p:sp>
+          <p:nvSpPr>
+            <p:cNvPr id="11" name="Oval 10">
+              <a:extLst>
+                <a:ext uri="{FF2B5EF4-FFF2-40B4-BE49-F238E27FC236}">
+                  <a16:creationId xmlns:a16="http://schemas.microsoft.com/office/drawing/2014/main" id="{2C8D3FA5-1ABC-BF4A-B070-B50AE6AAE754}"/>
+                </a:ext>
+              </a:extLst>
+            </p:cNvPr>
+            <p:cNvSpPr/>
+            <p:nvPr/>
+          </p:nvSpPr>
+          <p:spPr>
+            <a:xfrm>
+              <a:off x="3597732" y="3986240"/>
+              <a:ext cx="364210" cy="364147"/>
+            </a:xfrm>
+            <a:prstGeom prst="ellipse">
+              <a:avLst/>
+            </a:prstGeom>
+            <a:solidFill>
+              <a:schemeClr val="bg1"/>
+            </a:solidFill>
+            <a:ln>
+              <a:solidFill>
+                <a:schemeClr val="bg1"/>
+              </a:solidFill>
+            </a:ln>
+          </p:spPr>
+          <p:style>
+            <a:lnRef idx="2">
+              <a:schemeClr val="accent1">
+                <a:shade val="50000"/>
+              </a:schemeClr>
+            </a:lnRef>
+            <a:fillRef idx="1">
+              <a:schemeClr val="accent1"/>
+            </a:fillRef>
+            <a:effectRef idx="0">
+              <a:schemeClr val="accent1"/>
+            </a:effectRef>
+            <a:fontRef idx="minor">
+              <a:schemeClr val="lt1"/>
+            </a:fontRef>
+          </p:style>
+          <p:txBody>
+            <a:bodyPr rtlCol="0" anchor="ctr"/>
+            <a:lstStyle/>
+            <a:p>
+              <a:pPr algn="ctr"/>
+              <a:endParaRPr lang="en-NL"/>
+            </a:p>
+          </p:txBody>
+        </p:sp>
+        <p:sp>
+          <p:nvSpPr>
+            <p:cNvPr id="12" name="Oval 11">
+              <a:extLst>
+                <a:ext uri="{FF2B5EF4-FFF2-40B4-BE49-F238E27FC236}">
+                  <a16:creationId xmlns:a16="http://schemas.microsoft.com/office/drawing/2014/main" id="{360A5B3C-4E14-2948-A0A7-F164D7F1B9A8}"/>
+                </a:ext>
+              </a:extLst>
+            </p:cNvPr>
+            <p:cNvSpPr/>
+            <p:nvPr/>
+          </p:nvSpPr>
+          <p:spPr>
+            <a:xfrm>
+              <a:off x="4026061" y="3986239"/>
+              <a:ext cx="364210" cy="364147"/>
+            </a:xfrm>
+            <a:prstGeom prst="ellipse">
+              <a:avLst/>
+            </a:prstGeom>
+            <a:solidFill>
+              <a:schemeClr val="bg1"/>
+            </a:solidFill>
+            <a:ln>
+              <a:solidFill>
+                <a:schemeClr val="bg1"/>
+              </a:solidFill>
+            </a:ln>
+          </p:spPr>
+          <p:style>
+            <a:lnRef idx="2">
+              <a:schemeClr val="accent1">
+                <a:shade val="50000"/>
+              </a:schemeClr>
+            </a:lnRef>
+            <a:fillRef idx="1">
+              <a:schemeClr val="accent1"/>
+            </a:fillRef>
+            <a:effectRef idx="0">
+              <a:schemeClr val="accent1"/>
+            </a:effectRef>
+            <a:fontRef idx="minor">
+              <a:schemeClr val="lt1"/>
+            </a:fontRef>
+          </p:style>
+          <p:txBody>
+            <a:bodyPr rtlCol="0" anchor="ctr"/>
+            <a:lstStyle/>
+            <a:p>
+              <a:pPr algn="ctr"/>
+              <a:endParaRPr lang="en-NL"/>
+            </a:p>
+          </p:txBody>
+        </p:sp>
+      </p:grpSp>
+    </p:spTree>
+    <p:extLst>
+      <p:ext uri="{BB962C8B-B14F-4D97-AF65-F5344CB8AC3E}">
+        <p14:creationId xmlns:p14="http://schemas.microsoft.com/office/powerpoint/2010/main" val="1398114594"/>
+      </p:ext>
+    </p:extLst>
+  </p:cSld>
+  <p:clrMapOvr>
+    <a:masterClrMapping/>
+  </p:clrMapOvr>
+</p:sld>
+</file>
+
+<file path=ppt/slides/slide54.xml><?xml version="1.0" encoding="utf-8"?>
+<p:sld xmlns:a="http://schemas.openxmlformats.org/drawingml/2006/main" xmlns:r="http://schemas.openxmlformats.org/officeDocument/2006/relationships" xmlns:p="http://schemas.openxmlformats.org/presentationml/2006/main">
+  <p:cSld>
+    <p:spTree>
+      <p:nvGrpSpPr>
+        <p:cNvPr id="1" name=""/>
+        <p:cNvGrpSpPr/>
+        <p:nvPr/>
+      </p:nvGrpSpPr>
+      <p:grpSpPr>
+        <a:xfrm>
+          <a:off x="0" y="0"/>
+          <a:ext cx="0" cy="0"/>
+          <a:chOff x="0" y="0"/>
+          <a:chExt cx="0" cy="0"/>
+        </a:xfrm>
+      </p:grpSpPr>
+      <p:sp>
+        <p:nvSpPr>
+          <p:cNvPr id="2" name="Title 1">
+            <a:extLst>
+              <a:ext uri="{FF2B5EF4-FFF2-40B4-BE49-F238E27FC236}">
+                <a16:creationId xmlns:a16="http://schemas.microsoft.com/office/drawing/2014/main" id="{CFCDF3DA-1D3D-E743-8E21-6B353B4D96A4}"/>
+              </a:ext>
+            </a:extLst>
+          </p:cNvPr>
+          <p:cNvSpPr>
+            <a:spLocks noGrp="1"/>
+          </p:cNvSpPr>
+          <p:nvPr>
+            <p:ph type="title"/>
+          </p:nvPr>
+        </p:nvSpPr>
+        <p:spPr/>
+        <p:txBody>
+          <a:bodyPr/>
+          <a:lstStyle/>
+          <a:p>
+            <a:endParaRPr lang="en-NL"/>
+          </a:p>
+        </p:txBody>
+      </p:sp>
+      <p:sp>
+        <p:nvSpPr>
+          <p:cNvPr id="3" name="Content Placeholder 2">
+            <a:extLst>
+              <a:ext uri="{FF2B5EF4-FFF2-40B4-BE49-F238E27FC236}">
+                <a16:creationId xmlns:a16="http://schemas.microsoft.com/office/drawing/2014/main" id="{40A525DA-CA85-AD48-8A85-52A75E1E5317}"/>
+              </a:ext>
+            </a:extLst>
+          </p:cNvPr>
+          <p:cNvSpPr>
+            <a:spLocks noGrp="1"/>
+          </p:cNvSpPr>
+          <p:nvPr>
+            <p:ph idx="1"/>
+          </p:nvPr>
+        </p:nvSpPr>
+        <p:spPr/>
+        <p:txBody>
+          <a:bodyPr/>
+          <a:lstStyle/>
+          <a:p>
+            <a:endParaRPr lang="en-NL"/>
+          </a:p>
+        </p:txBody>
+      </p:sp>
+      <p:sp>
+        <p:nvSpPr>
+          <p:cNvPr id="4" name="Rounded Rectangle 3">
+            <a:extLst>
+              <a:ext uri="{FF2B5EF4-FFF2-40B4-BE49-F238E27FC236}">
+                <a16:creationId xmlns:a16="http://schemas.microsoft.com/office/drawing/2014/main" id="{6B890BB6-3544-1A4E-A833-93135A597BB4}"/>
+              </a:ext>
+            </a:extLst>
+          </p:cNvPr>
+          <p:cNvSpPr/>
+          <p:nvPr/>
+        </p:nvSpPr>
+        <p:spPr>
+          <a:xfrm>
+            <a:off x="0" y="0"/>
+            <a:ext cx="7559675" cy="5327650"/>
+          </a:xfrm>
+          <a:prstGeom prst="roundRect">
+            <a:avLst>
+              <a:gd name="adj" fmla="val 0"/>
+            </a:avLst>
+          </a:prstGeom>
+          <a:blipFill>
+            <a:blip r:embed="rId2"/>
+            <a:stretch>
+              <a:fillRect/>
+            </a:stretch>
+          </a:blipFill>
+          <a:ln>
+            <a:solidFill>
+              <a:schemeClr val="bg2"/>
+            </a:solidFill>
+          </a:ln>
+        </p:spPr>
+        <p:style>
+          <a:lnRef idx="2">
+            <a:schemeClr val="accent1">
+              <a:shade val="50000"/>
+            </a:schemeClr>
+          </a:lnRef>
+          <a:fillRef idx="1">
+            <a:schemeClr val="accent1"/>
+          </a:fillRef>
+          <a:effectRef idx="0">
+            <a:schemeClr val="accent1"/>
+          </a:effectRef>
+          <a:fontRef idx="minor">
+            <a:schemeClr val="lt1"/>
+          </a:fontRef>
+        </p:style>
+        <p:txBody>
+          <a:bodyPr rtlCol="0" anchor="ctr"/>
+          <a:lstStyle/>
+          <a:p>
+            <a:pPr algn="ctr"/>
+            <a:endParaRPr lang="en-NL"/>
+          </a:p>
+        </p:txBody>
+      </p:sp>
+      <p:pic>
+        <p:nvPicPr>
+          <p:cNvPr id="5" name="Picture 4" descr="A picture containing food, drawing&#10;&#10;Description automatically generated">
+            <a:extLst>
+              <a:ext uri="{FF2B5EF4-FFF2-40B4-BE49-F238E27FC236}">
+                <a16:creationId xmlns:a16="http://schemas.microsoft.com/office/drawing/2014/main" id="{27611709-3190-2A4B-BCE4-4D329000A8EB}"/>
+              </a:ext>
+            </a:extLst>
+          </p:cNvPr>
+          <p:cNvPicPr>
+            <a:picLocks noChangeAspect="1"/>
+          </p:cNvPicPr>
+          <p:nvPr/>
+        </p:nvPicPr>
+        <p:blipFill>
+          <a:blip r:embed="rId3"/>
+          <a:stretch>
+            <a:fillRect/>
+          </a:stretch>
+        </p:blipFill>
+        <p:spPr>
+          <a:xfrm>
+            <a:off x="350837" y="-765175"/>
+            <a:ext cx="6858000" cy="6858000"/>
+          </a:xfrm>
+          <a:prstGeom prst="rect">
+            <a:avLst/>
+          </a:prstGeom>
+        </p:spPr>
+      </p:pic>
+    </p:spTree>
+    <p:extLst>
+      <p:ext uri="{BB962C8B-B14F-4D97-AF65-F5344CB8AC3E}">
+        <p14:creationId xmlns:p14="http://schemas.microsoft.com/office/powerpoint/2010/main" val="2967010011"/>
+      </p:ext>
+    </p:extLst>
+  </p:cSld>
+  <p:clrMapOvr>
+    <a:masterClrMapping/>
+  </p:clrMapOvr>
+</p:sld>
+</file>
+
+<file path=ppt/slides/slide55.xml><?xml version="1.0" encoding="utf-8"?>
 <p:sld xmlns:a="http://schemas.openxmlformats.org/drawingml/2006/main" xmlns:r="http://schemas.openxmlformats.org/officeDocument/2006/relationships" xmlns:p="http://schemas.openxmlformats.org/presentationml/2006/main">
   <p:cSld>
     <p:spTree>
@@ -17972,7 +18487,7 @@
 </p:sld>
 </file>
 
-<file path=ppt/slides/slide54.xml><?xml version="1.0" encoding="utf-8"?>
+<file path=ppt/slides/slide56.xml><?xml version="1.0" encoding="utf-8"?>
 <p:sld xmlns:a="http://schemas.openxmlformats.org/drawingml/2006/main" xmlns:r="http://schemas.openxmlformats.org/officeDocument/2006/relationships" xmlns:p="http://schemas.openxmlformats.org/presentationml/2006/main">
   <p:cSld>
     <p:spTree>
@@ -18141,7 +18656,7 @@
 </p:sld>
 </file>
 
-<file path=ppt/slides/slide55.xml><?xml version="1.0" encoding="utf-8"?>
+<file path=ppt/slides/slide57.xml><?xml version="1.0" encoding="utf-8"?>
 <p:sld xmlns:a="http://schemas.openxmlformats.org/drawingml/2006/main" xmlns:r="http://schemas.openxmlformats.org/officeDocument/2006/relationships" xmlns:p="http://schemas.openxmlformats.org/presentationml/2006/main">
   <p:cSld>
     <p:spTree>
@@ -18449,7 +18964,7 @@
 </p:sld>
 </file>
 
-<file path=ppt/slides/slide56.xml><?xml version="1.0" encoding="utf-8"?>
+<file path=ppt/slides/slide58.xml><?xml version="1.0" encoding="utf-8"?>
 <p:sld xmlns:a="http://schemas.openxmlformats.org/drawingml/2006/main" xmlns:r="http://schemas.openxmlformats.org/officeDocument/2006/relationships" xmlns:p="http://schemas.openxmlformats.org/presentationml/2006/main">
   <p:cSld>
     <p:spTree>
@@ -18609,297 +19124,6 @@
     <p:extLst>
       <p:ext uri="{BB962C8B-B14F-4D97-AF65-F5344CB8AC3E}">
         <p14:creationId xmlns:p14="http://schemas.microsoft.com/office/powerpoint/2010/main" val="141956057"/>
-      </p:ext>
-    </p:extLst>
-  </p:cSld>
-  <p:clrMapOvr>
-    <a:masterClrMapping/>
-  </p:clrMapOvr>
-</p:sld>
-</file>
-
-<file path=ppt/slides/slide57.xml><?xml version="1.0" encoding="utf-8"?>
-<p:sld xmlns:a="http://schemas.openxmlformats.org/drawingml/2006/main" xmlns:r="http://schemas.openxmlformats.org/officeDocument/2006/relationships" xmlns:p="http://schemas.openxmlformats.org/presentationml/2006/main">
-  <p:cSld>
-    <p:spTree>
-      <p:nvGrpSpPr>
-        <p:cNvPr id="1" name=""/>
-        <p:cNvGrpSpPr/>
-        <p:nvPr/>
-      </p:nvGrpSpPr>
-      <p:grpSpPr>
-        <a:xfrm>
-          <a:off x="0" y="0"/>
-          <a:ext cx="0" cy="0"/>
-          <a:chOff x="0" y="0"/>
-          <a:chExt cx="0" cy="0"/>
-        </a:xfrm>
-      </p:grpSpPr>
-      <p:sp>
-        <p:nvSpPr>
-          <p:cNvPr id="7" name="Rounded Rectangle 6">
-            <a:extLst>
-              <a:ext uri="{FF2B5EF4-FFF2-40B4-BE49-F238E27FC236}">
-                <a16:creationId xmlns:a16="http://schemas.microsoft.com/office/drawing/2014/main" id="{B3DC599D-AD1B-104D-B158-5C2A6823AC16}"/>
-              </a:ext>
-            </a:extLst>
-          </p:cNvPr>
-          <p:cNvSpPr/>
-          <p:nvPr/>
-        </p:nvSpPr>
-        <p:spPr>
-          <a:xfrm>
-            <a:off x="0" y="0"/>
-            <a:ext cx="7559675" cy="5327650"/>
-          </a:xfrm>
-          <a:prstGeom prst="roundRect">
-            <a:avLst>
-              <a:gd name="adj" fmla="val 0"/>
-            </a:avLst>
-          </a:prstGeom>
-          <a:solidFill>
-            <a:srgbClr val="FFC2E8"/>
-          </a:solidFill>
-          <a:ln>
-            <a:noFill/>
-          </a:ln>
-        </p:spPr>
-        <p:style>
-          <a:lnRef idx="2">
-            <a:schemeClr val="accent1">
-              <a:shade val="50000"/>
-            </a:schemeClr>
-          </a:lnRef>
-          <a:fillRef idx="1">
-            <a:schemeClr val="accent1"/>
-          </a:fillRef>
-          <a:effectRef idx="0">
-            <a:schemeClr val="accent1"/>
-          </a:effectRef>
-          <a:fontRef idx="minor">
-            <a:schemeClr val="lt1"/>
-          </a:fontRef>
-        </p:style>
-        <p:txBody>
-          <a:bodyPr rtlCol="0" anchor="ctr"/>
-          <a:lstStyle/>
-          <a:p>
-            <a:pPr algn="ctr"/>
-            <a:endParaRPr lang="en-NL"/>
-          </a:p>
-        </p:txBody>
-      </p:sp>
-      <p:sp>
-        <p:nvSpPr>
-          <p:cNvPr id="6" name="TextBox 5">
-            <a:extLst>
-              <a:ext uri="{FF2B5EF4-FFF2-40B4-BE49-F238E27FC236}">
-                <a16:creationId xmlns:a16="http://schemas.microsoft.com/office/drawing/2014/main" id="{009EAD6C-D563-D744-AFCA-AE8CA95E6630}"/>
-              </a:ext>
-            </a:extLst>
-          </p:cNvPr>
-          <p:cNvSpPr txBox="1"/>
-          <p:nvPr/>
-        </p:nvSpPr>
-        <p:spPr>
-          <a:xfrm>
-            <a:off x="329715" y="1463496"/>
-            <a:ext cx="6900243" cy="2400657"/>
-          </a:xfrm>
-          <a:prstGeom prst="rect">
-            <a:avLst/>
-          </a:prstGeom>
-          <a:noFill/>
-        </p:spPr>
-        <p:txBody>
-          <a:bodyPr wrap="square" rtlCol="0">
-            <a:spAutoFit/>
-          </a:bodyPr>
-          <a:lstStyle/>
-          <a:p>
-            <a:pPr algn="ctr"/>
-            <a:r>
-              <a:rPr lang="en-NL" sz="5000" b="1" dirty="0">
-                <a:latin typeface="Ubuntu" panose="020B0504030602030204" pitchFamily="34" charset="0"/>
-              </a:rPr>
-              <a:t>Don’t measure Output. Measure Outcomes</a:t>
-            </a:r>
-          </a:p>
-        </p:txBody>
-      </p:sp>
-    </p:spTree>
-    <p:extLst>
-      <p:ext uri="{BB962C8B-B14F-4D97-AF65-F5344CB8AC3E}">
-        <p14:creationId xmlns:p14="http://schemas.microsoft.com/office/powerpoint/2010/main" val="3384980287"/>
-      </p:ext>
-    </p:extLst>
-  </p:cSld>
-  <p:clrMapOvr>
-    <a:masterClrMapping/>
-  </p:clrMapOvr>
-</p:sld>
-</file>
-
-<file path=ppt/slides/slide58.xml><?xml version="1.0" encoding="utf-8"?>
-<p:sld xmlns:a="http://schemas.openxmlformats.org/drawingml/2006/main" xmlns:r="http://schemas.openxmlformats.org/officeDocument/2006/relationships" xmlns:p="http://schemas.openxmlformats.org/presentationml/2006/main">
-  <p:cSld>
-    <p:spTree>
-      <p:nvGrpSpPr>
-        <p:cNvPr id="1" name=""/>
-        <p:cNvGrpSpPr/>
-        <p:nvPr/>
-      </p:nvGrpSpPr>
-      <p:grpSpPr>
-        <a:xfrm>
-          <a:off x="0" y="0"/>
-          <a:ext cx="0" cy="0"/>
-          <a:chOff x="0" y="0"/>
-          <a:chExt cx="0" cy="0"/>
-        </a:xfrm>
-      </p:grpSpPr>
-      <p:sp>
-        <p:nvSpPr>
-          <p:cNvPr id="2" name="Title 1">
-            <a:extLst>
-              <a:ext uri="{FF2B5EF4-FFF2-40B4-BE49-F238E27FC236}">
-                <a16:creationId xmlns:a16="http://schemas.microsoft.com/office/drawing/2014/main" id="{CFCDF3DA-1D3D-E743-8E21-6B353B4D96A4}"/>
-              </a:ext>
-            </a:extLst>
-          </p:cNvPr>
-          <p:cNvSpPr>
-            <a:spLocks noGrp="1"/>
-          </p:cNvSpPr>
-          <p:nvPr>
-            <p:ph type="title"/>
-          </p:nvPr>
-        </p:nvSpPr>
-        <p:spPr/>
-        <p:txBody>
-          <a:bodyPr/>
-          <a:lstStyle/>
-          <a:p>
-            <a:endParaRPr lang="en-NL"/>
-          </a:p>
-        </p:txBody>
-      </p:sp>
-      <p:sp>
-        <p:nvSpPr>
-          <p:cNvPr id="3" name="Content Placeholder 2">
-            <a:extLst>
-              <a:ext uri="{FF2B5EF4-FFF2-40B4-BE49-F238E27FC236}">
-                <a16:creationId xmlns:a16="http://schemas.microsoft.com/office/drawing/2014/main" id="{40A525DA-CA85-AD48-8A85-52A75E1E5317}"/>
-              </a:ext>
-            </a:extLst>
-          </p:cNvPr>
-          <p:cNvSpPr>
-            <a:spLocks noGrp="1"/>
-          </p:cNvSpPr>
-          <p:nvPr>
-            <p:ph idx="1"/>
-          </p:nvPr>
-        </p:nvSpPr>
-        <p:spPr/>
-        <p:txBody>
-          <a:bodyPr/>
-          <a:lstStyle/>
-          <a:p>
-            <a:endParaRPr lang="en-NL"/>
-          </a:p>
-        </p:txBody>
-      </p:sp>
-      <p:sp>
-        <p:nvSpPr>
-          <p:cNvPr id="4" name="Rounded Rectangle 3">
-            <a:extLst>
-              <a:ext uri="{FF2B5EF4-FFF2-40B4-BE49-F238E27FC236}">
-                <a16:creationId xmlns:a16="http://schemas.microsoft.com/office/drawing/2014/main" id="{6B890BB6-3544-1A4E-A833-93135A597BB4}"/>
-              </a:ext>
-            </a:extLst>
-          </p:cNvPr>
-          <p:cNvSpPr/>
-          <p:nvPr/>
-        </p:nvSpPr>
-        <p:spPr>
-          <a:xfrm>
-            <a:off x="0" y="0"/>
-            <a:ext cx="7559675" cy="5327650"/>
-          </a:xfrm>
-          <a:prstGeom prst="roundRect">
-            <a:avLst>
-              <a:gd name="adj" fmla="val 0"/>
-            </a:avLst>
-          </a:prstGeom>
-          <a:blipFill>
-            <a:blip r:embed="rId2"/>
-            <a:stretch>
-              <a:fillRect/>
-            </a:stretch>
-          </a:blipFill>
-          <a:ln>
-            <a:solidFill>
-              <a:schemeClr val="bg2"/>
-            </a:solidFill>
-          </a:ln>
-        </p:spPr>
-        <p:style>
-          <a:lnRef idx="2">
-            <a:schemeClr val="accent1">
-              <a:shade val="50000"/>
-            </a:schemeClr>
-          </a:lnRef>
-          <a:fillRef idx="1">
-            <a:schemeClr val="accent1"/>
-          </a:fillRef>
-          <a:effectRef idx="0">
-            <a:schemeClr val="accent1"/>
-          </a:effectRef>
-          <a:fontRef idx="minor">
-            <a:schemeClr val="lt1"/>
-          </a:fontRef>
-        </p:style>
-        <p:txBody>
-          <a:bodyPr rtlCol="0" anchor="ctr"/>
-          <a:lstStyle/>
-          <a:p>
-            <a:pPr algn="ctr"/>
-            <a:endParaRPr lang="en-NL"/>
-          </a:p>
-        </p:txBody>
-      </p:sp>
-      <p:pic>
-        <p:nvPicPr>
-          <p:cNvPr id="5" name="Picture 4" descr="A picture containing food, drawing&#10;&#10;Description automatically generated">
-            <a:extLst>
-              <a:ext uri="{FF2B5EF4-FFF2-40B4-BE49-F238E27FC236}">
-                <a16:creationId xmlns:a16="http://schemas.microsoft.com/office/drawing/2014/main" id="{27611709-3190-2A4B-BCE4-4D329000A8EB}"/>
-              </a:ext>
-            </a:extLst>
-          </p:cNvPr>
-          <p:cNvPicPr>
-            <a:picLocks noChangeAspect="1"/>
-          </p:cNvPicPr>
-          <p:nvPr/>
-        </p:nvPicPr>
-        <p:blipFill>
-          <a:blip r:embed="rId3"/>
-          <a:stretch>
-            <a:fillRect/>
-          </a:stretch>
-        </p:blipFill>
-        <p:spPr>
-          <a:xfrm>
-            <a:off x="350837" y="-765175"/>
-            <a:ext cx="6858000" cy="6858000"/>
-          </a:xfrm>
-          <a:prstGeom prst="rect">
-            <a:avLst/>
-          </a:prstGeom>
-        </p:spPr>
-      </p:pic>
-    </p:spTree>
-    <p:extLst>
-      <p:ext uri="{BB962C8B-B14F-4D97-AF65-F5344CB8AC3E}">
-        <p14:creationId xmlns:p14="http://schemas.microsoft.com/office/powerpoint/2010/main" val="609235282"/>
       </p:ext>
     </p:extLst>
   </p:cSld>
@@ -19010,10 +19234,10 @@
           <a:p>
             <a:pPr algn="ctr"/>
             <a:r>
-              <a:rPr lang="en-NL" sz="5000" b="1">
+              <a:rPr lang="en-NL" sz="5000" b="1" dirty="0">
                 <a:latin typeface="Ubuntu" panose="020B0504030602030204" pitchFamily="34" charset="0"/>
               </a:rPr>
-              <a:t>It’s not about the Metrics, but about the Conversation</a:t>
+              <a:t>Don’t measure Output. Measure Outcomes</a:t>
             </a:r>
           </a:p>
         </p:txBody>
@@ -19021,7 +19245,7 @@
     </p:spTree>
     <p:extLst>
       <p:ext uri="{BB962C8B-B14F-4D97-AF65-F5344CB8AC3E}">
-        <p14:creationId xmlns:p14="http://schemas.microsoft.com/office/powerpoint/2010/main" val="3864524999"/>
+        <p14:creationId xmlns:p14="http://schemas.microsoft.com/office/powerpoint/2010/main" val="3384980287"/>
       </p:ext>
     </p:extLst>
   </p:cSld>
@@ -19359,7 +19583,7 @@
     </p:spTree>
     <p:extLst>
       <p:ext uri="{BB962C8B-B14F-4D97-AF65-F5344CB8AC3E}">
-        <p14:creationId xmlns:p14="http://schemas.microsoft.com/office/powerpoint/2010/main" val="2834202860"/>
+        <p14:creationId xmlns:p14="http://schemas.microsoft.com/office/powerpoint/2010/main" val="609235282"/>
       </p:ext>
     </p:extLst>
   </p:cSld>
@@ -19454,8 +19678,8 @@
         </p:nvSpPr>
         <p:spPr>
           <a:xfrm>
-            <a:off x="329715" y="1078775"/>
-            <a:ext cx="6900243" cy="3170099"/>
+            <a:off x="329715" y="1463496"/>
+            <a:ext cx="6900243" cy="2400657"/>
           </a:xfrm>
           <a:prstGeom prst="rect">
             <a:avLst/>
@@ -19470,40 +19694,10 @@
           <a:p>
             <a:pPr algn="ctr"/>
             <a:r>
-              <a:rPr lang="en-NL" sz="5000" dirty="0">
+              <a:rPr lang="en-NL" sz="5000" b="1">
                 <a:latin typeface="Ubuntu" panose="020B0504030602030204" pitchFamily="34" charset="0"/>
               </a:rPr>
-              <a:t>Learn more about</a:t>
-            </a:r>
-            <a:r>
-              <a:rPr lang="en-NL" sz="5000" b="1" dirty="0">
-                <a:latin typeface="Ubuntu" panose="020B0504030602030204" pitchFamily="34" charset="0"/>
-              </a:rPr>
-              <a:t> </a:t>
-            </a:r>
-          </a:p>
-          <a:p>
-            <a:pPr algn="ctr"/>
-            <a:r>
-              <a:rPr lang="en-NL" sz="5000" b="1" dirty="0">
-                <a:latin typeface="Ubuntu" panose="020B0504030602030204" pitchFamily="34" charset="0"/>
-              </a:rPr>
-              <a:t>Evidence Based Management </a:t>
-            </a:r>
-            <a:r>
-              <a:rPr lang="en-NL" sz="5000" dirty="0">
-                <a:latin typeface="Ubuntu" panose="020B0504030602030204" pitchFamily="34" charset="0"/>
-              </a:rPr>
-              <a:t>at</a:t>
-            </a:r>
-          </a:p>
-          <a:p>
-            <a:pPr algn="ctr"/>
-            <a:r>
-              <a:rPr lang="en-NL" sz="5000" dirty="0">
-                <a:latin typeface="Ubuntu" panose="020B0504030602030204" pitchFamily="34" charset="0"/>
-              </a:rPr>
-              <a:t>http://scrum.org/EBM</a:t>
+              <a:t>It’s not about the Metrics, but about the Conversation</a:t>
             </a:r>
           </a:p>
         </p:txBody>
@@ -19511,7 +19705,7 @@
     </p:spTree>
     <p:extLst>
       <p:ext uri="{BB962C8B-B14F-4D97-AF65-F5344CB8AC3E}">
-        <p14:creationId xmlns:p14="http://schemas.microsoft.com/office/powerpoint/2010/main" val="1377554222"/>
+        <p14:creationId xmlns:p14="http://schemas.microsoft.com/office/powerpoint/2010/main" val="3864524999"/>
       </p:ext>
     </p:extLst>
   </p:cSld>
@@ -19680,7 +19874,7 @@
     </p:spTree>
     <p:extLst>
       <p:ext uri="{BB962C8B-B14F-4D97-AF65-F5344CB8AC3E}">
-        <p14:creationId xmlns:p14="http://schemas.microsoft.com/office/powerpoint/2010/main" val="1817486122"/>
+        <p14:creationId xmlns:p14="http://schemas.microsoft.com/office/powerpoint/2010/main" val="2834202860"/>
       </p:ext>
     </p:extLst>
   </p:cSld>
@@ -19709,6 +19903,327 @@
       </p:grpSpPr>
       <p:sp>
         <p:nvSpPr>
+          <p:cNvPr id="7" name="Rounded Rectangle 6">
+            <a:extLst>
+              <a:ext uri="{FF2B5EF4-FFF2-40B4-BE49-F238E27FC236}">
+                <a16:creationId xmlns:a16="http://schemas.microsoft.com/office/drawing/2014/main" id="{B3DC599D-AD1B-104D-B158-5C2A6823AC16}"/>
+              </a:ext>
+            </a:extLst>
+          </p:cNvPr>
+          <p:cNvSpPr/>
+          <p:nvPr/>
+        </p:nvSpPr>
+        <p:spPr>
+          <a:xfrm>
+            <a:off x="0" y="0"/>
+            <a:ext cx="7559675" cy="5327650"/>
+          </a:xfrm>
+          <a:prstGeom prst="roundRect">
+            <a:avLst>
+              <a:gd name="adj" fmla="val 0"/>
+            </a:avLst>
+          </a:prstGeom>
+          <a:solidFill>
+            <a:srgbClr val="FFC2E8"/>
+          </a:solidFill>
+          <a:ln>
+            <a:noFill/>
+          </a:ln>
+        </p:spPr>
+        <p:style>
+          <a:lnRef idx="2">
+            <a:schemeClr val="accent1">
+              <a:shade val="50000"/>
+            </a:schemeClr>
+          </a:lnRef>
+          <a:fillRef idx="1">
+            <a:schemeClr val="accent1"/>
+          </a:fillRef>
+          <a:effectRef idx="0">
+            <a:schemeClr val="accent1"/>
+          </a:effectRef>
+          <a:fontRef idx="minor">
+            <a:schemeClr val="lt1"/>
+          </a:fontRef>
+        </p:style>
+        <p:txBody>
+          <a:bodyPr rtlCol="0" anchor="ctr"/>
+          <a:lstStyle/>
+          <a:p>
+            <a:pPr algn="ctr"/>
+            <a:endParaRPr lang="en-NL"/>
+          </a:p>
+        </p:txBody>
+      </p:sp>
+      <p:sp>
+        <p:nvSpPr>
+          <p:cNvPr id="6" name="TextBox 5">
+            <a:extLst>
+              <a:ext uri="{FF2B5EF4-FFF2-40B4-BE49-F238E27FC236}">
+                <a16:creationId xmlns:a16="http://schemas.microsoft.com/office/drawing/2014/main" id="{009EAD6C-D563-D744-AFCA-AE8CA95E6630}"/>
+              </a:ext>
+            </a:extLst>
+          </p:cNvPr>
+          <p:cNvSpPr txBox="1"/>
+          <p:nvPr/>
+        </p:nvSpPr>
+        <p:spPr>
+          <a:xfrm>
+            <a:off x="329715" y="1078775"/>
+            <a:ext cx="6900243" cy="3170099"/>
+          </a:xfrm>
+          <a:prstGeom prst="rect">
+            <a:avLst/>
+          </a:prstGeom>
+          <a:noFill/>
+        </p:spPr>
+        <p:txBody>
+          <a:bodyPr wrap="square" rtlCol="0">
+            <a:spAutoFit/>
+          </a:bodyPr>
+          <a:lstStyle/>
+          <a:p>
+            <a:pPr algn="ctr"/>
+            <a:r>
+              <a:rPr lang="en-NL" sz="5000" dirty="0">
+                <a:latin typeface="Ubuntu" panose="020B0504030602030204" pitchFamily="34" charset="0"/>
+              </a:rPr>
+              <a:t>Learn more about</a:t>
+            </a:r>
+            <a:r>
+              <a:rPr lang="en-NL" sz="5000" b="1" dirty="0">
+                <a:latin typeface="Ubuntu" panose="020B0504030602030204" pitchFamily="34" charset="0"/>
+              </a:rPr>
+              <a:t> </a:t>
+            </a:r>
+          </a:p>
+          <a:p>
+            <a:pPr algn="ctr"/>
+            <a:r>
+              <a:rPr lang="en-NL" sz="5000" b="1" dirty="0">
+                <a:latin typeface="Ubuntu" panose="020B0504030602030204" pitchFamily="34" charset="0"/>
+              </a:rPr>
+              <a:t>Evidence Based Management </a:t>
+            </a:r>
+            <a:r>
+              <a:rPr lang="en-NL" sz="5000" dirty="0">
+                <a:latin typeface="Ubuntu" panose="020B0504030602030204" pitchFamily="34" charset="0"/>
+              </a:rPr>
+              <a:t>at</a:t>
+            </a:r>
+          </a:p>
+          <a:p>
+            <a:pPr algn="ctr"/>
+            <a:r>
+              <a:rPr lang="en-NL" sz="5000" dirty="0">
+                <a:latin typeface="Ubuntu" panose="020B0504030602030204" pitchFamily="34" charset="0"/>
+              </a:rPr>
+              <a:t>http://scrum.org/EBM</a:t>
+            </a:r>
+          </a:p>
+        </p:txBody>
+      </p:sp>
+    </p:spTree>
+    <p:extLst>
+      <p:ext uri="{BB962C8B-B14F-4D97-AF65-F5344CB8AC3E}">
+        <p14:creationId xmlns:p14="http://schemas.microsoft.com/office/powerpoint/2010/main" val="1377554222"/>
+      </p:ext>
+    </p:extLst>
+  </p:cSld>
+  <p:clrMapOvr>
+    <a:masterClrMapping/>
+  </p:clrMapOvr>
+</p:sld>
+</file>
+
+<file path=ppt/slides/slide64.xml><?xml version="1.0" encoding="utf-8"?>
+<p:sld xmlns:a="http://schemas.openxmlformats.org/drawingml/2006/main" xmlns:r="http://schemas.openxmlformats.org/officeDocument/2006/relationships" xmlns:p="http://schemas.openxmlformats.org/presentationml/2006/main">
+  <p:cSld>
+    <p:spTree>
+      <p:nvGrpSpPr>
+        <p:cNvPr id="1" name=""/>
+        <p:cNvGrpSpPr/>
+        <p:nvPr/>
+      </p:nvGrpSpPr>
+      <p:grpSpPr>
+        <a:xfrm>
+          <a:off x="0" y="0"/>
+          <a:ext cx="0" cy="0"/>
+          <a:chOff x="0" y="0"/>
+          <a:chExt cx="0" cy="0"/>
+        </a:xfrm>
+      </p:grpSpPr>
+      <p:sp>
+        <p:nvSpPr>
+          <p:cNvPr id="2" name="Title 1">
+            <a:extLst>
+              <a:ext uri="{FF2B5EF4-FFF2-40B4-BE49-F238E27FC236}">
+                <a16:creationId xmlns:a16="http://schemas.microsoft.com/office/drawing/2014/main" id="{CFCDF3DA-1D3D-E743-8E21-6B353B4D96A4}"/>
+              </a:ext>
+            </a:extLst>
+          </p:cNvPr>
+          <p:cNvSpPr>
+            <a:spLocks noGrp="1"/>
+          </p:cNvSpPr>
+          <p:nvPr>
+            <p:ph type="title"/>
+          </p:nvPr>
+        </p:nvSpPr>
+        <p:spPr/>
+        <p:txBody>
+          <a:bodyPr/>
+          <a:lstStyle/>
+          <a:p>
+            <a:endParaRPr lang="en-NL"/>
+          </a:p>
+        </p:txBody>
+      </p:sp>
+      <p:sp>
+        <p:nvSpPr>
+          <p:cNvPr id="3" name="Content Placeholder 2">
+            <a:extLst>
+              <a:ext uri="{FF2B5EF4-FFF2-40B4-BE49-F238E27FC236}">
+                <a16:creationId xmlns:a16="http://schemas.microsoft.com/office/drawing/2014/main" id="{40A525DA-CA85-AD48-8A85-52A75E1E5317}"/>
+              </a:ext>
+            </a:extLst>
+          </p:cNvPr>
+          <p:cNvSpPr>
+            <a:spLocks noGrp="1"/>
+          </p:cNvSpPr>
+          <p:nvPr>
+            <p:ph idx="1"/>
+          </p:nvPr>
+        </p:nvSpPr>
+        <p:spPr/>
+        <p:txBody>
+          <a:bodyPr/>
+          <a:lstStyle/>
+          <a:p>
+            <a:endParaRPr lang="en-NL"/>
+          </a:p>
+        </p:txBody>
+      </p:sp>
+      <p:sp>
+        <p:nvSpPr>
+          <p:cNvPr id="4" name="Rounded Rectangle 3">
+            <a:extLst>
+              <a:ext uri="{FF2B5EF4-FFF2-40B4-BE49-F238E27FC236}">
+                <a16:creationId xmlns:a16="http://schemas.microsoft.com/office/drawing/2014/main" id="{6B890BB6-3544-1A4E-A833-93135A597BB4}"/>
+              </a:ext>
+            </a:extLst>
+          </p:cNvPr>
+          <p:cNvSpPr/>
+          <p:nvPr/>
+        </p:nvSpPr>
+        <p:spPr>
+          <a:xfrm>
+            <a:off x="0" y="0"/>
+            <a:ext cx="7559675" cy="5327650"/>
+          </a:xfrm>
+          <a:prstGeom prst="roundRect">
+            <a:avLst>
+              <a:gd name="adj" fmla="val 0"/>
+            </a:avLst>
+          </a:prstGeom>
+          <a:blipFill>
+            <a:blip r:embed="rId2"/>
+            <a:stretch>
+              <a:fillRect/>
+            </a:stretch>
+          </a:blipFill>
+          <a:ln>
+            <a:solidFill>
+              <a:schemeClr val="bg2"/>
+            </a:solidFill>
+          </a:ln>
+        </p:spPr>
+        <p:style>
+          <a:lnRef idx="2">
+            <a:schemeClr val="accent1">
+              <a:shade val="50000"/>
+            </a:schemeClr>
+          </a:lnRef>
+          <a:fillRef idx="1">
+            <a:schemeClr val="accent1"/>
+          </a:fillRef>
+          <a:effectRef idx="0">
+            <a:schemeClr val="accent1"/>
+          </a:effectRef>
+          <a:fontRef idx="minor">
+            <a:schemeClr val="lt1"/>
+          </a:fontRef>
+        </p:style>
+        <p:txBody>
+          <a:bodyPr rtlCol="0" anchor="ctr"/>
+          <a:lstStyle/>
+          <a:p>
+            <a:pPr algn="ctr"/>
+            <a:endParaRPr lang="en-NL"/>
+          </a:p>
+        </p:txBody>
+      </p:sp>
+      <p:pic>
+        <p:nvPicPr>
+          <p:cNvPr id="5" name="Picture 4" descr="A picture containing food, drawing&#10;&#10;Description automatically generated">
+            <a:extLst>
+              <a:ext uri="{FF2B5EF4-FFF2-40B4-BE49-F238E27FC236}">
+                <a16:creationId xmlns:a16="http://schemas.microsoft.com/office/drawing/2014/main" id="{27611709-3190-2A4B-BCE4-4D329000A8EB}"/>
+              </a:ext>
+            </a:extLst>
+          </p:cNvPr>
+          <p:cNvPicPr>
+            <a:picLocks noChangeAspect="1"/>
+          </p:cNvPicPr>
+          <p:nvPr/>
+        </p:nvPicPr>
+        <p:blipFill>
+          <a:blip r:embed="rId3"/>
+          <a:stretch>
+            <a:fillRect/>
+          </a:stretch>
+        </p:blipFill>
+        <p:spPr>
+          <a:xfrm>
+            <a:off x="350837" y="-765175"/>
+            <a:ext cx="6858000" cy="6858000"/>
+          </a:xfrm>
+          <a:prstGeom prst="rect">
+            <a:avLst/>
+          </a:prstGeom>
+        </p:spPr>
+      </p:pic>
+    </p:spTree>
+    <p:extLst>
+      <p:ext uri="{BB962C8B-B14F-4D97-AF65-F5344CB8AC3E}">
+        <p14:creationId xmlns:p14="http://schemas.microsoft.com/office/powerpoint/2010/main" val="1817486122"/>
+      </p:ext>
+    </p:extLst>
+  </p:cSld>
+  <p:clrMapOvr>
+    <a:masterClrMapping/>
+  </p:clrMapOvr>
+</p:sld>
+</file>
+
+<file path=ppt/slides/slide65.xml><?xml version="1.0" encoding="utf-8"?>
+<p:sld xmlns:a="http://schemas.openxmlformats.org/drawingml/2006/main" xmlns:r="http://schemas.openxmlformats.org/officeDocument/2006/relationships" xmlns:p="http://schemas.openxmlformats.org/presentationml/2006/main">
+  <p:cSld>
+    <p:spTree>
+      <p:nvGrpSpPr>
+        <p:cNvPr id="1" name=""/>
+        <p:cNvGrpSpPr/>
+        <p:nvPr/>
+      </p:nvGrpSpPr>
+      <p:grpSpPr>
+        <a:xfrm>
+          <a:off x="0" y="0"/>
+          <a:ext cx="0" cy="0"/>
+          <a:chOff x="0" y="0"/>
+          <a:chExt cx="0" cy="0"/>
+        </a:xfrm>
+      </p:grpSpPr>
+      <p:sp>
+        <p:nvSpPr>
           <p:cNvPr id="6" name="TextBox 5">
             <a:extLst>
               <a:ext uri="{FF2B5EF4-FFF2-40B4-BE49-F238E27FC236}">
@@ -19924,7 +20439,7 @@
 </p:sld>
 </file>
 
-<file path=ppt/slides/slide64.xml><?xml version="1.0" encoding="utf-8"?>
+<file path=ppt/slides/slide66.xml><?xml version="1.0" encoding="utf-8"?>
 <p:sld xmlns:a="http://schemas.openxmlformats.org/drawingml/2006/main" xmlns:r="http://schemas.openxmlformats.org/officeDocument/2006/relationships" xmlns:p="http://schemas.openxmlformats.org/presentationml/2006/main">
   <p:cSld>
     <p:spTree>

</xml_diff>

<commit_message>
Added customer to cycle time
</commit_message>
<xml_diff>
--- a/Measuring Outcome v2 - 2020 update.pptx
+++ b/Measuring Outcome v2 - 2020 update.pptx
@@ -212,7 +212,7 @@
 
 <file path=ppt/commentAuthors.xml><?xml version="1.0" encoding="utf-8"?>
 <p:cmAuthorLst xmlns:a="http://schemas.openxmlformats.org/drawingml/2006/main" xmlns:r="http://schemas.openxmlformats.org/officeDocument/2006/relationships" xmlns:p="http://schemas.openxmlformats.org/presentationml/2006/main">
-  <p:cmAuthor id="1" name="Sjoerd Kranendonk" initials="SK" lastIdx="7" clrIdx="0">
+  <p:cmAuthor id="1" name="Sjoerd Kranendonk" initials="SK" lastIdx="8" clrIdx="0">
     <p:extLst>
       <p:ext uri="{19B8F6BF-5375-455C-9EA6-DF929625EA0E}">
         <p15:presenceInfo xmlns:p15="http://schemas.microsoft.com/office/powerpoint/2012/main" userId="acef0a9426a7f6dc" providerId="Windows Live"/>
@@ -269,6 +269,17 @@
     <p:extLst>
       <p:ext uri="{C676402C-5697-4E1C-873F-D02D1690AC5C}">
         <p15:threadingInfo xmlns:p15="http://schemas.microsoft.com/office/powerpoint/2012/main" timeZoneBias="-60"/>
+      </p:ext>
+    </p:extLst>
+  </p:cm>
+  <p:cm authorId="1" dt="2021-01-03T21:06:19.924" idx="8">
+    <p:pos x="10" y="146"/>
+    <p:text>added 'customer'</p:text>
+    <p:extLst>
+      <p:ext uri="{C676402C-5697-4E1C-873F-D02D1690AC5C}">
+        <p15:threadingInfo xmlns:p15="http://schemas.microsoft.com/office/powerpoint/2012/main" timeZoneBias="-60">
+          <p15:parentCm authorId="1" idx="1"/>
+        </p15:threadingInfo>
       </p:ext>
     </p:extLst>
   </p:cm>
@@ -9693,10 +9704,10 @@
         </p:nvGrpSpPr>
         <p:grpSpPr>
           <a:xfrm>
-            <a:off x="883471" y="1835527"/>
-            <a:ext cx="5792732" cy="1656596"/>
-            <a:chOff x="883470" y="2110622"/>
-            <a:chExt cx="5792732" cy="1656596"/>
+            <a:off x="883471" y="1503334"/>
+            <a:ext cx="5792732" cy="2320981"/>
+            <a:chOff x="883470" y="1446237"/>
+            <a:chExt cx="5792732" cy="2320981"/>
           </a:xfrm>
         </p:grpSpPr>
         <p:sp>
@@ -9713,8 +9724,8 @@
           </p:nvSpPr>
           <p:spPr>
             <a:xfrm>
-              <a:off x="883470" y="2110622"/>
-              <a:ext cx="5792732" cy="861774"/>
+              <a:off x="883470" y="1446237"/>
+              <a:ext cx="5792732" cy="1631216"/>
             </a:xfrm>
             <a:prstGeom prst="rect">
               <a:avLst/>
@@ -9729,13 +9740,34 @@
             <a:p>
               <a:pPr algn="ctr"/>
               <a:r>
+                <a:rPr lang="en-NL" sz="5000" b="1">
+                  <a:solidFill>
+                    <a:schemeClr val="bg1"/>
+                  </a:solidFill>
+                  <a:latin typeface="Ubuntu" panose="020B0504030602030204" pitchFamily="34" charset="0"/>
+                </a:rPr>
+                <a:t>Customer </a:t>
+              </a:r>
+            </a:p>
+            <a:p>
+              <a:pPr algn="ctr"/>
+              <a:r>
+                <a:rPr lang="en-NL" sz="5000" b="1">
+                  <a:solidFill>
+                    <a:schemeClr val="bg1"/>
+                  </a:solidFill>
+                  <a:latin typeface="Ubuntu" panose="020B0504030602030204" pitchFamily="34" charset="0"/>
+                </a:rPr>
+                <a:t>Cycle </a:t>
+              </a:r>
+              <a:r>
                 <a:rPr lang="en-NL" sz="5000" b="1" dirty="0">
                   <a:solidFill>
                     <a:schemeClr val="bg1"/>
                   </a:solidFill>
                   <a:latin typeface="Ubuntu" panose="020B0504030602030204" pitchFamily="34" charset="0"/>
                 </a:rPr>
-                <a:t>Cycle Time</a:t>
+                <a:t>Time</a:t>
               </a:r>
             </a:p>
           </p:txBody>

</xml_diff>

<commit_message>
Updated the cheat sheet based on 2020 update as per issue #12
</commit_message>
<xml_diff>
--- a/Measuring Outcome v2 - 2020 update.pptx
+++ b/Measuring Outcome v2 - 2020 update.pptx
@@ -5,7 +5,7 @@
     <p:sldMasterId id="2147483660" r:id="rId1"/>
   </p:sldMasterIdLst>
   <p:notesMasterIdLst>
-    <p:notesMasterId r:id="rId66"/>
+    <p:notesMasterId r:id="rId67"/>
   </p:notesMasterIdLst>
   <p:sldIdLst>
     <p:sldId id="256" r:id="rId2"/>
@@ -71,38 +71,39 @@
     <p:sldId id="335" r:id="rId62"/>
     <p:sldId id="333" r:id="rId63"/>
     <p:sldId id="356" r:id="rId64"/>
-    <p:sldId id="351" r:id="rId65"/>
+    <p:sldId id="359" r:id="rId65"/>
+    <p:sldId id="351" r:id="rId66"/>
   </p:sldIdLst>
   <p:sldSz cx="7559675" cy="5327650"/>
   <p:notesSz cx="6858000" cy="9144000"/>
   <p:embeddedFontLst>
     <p:embeddedFont>
       <p:font typeface="Calibri" panose="020F0502020204030204" pitchFamily="34" charset="0"/>
-      <p:regular r:id="rId67"/>
-      <p:bold r:id="rId67"/>
-      <p:italic r:id="rId67"/>
-      <p:boldItalic r:id="rId67"/>
+      <p:regular r:id="rId68"/>
+      <p:bold r:id="rId68"/>
+      <p:italic r:id="rId68"/>
+      <p:boldItalic r:id="rId68"/>
     </p:embeddedFont>
     <p:embeddedFont>
       <p:font typeface="Calibri Light" panose="020F0302020204030204" pitchFamily="34" charset="0"/>
-      <p:regular r:id="rId67"/>
-      <p:italic r:id="rId67"/>
+      <p:regular r:id="rId68"/>
+      <p:italic r:id="rId68"/>
     </p:embeddedFont>
     <p:embeddedFont>
       <p:font typeface="Marvel" pitchFamily="2" charset="0"/>
-      <p:regular r:id="rId67"/>
+      <p:regular r:id="rId68"/>
     </p:embeddedFont>
     <p:embeddedFont>
       <p:font typeface="Ubuntu" panose="020B0504030602030204" pitchFamily="34" charset="0"/>
-      <p:regular r:id="rId67"/>
-      <p:bold r:id="rId67"/>
-      <p:italic r:id="rId67"/>
-      <p:boldItalic r:id="rId67"/>
+      <p:regular r:id="rId68"/>
+      <p:bold r:id="rId68"/>
+      <p:italic r:id="rId68"/>
+      <p:boldItalic r:id="rId68"/>
     </p:embeddedFont>
     <p:embeddedFont>
       <p:font typeface="Ubuntu Light" panose="020B0304030602030204" pitchFamily="34" charset="0"/>
-      <p:regular r:id="rId67"/>
-      <p:italic r:id="rId67"/>
+      <p:regular r:id="rId68"/>
+      <p:italic r:id="rId68"/>
     </p:embeddedFont>
   </p:embeddedFontLst>
   <p:defaultTextStyle>
@@ -940,6 +941,90 @@
     <p:extLst>
       <p:ext uri="{BB962C8B-B14F-4D97-AF65-F5344CB8AC3E}">
         <p14:creationId xmlns:p14="http://schemas.microsoft.com/office/powerpoint/2010/main" val="855045261"/>
+      </p:ext>
+    </p:extLst>
+  </p:cSld>
+  <p:clrMapOvr>
+    <a:masterClrMapping/>
+  </p:clrMapOvr>
+</p:notes>
+</file>
+
+<file path=ppt/notesSlides/notesSlide4.xml><?xml version="1.0" encoding="utf-8"?>
+<p:notes xmlns:a="http://schemas.openxmlformats.org/drawingml/2006/main" xmlns:r="http://schemas.openxmlformats.org/officeDocument/2006/relationships" xmlns:p="http://schemas.openxmlformats.org/presentationml/2006/main">
+  <p:cSld>
+    <p:spTree>
+      <p:nvGrpSpPr>
+        <p:cNvPr id="1" name=""/>
+        <p:cNvGrpSpPr/>
+        <p:nvPr/>
+      </p:nvGrpSpPr>
+      <p:grpSpPr>
+        <a:xfrm>
+          <a:off x="0" y="0"/>
+          <a:ext cx="0" cy="0"/>
+          <a:chOff x="0" y="0"/>
+          <a:chExt cx="0" cy="0"/>
+        </a:xfrm>
+      </p:grpSpPr>
+      <p:sp>
+        <p:nvSpPr>
+          <p:cNvPr id="2" name="Slide Image Placeholder 1"/>
+          <p:cNvSpPr>
+            <a:spLocks noGrp="1" noRot="1" noChangeAspect="1"/>
+          </p:cNvSpPr>
+          <p:nvPr>
+            <p:ph type="sldImg"/>
+          </p:nvPr>
+        </p:nvSpPr>
+        <p:spPr/>
+      </p:sp>
+      <p:sp>
+        <p:nvSpPr>
+          <p:cNvPr id="3" name="Notes Placeholder 2"/>
+          <p:cNvSpPr>
+            <a:spLocks noGrp="1"/>
+          </p:cNvSpPr>
+          <p:nvPr>
+            <p:ph type="body" idx="1"/>
+          </p:nvPr>
+        </p:nvSpPr>
+        <p:spPr/>
+        <p:txBody>
+          <a:bodyPr/>
+          <a:lstStyle/>
+          <a:p>
+            <a:endParaRPr lang="en-NL" dirty="0"/>
+          </a:p>
+        </p:txBody>
+      </p:sp>
+      <p:sp>
+        <p:nvSpPr>
+          <p:cNvPr id="4" name="Slide Number Placeholder 3"/>
+          <p:cNvSpPr>
+            <a:spLocks noGrp="1"/>
+          </p:cNvSpPr>
+          <p:nvPr>
+            <p:ph type="sldNum" sz="quarter" idx="5"/>
+          </p:nvPr>
+        </p:nvSpPr>
+        <p:spPr/>
+        <p:txBody>
+          <a:bodyPr/>
+          <a:lstStyle/>
+          <a:p>
+            <a:fld id="{240114D0-54EC-2541-891C-414F49E4331F}" type="slidenum">
+              <a:rPr lang="en-NL" smtClean="0"/>
+              <a:t>64</a:t>
+            </a:fld>
+            <a:endParaRPr lang="en-NL"/>
+          </a:p>
+        </p:txBody>
+      </p:sp>
+    </p:spTree>
+    <p:extLst>
+      <p:ext uri="{BB962C8B-B14F-4D97-AF65-F5344CB8AC3E}">
+        <p14:creationId xmlns:p14="http://schemas.microsoft.com/office/powerpoint/2010/main" val="3488779904"/>
       </p:ext>
     </p:extLst>
   </p:cSld>
@@ -19872,6 +19957,297 @@
 </file>
 
 <file path=ppt/slides/slide64.xml><?xml version="1.0" encoding="utf-8"?>
+<p:sld xmlns:a="http://schemas.openxmlformats.org/drawingml/2006/main" xmlns:r="http://schemas.openxmlformats.org/officeDocument/2006/relationships" xmlns:p="http://schemas.openxmlformats.org/presentationml/2006/main">
+  <p:cSld>
+    <p:spTree>
+      <p:nvGrpSpPr>
+        <p:cNvPr id="1" name=""/>
+        <p:cNvGrpSpPr/>
+        <p:nvPr/>
+      </p:nvGrpSpPr>
+      <p:grpSpPr>
+        <a:xfrm>
+          <a:off x="0" y="0"/>
+          <a:ext cx="0" cy="0"/>
+          <a:chOff x="0" y="0"/>
+          <a:chExt cx="0" cy="0"/>
+        </a:xfrm>
+      </p:grpSpPr>
+      <p:sp>
+        <p:nvSpPr>
+          <p:cNvPr id="6" name="TextBox 5">
+            <a:extLst>
+              <a:ext uri="{FF2B5EF4-FFF2-40B4-BE49-F238E27FC236}">
+                <a16:creationId xmlns:a16="http://schemas.microsoft.com/office/drawing/2014/main" id="{009EAD6C-D563-D744-AFCA-AE8CA95E6630}"/>
+              </a:ext>
+            </a:extLst>
+          </p:cNvPr>
+          <p:cNvSpPr txBox="1"/>
+          <p:nvPr/>
+        </p:nvSpPr>
+        <p:spPr>
+          <a:xfrm>
+            <a:off x="571688" y="173949"/>
+            <a:ext cx="6416298" cy="400110"/>
+          </a:xfrm>
+          <a:prstGeom prst="rect">
+            <a:avLst/>
+          </a:prstGeom>
+          <a:noFill/>
+        </p:spPr>
+        <p:txBody>
+          <a:bodyPr wrap="square" rtlCol="0">
+            <a:spAutoFit/>
+          </a:bodyPr>
+          <a:lstStyle/>
+          <a:p>
+            <a:pPr algn="ctr"/>
+            <a:r>
+              <a:rPr lang="en-NL" sz="2000" b="1" dirty="0">
+                <a:latin typeface="Ubuntu" panose="020B0504030602030204" pitchFamily="34" charset="0"/>
+              </a:rPr>
+              <a:t>EBM Example Key Value Measures cheat sheet</a:t>
+            </a:r>
+            <a:endParaRPr lang="en-NL" sz="2000" dirty="0">
+              <a:latin typeface="Ubuntu" panose="020B0504030602030204" pitchFamily="34" charset="0"/>
+            </a:endParaRPr>
+          </a:p>
+        </p:txBody>
+      </p:sp>
+      <p:sp>
+        <p:nvSpPr>
+          <p:cNvPr id="8" name="TextBox 7">
+            <a:extLst>
+              <a:ext uri="{FF2B5EF4-FFF2-40B4-BE49-F238E27FC236}">
+                <a16:creationId xmlns:a16="http://schemas.microsoft.com/office/drawing/2014/main" id="{CBB6441C-A641-EE43-B9CA-553BCAFDDCAF}"/>
+              </a:ext>
+            </a:extLst>
+          </p:cNvPr>
+          <p:cNvSpPr txBox="1"/>
+          <p:nvPr/>
+        </p:nvSpPr>
+        <p:spPr>
+          <a:xfrm>
+            <a:off x="3501215" y="4821023"/>
+            <a:ext cx="3810078" cy="200055"/>
+          </a:xfrm>
+          <a:prstGeom prst="rect">
+            <a:avLst/>
+          </a:prstGeom>
+          <a:noFill/>
+        </p:spPr>
+        <p:txBody>
+          <a:bodyPr wrap="square" rtlCol="0">
+            <a:spAutoFit/>
+          </a:bodyPr>
+          <a:lstStyle/>
+          <a:p>
+            <a:pPr algn="r"/>
+            <a:r>
+              <a:rPr lang="en-NL" sz="700" dirty="0">
+                <a:solidFill>
+                  <a:schemeClr val="bg1">
+                    <a:lumMod val="65000"/>
+                  </a:schemeClr>
+                </a:solidFill>
+                <a:latin typeface="Ubuntu" panose="020B0504030602030204" pitchFamily="34" charset="0"/>
+              </a:rPr>
+              <a:t>Source: EBM guide 2020, http://scrum.org/EBM</a:t>
+            </a:r>
+          </a:p>
+        </p:txBody>
+      </p:sp>
+      <p:pic>
+        <p:nvPicPr>
+          <p:cNvPr id="2" name="Picture 1">
+            <a:extLst>
+              <a:ext uri="{FF2B5EF4-FFF2-40B4-BE49-F238E27FC236}">
+                <a16:creationId xmlns:a16="http://schemas.microsoft.com/office/drawing/2014/main" id="{98D7C774-BF2E-CC4D-BF85-02ACACF240A5}"/>
+              </a:ext>
+            </a:extLst>
+          </p:cNvPr>
+          <p:cNvPicPr>
+            <a:picLocks noChangeAspect="1"/>
+          </p:cNvPicPr>
+          <p:nvPr/>
+        </p:nvPicPr>
+        <p:blipFill>
+          <a:blip r:embed="rId3"/>
+          <a:stretch>
+            <a:fillRect/>
+          </a:stretch>
+        </p:blipFill>
+        <p:spPr>
+          <a:xfrm>
+            <a:off x="105196" y="608420"/>
+            <a:ext cx="2470989" cy="1467150"/>
+          </a:xfrm>
+          <a:prstGeom prst="rect">
+            <a:avLst/>
+          </a:prstGeom>
+        </p:spPr>
+      </p:pic>
+      <p:pic>
+        <p:nvPicPr>
+          <p:cNvPr id="3" name="Picture 2">
+            <a:extLst>
+              <a:ext uri="{FF2B5EF4-FFF2-40B4-BE49-F238E27FC236}">
+                <a16:creationId xmlns:a16="http://schemas.microsoft.com/office/drawing/2014/main" id="{E7304A80-7961-AE46-9A97-8B282091533D}"/>
+              </a:ext>
+            </a:extLst>
+          </p:cNvPr>
+          <p:cNvPicPr>
+            <a:picLocks noChangeAspect="1"/>
+          </p:cNvPicPr>
+          <p:nvPr/>
+        </p:nvPicPr>
+        <p:blipFill rotWithShape="1">
+          <a:blip r:embed="rId4"/>
+          <a:srcRect/>
+          <a:stretch/>
+        </p:blipFill>
+        <p:spPr>
+          <a:xfrm>
+            <a:off x="105195" y="2104911"/>
+            <a:ext cx="2470989" cy="1077019"/>
+          </a:xfrm>
+          <a:prstGeom prst="rect">
+            <a:avLst/>
+          </a:prstGeom>
+        </p:spPr>
+      </p:pic>
+      <p:pic>
+        <p:nvPicPr>
+          <p:cNvPr id="4" name="Picture 3">
+            <a:extLst>
+              <a:ext uri="{FF2B5EF4-FFF2-40B4-BE49-F238E27FC236}">
+                <a16:creationId xmlns:a16="http://schemas.microsoft.com/office/drawing/2014/main" id="{612791FE-02B2-E845-A5C1-033DD92A85C0}"/>
+              </a:ext>
+            </a:extLst>
+          </p:cNvPr>
+          <p:cNvPicPr>
+            <a:picLocks noChangeAspect="1"/>
+          </p:cNvPicPr>
+          <p:nvPr/>
+        </p:nvPicPr>
+        <p:blipFill>
+          <a:blip r:embed="rId5"/>
+          <a:stretch>
+            <a:fillRect/>
+          </a:stretch>
+        </p:blipFill>
+        <p:spPr>
+          <a:xfrm>
+            <a:off x="2576185" y="603400"/>
+            <a:ext cx="2470989" cy="3458558"/>
+          </a:xfrm>
+          <a:prstGeom prst="rect">
+            <a:avLst/>
+          </a:prstGeom>
+        </p:spPr>
+      </p:pic>
+      <p:pic>
+        <p:nvPicPr>
+          <p:cNvPr id="5" name="Picture 4">
+            <a:extLst>
+              <a:ext uri="{FF2B5EF4-FFF2-40B4-BE49-F238E27FC236}">
+                <a16:creationId xmlns:a16="http://schemas.microsoft.com/office/drawing/2014/main" id="{B25B9DC0-E698-B44B-9BD1-7DF86B3BB8C6}"/>
+              </a:ext>
+            </a:extLst>
+          </p:cNvPr>
+          <p:cNvPicPr>
+            <a:picLocks noChangeAspect="1"/>
+          </p:cNvPicPr>
+          <p:nvPr/>
+        </p:nvPicPr>
+        <p:blipFill rotWithShape="1">
+          <a:blip r:embed="rId6"/>
+          <a:srcRect t="2737"/>
+          <a:stretch/>
+        </p:blipFill>
+        <p:spPr>
+          <a:xfrm>
+            <a:off x="2576185" y="4014320"/>
+            <a:ext cx="2470990" cy="896230"/>
+          </a:xfrm>
+          <a:prstGeom prst="rect">
+            <a:avLst/>
+          </a:prstGeom>
+        </p:spPr>
+      </p:pic>
+      <p:pic>
+        <p:nvPicPr>
+          <p:cNvPr id="7" name="Picture 6">
+            <a:extLst>
+              <a:ext uri="{FF2B5EF4-FFF2-40B4-BE49-F238E27FC236}">
+                <a16:creationId xmlns:a16="http://schemas.microsoft.com/office/drawing/2014/main" id="{C69F27A3-6639-C149-A1C8-2FBC23880A79}"/>
+              </a:ext>
+            </a:extLst>
+          </p:cNvPr>
+          <p:cNvPicPr>
+            <a:picLocks noChangeAspect="1"/>
+          </p:cNvPicPr>
+          <p:nvPr/>
+        </p:nvPicPr>
+        <p:blipFill>
+          <a:blip r:embed="rId7"/>
+          <a:stretch>
+            <a:fillRect/>
+          </a:stretch>
+        </p:blipFill>
+        <p:spPr>
+          <a:xfrm>
+            <a:off x="5047173" y="591357"/>
+            <a:ext cx="2407306" cy="2319037"/>
+          </a:xfrm>
+          <a:prstGeom prst="rect">
+            <a:avLst/>
+          </a:prstGeom>
+        </p:spPr>
+      </p:pic>
+      <p:pic>
+        <p:nvPicPr>
+          <p:cNvPr id="10" name="Picture 9">
+            <a:extLst>
+              <a:ext uri="{FF2B5EF4-FFF2-40B4-BE49-F238E27FC236}">
+                <a16:creationId xmlns:a16="http://schemas.microsoft.com/office/drawing/2014/main" id="{5665FA40-5696-9548-A234-DD32383B8FD2}"/>
+              </a:ext>
+            </a:extLst>
+          </p:cNvPr>
+          <p:cNvPicPr>
+            <a:picLocks noChangeAspect="1"/>
+          </p:cNvPicPr>
+          <p:nvPr/>
+        </p:nvPicPr>
+        <p:blipFill rotWithShape="1">
+          <a:blip r:embed="rId8"/>
+          <a:srcRect t="2357"/>
+          <a:stretch/>
+        </p:blipFill>
+        <p:spPr>
+          <a:xfrm>
+            <a:off x="5055312" y="2888363"/>
+            <a:ext cx="2399168" cy="1640223"/>
+          </a:xfrm>
+          <a:prstGeom prst="rect">
+            <a:avLst/>
+          </a:prstGeom>
+        </p:spPr>
+      </p:pic>
+    </p:spTree>
+    <p:extLst>
+      <p:ext uri="{BB962C8B-B14F-4D97-AF65-F5344CB8AC3E}">
+        <p14:creationId xmlns:p14="http://schemas.microsoft.com/office/powerpoint/2010/main" val="2915057737"/>
+      </p:ext>
+    </p:extLst>
+  </p:cSld>
+  <p:clrMapOvr>
+    <a:masterClrMapping/>
+  </p:clrMapOvr>
+</p:sld>
+</file>
+
+<file path=ppt/slides/slide65.xml><?xml version="1.0" encoding="utf-8"?>
 <p:sld xmlns:a="http://schemas.openxmlformats.org/drawingml/2006/main" xmlns:r="http://schemas.openxmlformats.org/officeDocument/2006/relationships" xmlns:p="http://schemas.openxmlformats.org/presentationml/2006/main">
   <p:cSld>
     <p:spTree>

</xml_diff>

<commit_message>
added Time to Restore Service & Deployment Frequency (Puprple cards) bringing total purple to 15
</commit_message>
<xml_diff>
--- a/Measuring Outcome v2 - 2020 update.pptx
+++ b/Measuring Outcome v2 - 2020 update.pptx
@@ -5,7 +5,7 @@
     <p:sldMasterId id="2147483660" r:id="rId1"/>
   </p:sldMasterIdLst>
   <p:notesMasterIdLst>
-    <p:notesMasterId r:id="rId76"/>
+    <p:notesMasterId r:id="rId80"/>
   </p:notesMasterIdLst>
   <p:sldIdLst>
     <p:sldId id="256" r:id="rId2"/>
@@ -64,55 +64,59 @@
     <p:sldId id="342" r:id="rId55"/>
     <p:sldId id="343" r:id="rId56"/>
     <p:sldId id="344" r:id="rId57"/>
-    <p:sldId id="352" r:id="rId58"/>
-    <p:sldId id="353" r:id="rId59"/>
-    <p:sldId id="354" r:id="rId60"/>
-    <p:sldId id="355" r:id="rId61"/>
-    <p:sldId id="357" r:id="rId62"/>
-    <p:sldId id="358" r:id="rId63"/>
-    <p:sldId id="345" r:id="rId64"/>
-    <p:sldId id="346" r:id="rId65"/>
-    <p:sldId id="347" r:id="rId66"/>
-    <p:sldId id="348" r:id="rId67"/>
-    <p:sldId id="328" r:id="rId68"/>
-    <p:sldId id="329" r:id="rId69"/>
-    <p:sldId id="334" r:id="rId70"/>
-    <p:sldId id="331" r:id="rId71"/>
-    <p:sldId id="335" r:id="rId72"/>
-    <p:sldId id="333" r:id="rId73"/>
-    <p:sldId id="359" r:id="rId74"/>
-    <p:sldId id="351" r:id="rId75"/>
+    <p:sldId id="372" r:id="rId58"/>
+    <p:sldId id="373" r:id="rId59"/>
+    <p:sldId id="370" r:id="rId60"/>
+    <p:sldId id="371" r:id="rId61"/>
+    <p:sldId id="352" r:id="rId62"/>
+    <p:sldId id="353" r:id="rId63"/>
+    <p:sldId id="354" r:id="rId64"/>
+    <p:sldId id="355" r:id="rId65"/>
+    <p:sldId id="357" r:id="rId66"/>
+    <p:sldId id="358" r:id="rId67"/>
+    <p:sldId id="345" r:id="rId68"/>
+    <p:sldId id="346" r:id="rId69"/>
+    <p:sldId id="347" r:id="rId70"/>
+    <p:sldId id="348" r:id="rId71"/>
+    <p:sldId id="328" r:id="rId72"/>
+    <p:sldId id="329" r:id="rId73"/>
+    <p:sldId id="334" r:id="rId74"/>
+    <p:sldId id="331" r:id="rId75"/>
+    <p:sldId id="335" r:id="rId76"/>
+    <p:sldId id="333" r:id="rId77"/>
+    <p:sldId id="359" r:id="rId78"/>
+    <p:sldId id="351" r:id="rId79"/>
   </p:sldIdLst>
   <p:sldSz cx="7559675" cy="5327650"/>
   <p:notesSz cx="6858000" cy="9144000"/>
   <p:embeddedFontLst>
     <p:embeddedFont>
       <p:font typeface="Calibri" panose="020F0502020204030204" pitchFamily="34" charset="0"/>
-      <p:regular r:id="rId77"/>
-      <p:bold r:id="rId77"/>
-      <p:italic r:id="rId77"/>
-      <p:boldItalic r:id="rId77"/>
+      <p:regular r:id="rId81"/>
+      <p:bold r:id="rId81"/>
+      <p:italic r:id="rId81"/>
+      <p:boldItalic r:id="rId81"/>
     </p:embeddedFont>
     <p:embeddedFont>
       <p:font typeface="Calibri Light" panose="020F0302020204030204" pitchFamily="34" charset="0"/>
-      <p:regular r:id="rId77"/>
-      <p:italic r:id="rId77"/>
+      <p:regular r:id="rId81"/>
+      <p:italic r:id="rId81"/>
     </p:embeddedFont>
     <p:embeddedFont>
       <p:font typeface="Marvel" pitchFamily="2" charset="0"/>
-      <p:regular r:id="rId77"/>
+      <p:regular r:id="rId81"/>
     </p:embeddedFont>
     <p:embeddedFont>
       <p:font typeface="Ubuntu" panose="020B0504030602030204" pitchFamily="34" charset="0"/>
-      <p:regular r:id="rId77"/>
-      <p:bold r:id="rId77"/>
-      <p:italic r:id="rId77"/>
-      <p:boldItalic r:id="rId77"/>
+      <p:regular r:id="rId81"/>
+      <p:bold r:id="rId81"/>
+      <p:italic r:id="rId81"/>
+      <p:boldItalic r:id="rId81"/>
     </p:embeddedFont>
     <p:embeddedFont>
       <p:font typeface="Ubuntu Light" panose="020B0304030602030204" pitchFamily="34" charset="0"/>
-      <p:regular r:id="rId77"/>
-      <p:italic r:id="rId77"/>
+      <p:regular r:id="rId81"/>
+      <p:italic r:id="rId81"/>
     </p:embeddedFont>
   </p:embeddedFontLst>
   <p:defaultTextStyle>
@@ -1024,7 +1028,7 @@
           <a:p>
             <a:fld id="{240114D0-54EC-2541-891C-414F49E4331F}" type="slidenum">
               <a:rPr lang="en-NL" smtClean="0"/>
-              <a:t>73</a:t>
+              <a:t>77</a:t>
             </a:fld>
             <a:endParaRPr lang="en-NL"/>
           </a:p>
@@ -9243,23 +9247,8 @@
                   </a:solidFill>
                   <a:latin typeface="Ubuntu" panose="020B0504030602030204" pitchFamily="34" charset="0"/>
                 </a:rPr>
-                <a:t>Time </a:t>
+                <a:t>Time to Pivot</a:t>
               </a:r>
-              <a:r>
-                <a:rPr lang="en-NL" sz="5000" b="1">
-                  <a:solidFill>
-                    <a:schemeClr val="bg1"/>
-                  </a:solidFill>
-                  <a:latin typeface="Ubuntu" panose="020B0504030602030204" pitchFamily="34" charset="0"/>
-                </a:rPr>
-                <a:t>to Pivot</a:t>
-              </a:r>
-              <a:endParaRPr lang="en-NL" sz="5000" b="1" dirty="0">
-                <a:solidFill>
-                  <a:schemeClr val="bg1"/>
-                </a:solidFill>
-                <a:latin typeface="Ubuntu" panose="020B0504030602030204" pitchFamily="34" charset="0"/>
-              </a:endParaRPr>
             </a:p>
           </p:txBody>
         </p:sp>
@@ -18829,6 +18818,489 @@
             <a:p>
               <a:pPr algn="ctr"/>
               <a:r>
+                <a:rPr lang="en-GB" sz="5000" b="1" dirty="0">
+                  <a:solidFill>
+                    <a:schemeClr val="bg1"/>
+                  </a:solidFill>
+                  <a:latin typeface="Ubuntu" panose="020B0504030602030204" pitchFamily="34" charset="0"/>
+                </a:rPr>
+                <a:t> Deployment Frequency</a:t>
+              </a:r>
+              <a:endParaRPr lang="en-NL" sz="5000" b="1" dirty="0">
+                <a:solidFill>
+                  <a:schemeClr val="bg1"/>
+                </a:solidFill>
+                <a:latin typeface="Ubuntu" panose="020B0504030602030204" pitchFamily="34" charset="0"/>
+              </a:endParaRPr>
+            </a:p>
+          </p:txBody>
+        </p:sp>
+        <p:sp>
+          <p:nvSpPr>
+            <p:cNvPr id="10" name="Oval 9">
+              <a:extLst>
+                <a:ext uri="{FF2B5EF4-FFF2-40B4-BE49-F238E27FC236}">
+                  <a16:creationId xmlns:a16="http://schemas.microsoft.com/office/drawing/2014/main" id="{4A3FB51E-232C-6746-A6BB-CCD934EE62FA}"/>
+                </a:ext>
+              </a:extLst>
+            </p:cNvPr>
+            <p:cNvSpPr/>
+            <p:nvPr/>
+          </p:nvSpPr>
+          <p:spPr>
+            <a:xfrm>
+              <a:off x="3068663" y="3292524"/>
+              <a:ext cx="364210" cy="364147"/>
+            </a:xfrm>
+            <a:prstGeom prst="ellipse">
+              <a:avLst/>
+            </a:prstGeom>
+            <a:solidFill>
+              <a:schemeClr val="bg1"/>
+            </a:solidFill>
+            <a:ln>
+              <a:solidFill>
+                <a:schemeClr val="bg1"/>
+              </a:solidFill>
+            </a:ln>
+          </p:spPr>
+          <p:style>
+            <a:lnRef idx="2">
+              <a:schemeClr val="accent1">
+                <a:shade val="50000"/>
+              </a:schemeClr>
+            </a:lnRef>
+            <a:fillRef idx="1">
+              <a:schemeClr val="accent1"/>
+            </a:fillRef>
+            <a:effectRef idx="0">
+              <a:schemeClr val="accent1"/>
+            </a:effectRef>
+            <a:fontRef idx="minor">
+              <a:schemeClr val="lt1"/>
+            </a:fontRef>
+          </p:style>
+          <p:txBody>
+            <a:bodyPr rtlCol="0" anchor="ctr"/>
+            <a:lstStyle/>
+            <a:p>
+              <a:pPr algn="ctr"/>
+              <a:endParaRPr lang="en-NL"/>
+            </a:p>
+          </p:txBody>
+        </p:sp>
+        <p:sp>
+          <p:nvSpPr>
+            <p:cNvPr id="11" name="Oval 10">
+              <a:extLst>
+                <a:ext uri="{FF2B5EF4-FFF2-40B4-BE49-F238E27FC236}">
+                  <a16:creationId xmlns:a16="http://schemas.microsoft.com/office/drawing/2014/main" id="{0E67C4F7-76EC-A04E-8A10-797FFFCB7E0A}"/>
+                </a:ext>
+              </a:extLst>
+            </p:cNvPr>
+            <p:cNvSpPr/>
+            <p:nvPr/>
+          </p:nvSpPr>
+          <p:spPr>
+            <a:xfrm>
+              <a:off x="3496992" y="3292523"/>
+              <a:ext cx="364210" cy="364147"/>
+            </a:xfrm>
+            <a:prstGeom prst="ellipse">
+              <a:avLst/>
+            </a:prstGeom>
+            <a:solidFill>
+              <a:schemeClr val="bg1"/>
+            </a:solidFill>
+            <a:ln>
+              <a:solidFill>
+                <a:schemeClr val="bg1"/>
+              </a:solidFill>
+            </a:ln>
+          </p:spPr>
+          <p:style>
+            <a:lnRef idx="2">
+              <a:schemeClr val="accent1">
+                <a:shade val="50000"/>
+              </a:schemeClr>
+            </a:lnRef>
+            <a:fillRef idx="1">
+              <a:schemeClr val="accent1"/>
+            </a:fillRef>
+            <a:effectRef idx="0">
+              <a:schemeClr val="accent1"/>
+            </a:effectRef>
+            <a:fontRef idx="minor">
+              <a:schemeClr val="lt1"/>
+            </a:fontRef>
+          </p:style>
+          <p:txBody>
+            <a:bodyPr rtlCol="0" anchor="ctr"/>
+            <a:lstStyle/>
+            <a:p>
+              <a:pPr algn="ctr"/>
+              <a:endParaRPr lang="en-NL"/>
+            </a:p>
+          </p:txBody>
+        </p:sp>
+        <p:sp>
+          <p:nvSpPr>
+            <p:cNvPr id="12" name="Oval 11">
+              <a:extLst>
+                <a:ext uri="{FF2B5EF4-FFF2-40B4-BE49-F238E27FC236}">
+                  <a16:creationId xmlns:a16="http://schemas.microsoft.com/office/drawing/2014/main" id="{30BF99AA-F8D9-AC4D-9A99-9E4974F1978C}"/>
+                </a:ext>
+              </a:extLst>
+            </p:cNvPr>
+            <p:cNvSpPr/>
+            <p:nvPr/>
+          </p:nvSpPr>
+          <p:spPr>
+            <a:xfrm>
+              <a:off x="3925321" y="3292522"/>
+              <a:ext cx="364210" cy="364147"/>
+            </a:xfrm>
+            <a:prstGeom prst="ellipse">
+              <a:avLst/>
+            </a:prstGeom>
+            <a:solidFill>
+              <a:schemeClr val="bg1"/>
+            </a:solidFill>
+            <a:ln>
+              <a:solidFill>
+                <a:schemeClr val="bg1"/>
+              </a:solidFill>
+            </a:ln>
+          </p:spPr>
+          <p:style>
+            <a:lnRef idx="2">
+              <a:schemeClr val="accent1">
+                <a:shade val="50000"/>
+              </a:schemeClr>
+            </a:lnRef>
+            <a:fillRef idx="1">
+              <a:schemeClr val="accent1"/>
+            </a:fillRef>
+            <a:effectRef idx="0">
+              <a:schemeClr val="accent1"/>
+            </a:effectRef>
+            <a:fontRef idx="minor">
+              <a:schemeClr val="lt1"/>
+            </a:fontRef>
+          </p:style>
+          <p:txBody>
+            <a:bodyPr rtlCol="0" anchor="ctr"/>
+            <a:lstStyle/>
+            <a:p>
+              <a:pPr algn="ctr"/>
+              <a:endParaRPr lang="en-NL"/>
+            </a:p>
+          </p:txBody>
+        </p:sp>
+      </p:grpSp>
+    </p:spTree>
+    <p:extLst>
+      <p:ext uri="{BB962C8B-B14F-4D97-AF65-F5344CB8AC3E}">
+        <p14:creationId xmlns:p14="http://schemas.microsoft.com/office/powerpoint/2010/main" val="2662571805"/>
+      </p:ext>
+    </p:extLst>
+  </p:cSld>
+  <p:clrMapOvr>
+    <a:masterClrMapping/>
+  </p:clrMapOvr>
+</p:sld>
+</file>
+
+<file path=ppt/slides/slide58.xml><?xml version="1.0" encoding="utf-8"?>
+<p:sld xmlns:a="http://schemas.openxmlformats.org/drawingml/2006/main" xmlns:r="http://schemas.openxmlformats.org/officeDocument/2006/relationships" xmlns:p="http://schemas.openxmlformats.org/presentationml/2006/main">
+  <p:cSld>
+    <p:spTree>
+      <p:nvGrpSpPr>
+        <p:cNvPr id="1" name=""/>
+        <p:cNvGrpSpPr/>
+        <p:nvPr/>
+      </p:nvGrpSpPr>
+      <p:grpSpPr>
+        <a:xfrm>
+          <a:off x="0" y="0"/>
+          <a:ext cx="0" cy="0"/>
+          <a:chOff x="0" y="0"/>
+          <a:chExt cx="0" cy="0"/>
+        </a:xfrm>
+      </p:grpSpPr>
+      <p:sp>
+        <p:nvSpPr>
+          <p:cNvPr id="2" name="Title 1">
+            <a:extLst>
+              <a:ext uri="{FF2B5EF4-FFF2-40B4-BE49-F238E27FC236}">
+                <a16:creationId xmlns:a16="http://schemas.microsoft.com/office/drawing/2014/main" id="{CFCDF3DA-1D3D-E743-8E21-6B353B4D96A4}"/>
+              </a:ext>
+            </a:extLst>
+          </p:cNvPr>
+          <p:cNvSpPr>
+            <a:spLocks noGrp="1"/>
+          </p:cNvSpPr>
+          <p:nvPr>
+            <p:ph type="title"/>
+          </p:nvPr>
+        </p:nvSpPr>
+        <p:spPr/>
+        <p:txBody>
+          <a:bodyPr/>
+          <a:lstStyle/>
+          <a:p>
+            <a:endParaRPr lang="en-NL"/>
+          </a:p>
+        </p:txBody>
+      </p:sp>
+      <p:sp>
+        <p:nvSpPr>
+          <p:cNvPr id="3" name="Content Placeholder 2">
+            <a:extLst>
+              <a:ext uri="{FF2B5EF4-FFF2-40B4-BE49-F238E27FC236}">
+                <a16:creationId xmlns:a16="http://schemas.microsoft.com/office/drawing/2014/main" id="{40A525DA-CA85-AD48-8A85-52A75E1E5317}"/>
+              </a:ext>
+            </a:extLst>
+          </p:cNvPr>
+          <p:cNvSpPr>
+            <a:spLocks noGrp="1"/>
+          </p:cNvSpPr>
+          <p:nvPr>
+            <p:ph idx="1"/>
+          </p:nvPr>
+        </p:nvSpPr>
+        <p:spPr/>
+        <p:txBody>
+          <a:bodyPr/>
+          <a:lstStyle/>
+          <a:p>
+            <a:endParaRPr lang="en-NL"/>
+          </a:p>
+        </p:txBody>
+      </p:sp>
+      <p:sp>
+        <p:nvSpPr>
+          <p:cNvPr id="4" name="Rounded Rectangle 3">
+            <a:extLst>
+              <a:ext uri="{FF2B5EF4-FFF2-40B4-BE49-F238E27FC236}">
+                <a16:creationId xmlns:a16="http://schemas.microsoft.com/office/drawing/2014/main" id="{6B890BB6-3544-1A4E-A833-93135A597BB4}"/>
+              </a:ext>
+            </a:extLst>
+          </p:cNvPr>
+          <p:cNvSpPr/>
+          <p:nvPr/>
+        </p:nvSpPr>
+        <p:spPr>
+          <a:xfrm>
+            <a:off x="0" y="0"/>
+            <a:ext cx="7559675" cy="5327650"/>
+          </a:xfrm>
+          <a:prstGeom prst="roundRect">
+            <a:avLst>
+              <a:gd name="adj" fmla="val 0"/>
+            </a:avLst>
+          </a:prstGeom>
+          <a:blipFill>
+            <a:blip r:embed="rId2"/>
+            <a:stretch>
+              <a:fillRect/>
+            </a:stretch>
+          </a:blipFill>
+          <a:ln>
+            <a:solidFill>
+              <a:schemeClr val="bg2"/>
+            </a:solidFill>
+          </a:ln>
+        </p:spPr>
+        <p:style>
+          <a:lnRef idx="2">
+            <a:schemeClr val="accent1">
+              <a:shade val="50000"/>
+            </a:schemeClr>
+          </a:lnRef>
+          <a:fillRef idx="1">
+            <a:schemeClr val="accent1"/>
+          </a:fillRef>
+          <a:effectRef idx="0">
+            <a:schemeClr val="accent1"/>
+          </a:effectRef>
+          <a:fontRef idx="minor">
+            <a:schemeClr val="lt1"/>
+          </a:fontRef>
+        </p:style>
+        <p:txBody>
+          <a:bodyPr rtlCol="0" anchor="ctr"/>
+          <a:lstStyle/>
+          <a:p>
+            <a:pPr algn="ctr"/>
+            <a:endParaRPr lang="en-NL"/>
+          </a:p>
+        </p:txBody>
+      </p:sp>
+      <p:pic>
+        <p:nvPicPr>
+          <p:cNvPr id="5" name="Picture 4" descr="A picture containing food, drawing&#10;&#10;Description automatically generated">
+            <a:extLst>
+              <a:ext uri="{FF2B5EF4-FFF2-40B4-BE49-F238E27FC236}">
+                <a16:creationId xmlns:a16="http://schemas.microsoft.com/office/drawing/2014/main" id="{27611709-3190-2A4B-BCE4-4D329000A8EB}"/>
+              </a:ext>
+            </a:extLst>
+          </p:cNvPr>
+          <p:cNvPicPr>
+            <a:picLocks noChangeAspect="1"/>
+          </p:cNvPicPr>
+          <p:nvPr/>
+        </p:nvPicPr>
+        <p:blipFill>
+          <a:blip r:embed="rId3"/>
+          <a:stretch>
+            <a:fillRect/>
+          </a:stretch>
+        </p:blipFill>
+        <p:spPr>
+          <a:xfrm>
+            <a:off x="350837" y="-765175"/>
+            <a:ext cx="6858000" cy="6858000"/>
+          </a:xfrm>
+          <a:prstGeom prst="rect">
+            <a:avLst/>
+          </a:prstGeom>
+        </p:spPr>
+      </p:pic>
+    </p:spTree>
+    <p:extLst>
+      <p:ext uri="{BB962C8B-B14F-4D97-AF65-F5344CB8AC3E}">
+        <p14:creationId xmlns:p14="http://schemas.microsoft.com/office/powerpoint/2010/main" val="3604512744"/>
+      </p:ext>
+    </p:extLst>
+  </p:cSld>
+  <p:clrMapOvr>
+    <a:masterClrMapping/>
+  </p:clrMapOvr>
+</p:sld>
+</file>
+
+<file path=ppt/slides/slide59.xml><?xml version="1.0" encoding="utf-8"?>
+<p:sld xmlns:a="http://schemas.openxmlformats.org/drawingml/2006/main" xmlns:r="http://schemas.openxmlformats.org/officeDocument/2006/relationships" xmlns:p="http://schemas.openxmlformats.org/presentationml/2006/main">
+  <p:cSld>
+    <p:spTree>
+      <p:nvGrpSpPr>
+        <p:cNvPr id="1" name=""/>
+        <p:cNvGrpSpPr/>
+        <p:nvPr/>
+      </p:nvGrpSpPr>
+      <p:grpSpPr>
+        <a:xfrm>
+          <a:off x="0" y="0"/>
+          <a:ext cx="0" cy="0"/>
+          <a:chOff x="0" y="0"/>
+          <a:chExt cx="0" cy="0"/>
+        </a:xfrm>
+      </p:grpSpPr>
+      <p:sp>
+        <p:nvSpPr>
+          <p:cNvPr id="5" name="Rounded Rectangle 4">
+            <a:extLst>
+              <a:ext uri="{FF2B5EF4-FFF2-40B4-BE49-F238E27FC236}">
+                <a16:creationId xmlns:a16="http://schemas.microsoft.com/office/drawing/2014/main" id="{39E56DD5-634B-6848-A248-9892ADFFC6AD}"/>
+              </a:ext>
+            </a:extLst>
+          </p:cNvPr>
+          <p:cNvSpPr/>
+          <p:nvPr/>
+        </p:nvSpPr>
+        <p:spPr>
+          <a:xfrm>
+            <a:off x="0" y="0"/>
+            <a:ext cx="7559675" cy="5327650"/>
+          </a:xfrm>
+          <a:prstGeom prst="roundRect">
+            <a:avLst>
+              <a:gd name="adj" fmla="val 0"/>
+            </a:avLst>
+          </a:prstGeom>
+          <a:solidFill>
+            <a:srgbClr val="7030A0"/>
+          </a:solidFill>
+          <a:ln>
+            <a:noFill/>
+          </a:ln>
+        </p:spPr>
+        <p:style>
+          <a:lnRef idx="2">
+            <a:schemeClr val="accent1">
+              <a:shade val="50000"/>
+            </a:schemeClr>
+          </a:lnRef>
+          <a:fillRef idx="1">
+            <a:schemeClr val="accent1"/>
+          </a:fillRef>
+          <a:effectRef idx="0">
+            <a:schemeClr val="accent1"/>
+          </a:effectRef>
+          <a:fontRef idx="minor">
+            <a:schemeClr val="lt1"/>
+          </a:fontRef>
+        </p:style>
+        <p:txBody>
+          <a:bodyPr rtlCol="0" anchor="ctr"/>
+          <a:lstStyle/>
+          <a:p>
+            <a:pPr algn="ctr"/>
+            <a:endParaRPr lang="en-NL"/>
+          </a:p>
+        </p:txBody>
+      </p:sp>
+      <p:grpSp>
+        <p:nvGrpSpPr>
+          <p:cNvPr id="2" name="Group 1">
+            <a:extLst>
+              <a:ext uri="{FF2B5EF4-FFF2-40B4-BE49-F238E27FC236}">
+                <a16:creationId xmlns:a16="http://schemas.microsoft.com/office/drawing/2014/main" id="{4935A64A-AA7A-714E-9A2E-26607AAA8002}"/>
+              </a:ext>
+            </a:extLst>
+          </p:cNvPr>
+          <p:cNvGrpSpPr/>
+          <p:nvPr/>
+        </p:nvGrpSpPr>
+        <p:grpSpPr>
+          <a:xfrm>
+            <a:off x="883471" y="1586629"/>
+            <a:ext cx="5792732" cy="2154391"/>
+            <a:chOff x="782731" y="1502280"/>
+            <a:chExt cx="5792732" cy="2154391"/>
+          </a:xfrm>
+        </p:grpSpPr>
+        <p:sp>
+          <p:nvSpPr>
+            <p:cNvPr id="4" name="TextBox 3">
+              <a:extLst>
+                <a:ext uri="{FF2B5EF4-FFF2-40B4-BE49-F238E27FC236}">
+                  <a16:creationId xmlns:a16="http://schemas.microsoft.com/office/drawing/2014/main" id="{AF29F9D5-B3D4-3946-BEBF-95420A2CE6E9}"/>
+                </a:ext>
+              </a:extLst>
+            </p:cNvPr>
+            <p:cNvSpPr txBox="1"/>
+            <p:nvPr/>
+          </p:nvSpPr>
+          <p:spPr>
+            <a:xfrm>
+              <a:off x="782731" y="1502280"/>
+              <a:ext cx="5792732" cy="1631216"/>
+            </a:xfrm>
+            <a:prstGeom prst="rect">
+              <a:avLst/>
+            </a:prstGeom>
+            <a:noFill/>
+          </p:spPr>
+          <p:txBody>
+            <a:bodyPr wrap="square" rtlCol="0">
+              <a:spAutoFit/>
+            </a:bodyPr>
+            <a:lstStyle/>
+            <a:p>
+              <a:pPr algn="ctr"/>
+              <a:r>
                 <a:rPr lang="en-NL" sz="5000" b="1" dirty="0">
                   <a:solidFill>
                     <a:schemeClr val="bg1"/>
@@ -19018,6 +19490,670 @@
     </p:spTree>
     <p:extLst>
       <p:ext uri="{BB962C8B-B14F-4D97-AF65-F5344CB8AC3E}">
+        <p14:creationId xmlns:p14="http://schemas.microsoft.com/office/powerpoint/2010/main" val="718060364"/>
+      </p:ext>
+    </p:extLst>
+  </p:cSld>
+  <p:clrMapOvr>
+    <a:masterClrMapping/>
+  </p:clrMapOvr>
+</p:sld>
+</file>
+
+<file path=ppt/slides/slide6.xml><?xml version="1.0" encoding="utf-8"?>
+<p:sld xmlns:a="http://schemas.openxmlformats.org/drawingml/2006/main" xmlns:r="http://schemas.openxmlformats.org/officeDocument/2006/relationships" xmlns:p="http://schemas.openxmlformats.org/presentationml/2006/main">
+  <p:cSld>
+    <p:spTree>
+      <p:nvGrpSpPr>
+        <p:cNvPr id="1" name=""/>
+        <p:cNvGrpSpPr/>
+        <p:nvPr/>
+      </p:nvGrpSpPr>
+      <p:grpSpPr>
+        <a:xfrm>
+          <a:off x="0" y="0"/>
+          <a:ext cx="0" cy="0"/>
+          <a:chOff x="0" y="0"/>
+          <a:chExt cx="0" cy="0"/>
+        </a:xfrm>
+      </p:grpSpPr>
+      <p:sp>
+        <p:nvSpPr>
+          <p:cNvPr id="2" name="Title 1">
+            <a:extLst>
+              <a:ext uri="{FF2B5EF4-FFF2-40B4-BE49-F238E27FC236}">
+                <a16:creationId xmlns:a16="http://schemas.microsoft.com/office/drawing/2014/main" id="{CFCDF3DA-1D3D-E743-8E21-6B353B4D96A4}"/>
+              </a:ext>
+            </a:extLst>
+          </p:cNvPr>
+          <p:cNvSpPr>
+            <a:spLocks noGrp="1"/>
+          </p:cNvSpPr>
+          <p:nvPr>
+            <p:ph type="title"/>
+          </p:nvPr>
+        </p:nvSpPr>
+        <p:spPr/>
+        <p:txBody>
+          <a:bodyPr/>
+          <a:lstStyle/>
+          <a:p>
+            <a:endParaRPr lang="en-NL"/>
+          </a:p>
+        </p:txBody>
+      </p:sp>
+      <p:sp>
+        <p:nvSpPr>
+          <p:cNvPr id="3" name="Content Placeholder 2">
+            <a:extLst>
+              <a:ext uri="{FF2B5EF4-FFF2-40B4-BE49-F238E27FC236}">
+                <a16:creationId xmlns:a16="http://schemas.microsoft.com/office/drawing/2014/main" id="{40A525DA-CA85-AD48-8A85-52A75E1E5317}"/>
+              </a:ext>
+            </a:extLst>
+          </p:cNvPr>
+          <p:cNvSpPr>
+            <a:spLocks noGrp="1"/>
+          </p:cNvSpPr>
+          <p:nvPr>
+            <p:ph idx="1"/>
+          </p:nvPr>
+        </p:nvSpPr>
+        <p:spPr/>
+        <p:txBody>
+          <a:bodyPr/>
+          <a:lstStyle/>
+          <a:p>
+            <a:endParaRPr lang="en-NL"/>
+          </a:p>
+        </p:txBody>
+      </p:sp>
+      <p:sp>
+        <p:nvSpPr>
+          <p:cNvPr id="4" name="Rounded Rectangle 3">
+            <a:extLst>
+              <a:ext uri="{FF2B5EF4-FFF2-40B4-BE49-F238E27FC236}">
+                <a16:creationId xmlns:a16="http://schemas.microsoft.com/office/drawing/2014/main" id="{6B890BB6-3544-1A4E-A833-93135A597BB4}"/>
+              </a:ext>
+            </a:extLst>
+          </p:cNvPr>
+          <p:cNvSpPr/>
+          <p:nvPr/>
+        </p:nvSpPr>
+        <p:spPr>
+          <a:xfrm>
+            <a:off x="0" y="0"/>
+            <a:ext cx="7559675" cy="5327650"/>
+          </a:xfrm>
+          <a:prstGeom prst="roundRect">
+            <a:avLst>
+              <a:gd name="adj" fmla="val 0"/>
+            </a:avLst>
+          </a:prstGeom>
+          <a:blipFill>
+            <a:blip r:embed="rId2"/>
+            <a:stretch>
+              <a:fillRect/>
+            </a:stretch>
+          </a:blipFill>
+          <a:ln>
+            <a:solidFill>
+              <a:schemeClr val="bg2"/>
+            </a:solidFill>
+          </a:ln>
+        </p:spPr>
+        <p:style>
+          <a:lnRef idx="2">
+            <a:schemeClr val="accent1">
+              <a:shade val="50000"/>
+            </a:schemeClr>
+          </a:lnRef>
+          <a:fillRef idx="1">
+            <a:schemeClr val="accent1"/>
+          </a:fillRef>
+          <a:effectRef idx="0">
+            <a:schemeClr val="accent1"/>
+          </a:effectRef>
+          <a:fontRef idx="minor">
+            <a:schemeClr val="lt1"/>
+          </a:fontRef>
+        </p:style>
+        <p:txBody>
+          <a:bodyPr rtlCol="0" anchor="ctr"/>
+          <a:lstStyle/>
+          <a:p>
+            <a:pPr algn="ctr"/>
+            <a:endParaRPr lang="en-NL"/>
+          </a:p>
+        </p:txBody>
+      </p:sp>
+      <p:pic>
+        <p:nvPicPr>
+          <p:cNvPr id="5" name="Picture 4" descr="A picture containing food, drawing&#10;&#10;Description automatically generated">
+            <a:extLst>
+              <a:ext uri="{FF2B5EF4-FFF2-40B4-BE49-F238E27FC236}">
+                <a16:creationId xmlns:a16="http://schemas.microsoft.com/office/drawing/2014/main" id="{27611709-3190-2A4B-BCE4-4D329000A8EB}"/>
+              </a:ext>
+            </a:extLst>
+          </p:cNvPr>
+          <p:cNvPicPr>
+            <a:picLocks noChangeAspect="1"/>
+          </p:cNvPicPr>
+          <p:nvPr/>
+        </p:nvPicPr>
+        <p:blipFill>
+          <a:blip r:embed="rId3"/>
+          <a:stretch>
+            <a:fillRect/>
+          </a:stretch>
+        </p:blipFill>
+        <p:spPr>
+          <a:xfrm>
+            <a:off x="350837" y="-765175"/>
+            <a:ext cx="6858000" cy="6858000"/>
+          </a:xfrm>
+          <a:prstGeom prst="rect">
+            <a:avLst/>
+          </a:prstGeom>
+        </p:spPr>
+      </p:pic>
+    </p:spTree>
+    <p:extLst>
+      <p:ext uri="{BB962C8B-B14F-4D97-AF65-F5344CB8AC3E}">
+        <p14:creationId xmlns:p14="http://schemas.microsoft.com/office/powerpoint/2010/main" val="1452892043"/>
+      </p:ext>
+    </p:extLst>
+  </p:cSld>
+  <p:clrMapOvr>
+    <a:masterClrMapping/>
+  </p:clrMapOvr>
+</p:sld>
+</file>
+
+<file path=ppt/slides/slide60.xml><?xml version="1.0" encoding="utf-8"?>
+<p:sld xmlns:a="http://schemas.openxmlformats.org/drawingml/2006/main" xmlns:r="http://schemas.openxmlformats.org/officeDocument/2006/relationships" xmlns:p="http://schemas.openxmlformats.org/presentationml/2006/main">
+  <p:cSld>
+    <p:spTree>
+      <p:nvGrpSpPr>
+        <p:cNvPr id="1" name=""/>
+        <p:cNvGrpSpPr/>
+        <p:nvPr/>
+      </p:nvGrpSpPr>
+      <p:grpSpPr>
+        <a:xfrm>
+          <a:off x="0" y="0"/>
+          <a:ext cx="0" cy="0"/>
+          <a:chOff x="0" y="0"/>
+          <a:chExt cx="0" cy="0"/>
+        </a:xfrm>
+      </p:grpSpPr>
+      <p:sp>
+        <p:nvSpPr>
+          <p:cNvPr id="2" name="Title 1">
+            <a:extLst>
+              <a:ext uri="{FF2B5EF4-FFF2-40B4-BE49-F238E27FC236}">
+                <a16:creationId xmlns:a16="http://schemas.microsoft.com/office/drawing/2014/main" id="{CFCDF3DA-1D3D-E743-8E21-6B353B4D96A4}"/>
+              </a:ext>
+            </a:extLst>
+          </p:cNvPr>
+          <p:cNvSpPr>
+            <a:spLocks noGrp="1"/>
+          </p:cNvSpPr>
+          <p:nvPr>
+            <p:ph type="title"/>
+          </p:nvPr>
+        </p:nvSpPr>
+        <p:spPr/>
+        <p:txBody>
+          <a:bodyPr/>
+          <a:lstStyle/>
+          <a:p>
+            <a:endParaRPr lang="en-NL"/>
+          </a:p>
+        </p:txBody>
+      </p:sp>
+      <p:sp>
+        <p:nvSpPr>
+          <p:cNvPr id="3" name="Content Placeholder 2">
+            <a:extLst>
+              <a:ext uri="{FF2B5EF4-FFF2-40B4-BE49-F238E27FC236}">
+                <a16:creationId xmlns:a16="http://schemas.microsoft.com/office/drawing/2014/main" id="{40A525DA-CA85-AD48-8A85-52A75E1E5317}"/>
+              </a:ext>
+            </a:extLst>
+          </p:cNvPr>
+          <p:cNvSpPr>
+            <a:spLocks noGrp="1"/>
+          </p:cNvSpPr>
+          <p:nvPr>
+            <p:ph idx="1"/>
+          </p:nvPr>
+        </p:nvSpPr>
+        <p:spPr/>
+        <p:txBody>
+          <a:bodyPr/>
+          <a:lstStyle/>
+          <a:p>
+            <a:endParaRPr lang="en-NL"/>
+          </a:p>
+        </p:txBody>
+      </p:sp>
+      <p:sp>
+        <p:nvSpPr>
+          <p:cNvPr id="4" name="Rounded Rectangle 3">
+            <a:extLst>
+              <a:ext uri="{FF2B5EF4-FFF2-40B4-BE49-F238E27FC236}">
+                <a16:creationId xmlns:a16="http://schemas.microsoft.com/office/drawing/2014/main" id="{6B890BB6-3544-1A4E-A833-93135A597BB4}"/>
+              </a:ext>
+            </a:extLst>
+          </p:cNvPr>
+          <p:cNvSpPr/>
+          <p:nvPr/>
+        </p:nvSpPr>
+        <p:spPr>
+          <a:xfrm>
+            <a:off x="0" y="0"/>
+            <a:ext cx="7559675" cy="5327650"/>
+          </a:xfrm>
+          <a:prstGeom prst="roundRect">
+            <a:avLst>
+              <a:gd name="adj" fmla="val 0"/>
+            </a:avLst>
+          </a:prstGeom>
+          <a:blipFill>
+            <a:blip r:embed="rId2"/>
+            <a:stretch>
+              <a:fillRect/>
+            </a:stretch>
+          </a:blipFill>
+          <a:ln>
+            <a:solidFill>
+              <a:schemeClr val="bg2"/>
+            </a:solidFill>
+          </a:ln>
+        </p:spPr>
+        <p:style>
+          <a:lnRef idx="2">
+            <a:schemeClr val="accent1">
+              <a:shade val="50000"/>
+            </a:schemeClr>
+          </a:lnRef>
+          <a:fillRef idx="1">
+            <a:schemeClr val="accent1"/>
+          </a:fillRef>
+          <a:effectRef idx="0">
+            <a:schemeClr val="accent1"/>
+          </a:effectRef>
+          <a:fontRef idx="minor">
+            <a:schemeClr val="lt1"/>
+          </a:fontRef>
+        </p:style>
+        <p:txBody>
+          <a:bodyPr rtlCol="0" anchor="ctr"/>
+          <a:lstStyle/>
+          <a:p>
+            <a:pPr algn="ctr"/>
+            <a:endParaRPr lang="en-NL"/>
+          </a:p>
+        </p:txBody>
+      </p:sp>
+      <p:pic>
+        <p:nvPicPr>
+          <p:cNvPr id="5" name="Picture 4" descr="A picture containing food, drawing&#10;&#10;Description automatically generated">
+            <a:extLst>
+              <a:ext uri="{FF2B5EF4-FFF2-40B4-BE49-F238E27FC236}">
+                <a16:creationId xmlns:a16="http://schemas.microsoft.com/office/drawing/2014/main" id="{27611709-3190-2A4B-BCE4-4D329000A8EB}"/>
+              </a:ext>
+            </a:extLst>
+          </p:cNvPr>
+          <p:cNvPicPr>
+            <a:picLocks noChangeAspect="1"/>
+          </p:cNvPicPr>
+          <p:nvPr/>
+        </p:nvPicPr>
+        <p:blipFill>
+          <a:blip r:embed="rId3"/>
+          <a:stretch>
+            <a:fillRect/>
+          </a:stretch>
+        </p:blipFill>
+        <p:spPr>
+          <a:xfrm>
+            <a:off x="350837" y="-765175"/>
+            <a:ext cx="6858000" cy="6858000"/>
+          </a:xfrm>
+          <a:prstGeom prst="rect">
+            <a:avLst/>
+          </a:prstGeom>
+        </p:spPr>
+      </p:pic>
+    </p:spTree>
+    <p:extLst>
+      <p:ext uri="{BB962C8B-B14F-4D97-AF65-F5344CB8AC3E}">
+        <p14:creationId xmlns:p14="http://schemas.microsoft.com/office/powerpoint/2010/main" val="924856274"/>
+      </p:ext>
+    </p:extLst>
+  </p:cSld>
+  <p:clrMapOvr>
+    <a:masterClrMapping/>
+  </p:clrMapOvr>
+</p:sld>
+</file>
+
+<file path=ppt/slides/slide61.xml><?xml version="1.0" encoding="utf-8"?>
+<p:sld xmlns:a="http://schemas.openxmlformats.org/drawingml/2006/main" xmlns:r="http://schemas.openxmlformats.org/officeDocument/2006/relationships" xmlns:p="http://schemas.openxmlformats.org/presentationml/2006/main">
+  <p:cSld>
+    <p:spTree>
+      <p:nvGrpSpPr>
+        <p:cNvPr id="1" name=""/>
+        <p:cNvGrpSpPr/>
+        <p:nvPr/>
+      </p:nvGrpSpPr>
+      <p:grpSpPr>
+        <a:xfrm>
+          <a:off x="0" y="0"/>
+          <a:ext cx="0" cy="0"/>
+          <a:chOff x="0" y="0"/>
+          <a:chExt cx="0" cy="0"/>
+        </a:xfrm>
+      </p:grpSpPr>
+      <p:sp>
+        <p:nvSpPr>
+          <p:cNvPr id="5" name="Rounded Rectangle 4">
+            <a:extLst>
+              <a:ext uri="{FF2B5EF4-FFF2-40B4-BE49-F238E27FC236}">
+                <a16:creationId xmlns:a16="http://schemas.microsoft.com/office/drawing/2014/main" id="{39E56DD5-634B-6848-A248-9892ADFFC6AD}"/>
+              </a:ext>
+            </a:extLst>
+          </p:cNvPr>
+          <p:cNvSpPr/>
+          <p:nvPr/>
+        </p:nvSpPr>
+        <p:spPr>
+          <a:xfrm>
+            <a:off x="0" y="0"/>
+            <a:ext cx="7559675" cy="5327650"/>
+          </a:xfrm>
+          <a:prstGeom prst="roundRect">
+            <a:avLst>
+              <a:gd name="adj" fmla="val 0"/>
+            </a:avLst>
+          </a:prstGeom>
+          <a:solidFill>
+            <a:srgbClr val="7030A0"/>
+          </a:solidFill>
+          <a:ln>
+            <a:noFill/>
+          </a:ln>
+        </p:spPr>
+        <p:style>
+          <a:lnRef idx="2">
+            <a:schemeClr val="accent1">
+              <a:shade val="50000"/>
+            </a:schemeClr>
+          </a:lnRef>
+          <a:fillRef idx="1">
+            <a:schemeClr val="accent1"/>
+          </a:fillRef>
+          <a:effectRef idx="0">
+            <a:schemeClr val="accent1"/>
+          </a:effectRef>
+          <a:fontRef idx="minor">
+            <a:schemeClr val="lt1"/>
+          </a:fontRef>
+        </p:style>
+        <p:txBody>
+          <a:bodyPr rtlCol="0" anchor="ctr"/>
+          <a:lstStyle/>
+          <a:p>
+            <a:pPr algn="ctr"/>
+            <a:endParaRPr lang="en-NL"/>
+          </a:p>
+        </p:txBody>
+      </p:sp>
+      <p:grpSp>
+        <p:nvGrpSpPr>
+          <p:cNvPr id="2" name="Group 1">
+            <a:extLst>
+              <a:ext uri="{FF2B5EF4-FFF2-40B4-BE49-F238E27FC236}">
+                <a16:creationId xmlns:a16="http://schemas.microsoft.com/office/drawing/2014/main" id="{4935A64A-AA7A-714E-9A2E-26607AAA8002}"/>
+              </a:ext>
+            </a:extLst>
+          </p:cNvPr>
+          <p:cNvGrpSpPr/>
+          <p:nvPr/>
+        </p:nvGrpSpPr>
+        <p:grpSpPr>
+          <a:xfrm>
+            <a:off x="883471" y="1586629"/>
+            <a:ext cx="5792732" cy="2154391"/>
+            <a:chOff x="782731" y="1502280"/>
+            <a:chExt cx="5792732" cy="2154391"/>
+          </a:xfrm>
+        </p:grpSpPr>
+        <p:sp>
+          <p:nvSpPr>
+            <p:cNvPr id="4" name="TextBox 3">
+              <a:extLst>
+                <a:ext uri="{FF2B5EF4-FFF2-40B4-BE49-F238E27FC236}">
+                  <a16:creationId xmlns:a16="http://schemas.microsoft.com/office/drawing/2014/main" id="{AF29F9D5-B3D4-3946-BEBF-95420A2CE6E9}"/>
+                </a:ext>
+              </a:extLst>
+            </p:cNvPr>
+            <p:cNvSpPr txBox="1"/>
+            <p:nvPr/>
+          </p:nvSpPr>
+          <p:spPr>
+            <a:xfrm>
+              <a:off x="782731" y="1502280"/>
+              <a:ext cx="5792732" cy="1631216"/>
+            </a:xfrm>
+            <a:prstGeom prst="rect">
+              <a:avLst/>
+            </a:prstGeom>
+            <a:noFill/>
+          </p:spPr>
+          <p:txBody>
+            <a:bodyPr wrap="square" rtlCol="0">
+              <a:spAutoFit/>
+            </a:bodyPr>
+            <a:lstStyle/>
+            <a:p>
+              <a:pPr algn="ctr"/>
+              <a:r>
+                <a:rPr lang="en-GB" sz="5000" b="1">
+                  <a:solidFill>
+                    <a:schemeClr val="bg1"/>
+                  </a:solidFill>
+                  <a:latin typeface="Ubuntu" panose="020B0504030602030204" pitchFamily="34" charset="0"/>
+                </a:rPr>
+                <a:t>Time to </a:t>
+              </a:r>
+            </a:p>
+            <a:p>
+              <a:pPr algn="ctr"/>
+              <a:r>
+                <a:rPr lang="en-GB" sz="5000" b="1">
+                  <a:solidFill>
+                    <a:schemeClr val="bg1"/>
+                  </a:solidFill>
+                  <a:latin typeface="Ubuntu" panose="020B0504030602030204" pitchFamily="34" charset="0"/>
+                </a:rPr>
+                <a:t>Restore Service</a:t>
+              </a:r>
+              <a:endParaRPr lang="en-NL" sz="5000" b="1" dirty="0">
+                <a:solidFill>
+                  <a:schemeClr val="bg1"/>
+                </a:solidFill>
+                <a:latin typeface="Ubuntu" panose="020B0504030602030204" pitchFamily="34" charset="0"/>
+              </a:endParaRPr>
+            </a:p>
+          </p:txBody>
+        </p:sp>
+        <p:sp>
+          <p:nvSpPr>
+            <p:cNvPr id="10" name="Oval 9">
+              <a:extLst>
+                <a:ext uri="{FF2B5EF4-FFF2-40B4-BE49-F238E27FC236}">
+                  <a16:creationId xmlns:a16="http://schemas.microsoft.com/office/drawing/2014/main" id="{4A3FB51E-232C-6746-A6BB-CCD934EE62FA}"/>
+                </a:ext>
+              </a:extLst>
+            </p:cNvPr>
+            <p:cNvSpPr/>
+            <p:nvPr/>
+          </p:nvSpPr>
+          <p:spPr>
+            <a:xfrm>
+              <a:off x="3068663" y="3292524"/>
+              <a:ext cx="364210" cy="364147"/>
+            </a:xfrm>
+            <a:prstGeom prst="ellipse">
+              <a:avLst/>
+            </a:prstGeom>
+            <a:solidFill>
+              <a:schemeClr val="bg1"/>
+            </a:solidFill>
+            <a:ln>
+              <a:solidFill>
+                <a:schemeClr val="bg1"/>
+              </a:solidFill>
+            </a:ln>
+          </p:spPr>
+          <p:style>
+            <a:lnRef idx="2">
+              <a:schemeClr val="accent1">
+                <a:shade val="50000"/>
+              </a:schemeClr>
+            </a:lnRef>
+            <a:fillRef idx="1">
+              <a:schemeClr val="accent1"/>
+            </a:fillRef>
+            <a:effectRef idx="0">
+              <a:schemeClr val="accent1"/>
+            </a:effectRef>
+            <a:fontRef idx="minor">
+              <a:schemeClr val="lt1"/>
+            </a:fontRef>
+          </p:style>
+          <p:txBody>
+            <a:bodyPr rtlCol="0" anchor="ctr"/>
+            <a:lstStyle/>
+            <a:p>
+              <a:pPr algn="ctr"/>
+              <a:endParaRPr lang="en-NL"/>
+            </a:p>
+          </p:txBody>
+        </p:sp>
+        <p:sp>
+          <p:nvSpPr>
+            <p:cNvPr id="11" name="Oval 10">
+              <a:extLst>
+                <a:ext uri="{FF2B5EF4-FFF2-40B4-BE49-F238E27FC236}">
+                  <a16:creationId xmlns:a16="http://schemas.microsoft.com/office/drawing/2014/main" id="{0E67C4F7-76EC-A04E-8A10-797FFFCB7E0A}"/>
+                </a:ext>
+              </a:extLst>
+            </p:cNvPr>
+            <p:cNvSpPr/>
+            <p:nvPr/>
+          </p:nvSpPr>
+          <p:spPr>
+            <a:xfrm>
+              <a:off x="3496992" y="3292523"/>
+              <a:ext cx="364210" cy="364147"/>
+            </a:xfrm>
+            <a:prstGeom prst="ellipse">
+              <a:avLst/>
+            </a:prstGeom>
+            <a:solidFill>
+              <a:schemeClr val="bg1"/>
+            </a:solidFill>
+            <a:ln>
+              <a:solidFill>
+                <a:schemeClr val="bg1"/>
+              </a:solidFill>
+            </a:ln>
+          </p:spPr>
+          <p:style>
+            <a:lnRef idx="2">
+              <a:schemeClr val="accent1">
+                <a:shade val="50000"/>
+              </a:schemeClr>
+            </a:lnRef>
+            <a:fillRef idx="1">
+              <a:schemeClr val="accent1"/>
+            </a:fillRef>
+            <a:effectRef idx="0">
+              <a:schemeClr val="accent1"/>
+            </a:effectRef>
+            <a:fontRef idx="minor">
+              <a:schemeClr val="lt1"/>
+            </a:fontRef>
+          </p:style>
+          <p:txBody>
+            <a:bodyPr rtlCol="0" anchor="ctr"/>
+            <a:lstStyle/>
+            <a:p>
+              <a:pPr algn="ctr"/>
+              <a:endParaRPr lang="en-NL"/>
+            </a:p>
+          </p:txBody>
+        </p:sp>
+        <p:sp>
+          <p:nvSpPr>
+            <p:cNvPr id="12" name="Oval 11">
+              <a:extLst>
+                <a:ext uri="{FF2B5EF4-FFF2-40B4-BE49-F238E27FC236}">
+                  <a16:creationId xmlns:a16="http://schemas.microsoft.com/office/drawing/2014/main" id="{30BF99AA-F8D9-AC4D-9A99-9E4974F1978C}"/>
+                </a:ext>
+              </a:extLst>
+            </p:cNvPr>
+            <p:cNvSpPr/>
+            <p:nvPr/>
+          </p:nvSpPr>
+          <p:spPr>
+            <a:xfrm>
+              <a:off x="3925321" y="3292522"/>
+              <a:ext cx="364210" cy="364147"/>
+            </a:xfrm>
+            <a:prstGeom prst="ellipse">
+              <a:avLst/>
+            </a:prstGeom>
+            <a:solidFill>
+              <a:schemeClr val="bg1"/>
+            </a:solidFill>
+            <a:ln>
+              <a:solidFill>
+                <a:schemeClr val="bg1"/>
+              </a:solidFill>
+            </a:ln>
+          </p:spPr>
+          <p:style>
+            <a:lnRef idx="2">
+              <a:schemeClr val="accent1">
+                <a:shade val="50000"/>
+              </a:schemeClr>
+            </a:lnRef>
+            <a:fillRef idx="1">
+              <a:schemeClr val="accent1"/>
+            </a:fillRef>
+            <a:effectRef idx="0">
+              <a:schemeClr val="accent1"/>
+            </a:effectRef>
+            <a:fontRef idx="minor">
+              <a:schemeClr val="lt1"/>
+            </a:fontRef>
+          </p:style>
+          <p:txBody>
+            <a:bodyPr rtlCol="0" anchor="ctr"/>
+            <a:lstStyle/>
+            <a:p>
+              <a:pPr algn="ctr"/>
+              <a:endParaRPr lang="en-NL"/>
+            </a:p>
+          </p:txBody>
+        </p:sp>
+      </p:grpSp>
+    </p:spTree>
+    <p:extLst>
+      <p:ext uri="{BB962C8B-B14F-4D97-AF65-F5344CB8AC3E}">
         <p14:creationId xmlns:p14="http://schemas.microsoft.com/office/powerpoint/2010/main" val="2039621771"/>
       </p:ext>
     </p:extLst>
@@ -19028,7 +20164,7 @@
 </p:sld>
 </file>
 
-<file path=ppt/slides/slide58.xml><?xml version="1.0" encoding="utf-8"?>
+<file path=ppt/slides/slide62.xml><?xml version="1.0" encoding="utf-8"?>
 <p:sld xmlns:a="http://schemas.openxmlformats.org/drawingml/2006/main" xmlns:r="http://schemas.openxmlformats.org/officeDocument/2006/relationships" xmlns:p="http://schemas.openxmlformats.org/presentationml/2006/main">
   <p:cSld>
     <p:spTree>
@@ -19197,7 +20333,7 @@
 </p:sld>
 </file>
 
-<file path=ppt/slides/slide59.xml><?xml version="1.0" encoding="utf-8"?>
+<file path=ppt/slides/slide63.xml><?xml version="1.0" encoding="utf-8"?>
 <p:sld xmlns:a="http://schemas.openxmlformats.org/drawingml/2006/main" xmlns:r="http://schemas.openxmlformats.org/officeDocument/2006/relationships" xmlns:p="http://schemas.openxmlformats.org/presentationml/2006/main">
   <p:cSld>
     <p:spTree>
@@ -19505,176 +20641,7 @@
 </p:sld>
 </file>
 
-<file path=ppt/slides/slide6.xml><?xml version="1.0" encoding="utf-8"?>
-<p:sld xmlns:a="http://schemas.openxmlformats.org/drawingml/2006/main" xmlns:r="http://schemas.openxmlformats.org/officeDocument/2006/relationships" xmlns:p="http://schemas.openxmlformats.org/presentationml/2006/main">
-  <p:cSld>
-    <p:spTree>
-      <p:nvGrpSpPr>
-        <p:cNvPr id="1" name=""/>
-        <p:cNvGrpSpPr/>
-        <p:nvPr/>
-      </p:nvGrpSpPr>
-      <p:grpSpPr>
-        <a:xfrm>
-          <a:off x="0" y="0"/>
-          <a:ext cx="0" cy="0"/>
-          <a:chOff x="0" y="0"/>
-          <a:chExt cx="0" cy="0"/>
-        </a:xfrm>
-      </p:grpSpPr>
-      <p:sp>
-        <p:nvSpPr>
-          <p:cNvPr id="2" name="Title 1">
-            <a:extLst>
-              <a:ext uri="{FF2B5EF4-FFF2-40B4-BE49-F238E27FC236}">
-                <a16:creationId xmlns:a16="http://schemas.microsoft.com/office/drawing/2014/main" id="{CFCDF3DA-1D3D-E743-8E21-6B353B4D96A4}"/>
-              </a:ext>
-            </a:extLst>
-          </p:cNvPr>
-          <p:cNvSpPr>
-            <a:spLocks noGrp="1"/>
-          </p:cNvSpPr>
-          <p:nvPr>
-            <p:ph type="title"/>
-          </p:nvPr>
-        </p:nvSpPr>
-        <p:spPr/>
-        <p:txBody>
-          <a:bodyPr/>
-          <a:lstStyle/>
-          <a:p>
-            <a:endParaRPr lang="en-NL"/>
-          </a:p>
-        </p:txBody>
-      </p:sp>
-      <p:sp>
-        <p:nvSpPr>
-          <p:cNvPr id="3" name="Content Placeholder 2">
-            <a:extLst>
-              <a:ext uri="{FF2B5EF4-FFF2-40B4-BE49-F238E27FC236}">
-                <a16:creationId xmlns:a16="http://schemas.microsoft.com/office/drawing/2014/main" id="{40A525DA-CA85-AD48-8A85-52A75E1E5317}"/>
-              </a:ext>
-            </a:extLst>
-          </p:cNvPr>
-          <p:cNvSpPr>
-            <a:spLocks noGrp="1"/>
-          </p:cNvSpPr>
-          <p:nvPr>
-            <p:ph idx="1"/>
-          </p:nvPr>
-        </p:nvSpPr>
-        <p:spPr/>
-        <p:txBody>
-          <a:bodyPr/>
-          <a:lstStyle/>
-          <a:p>
-            <a:endParaRPr lang="en-NL"/>
-          </a:p>
-        </p:txBody>
-      </p:sp>
-      <p:sp>
-        <p:nvSpPr>
-          <p:cNvPr id="4" name="Rounded Rectangle 3">
-            <a:extLst>
-              <a:ext uri="{FF2B5EF4-FFF2-40B4-BE49-F238E27FC236}">
-                <a16:creationId xmlns:a16="http://schemas.microsoft.com/office/drawing/2014/main" id="{6B890BB6-3544-1A4E-A833-93135A597BB4}"/>
-              </a:ext>
-            </a:extLst>
-          </p:cNvPr>
-          <p:cNvSpPr/>
-          <p:nvPr/>
-        </p:nvSpPr>
-        <p:spPr>
-          <a:xfrm>
-            <a:off x="0" y="0"/>
-            <a:ext cx="7559675" cy="5327650"/>
-          </a:xfrm>
-          <a:prstGeom prst="roundRect">
-            <a:avLst>
-              <a:gd name="adj" fmla="val 0"/>
-            </a:avLst>
-          </a:prstGeom>
-          <a:blipFill>
-            <a:blip r:embed="rId2"/>
-            <a:stretch>
-              <a:fillRect/>
-            </a:stretch>
-          </a:blipFill>
-          <a:ln>
-            <a:solidFill>
-              <a:schemeClr val="bg2"/>
-            </a:solidFill>
-          </a:ln>
-        </p:spPr>
-        <p:style>
-          <a:lnRef idx="2">
-            <a:schemeClr val="accent1">
-              <a:shade val="50000"/>
-            </a:schemeClr>
-          </a:lnRef>
-          <a:fillRef idx="1">
-            <a:schemeClr val="accent1"/>
-          </a:fillRef>
-          <a:effectRef idx="0">
-            <a:schemeClr val="accent1"/>
-          </a:effectRef>
-          <a:fontRef idx="minor">
-            <a:schemeClr val="lt1"/>
-          </a:fontRef>
-        </p:style>
-        <p:txBody>
-          <a:bodyPr rtlCol="0" anchor="ctr"/>
-          <a:lstStyle/>
-          <a:p>
-            <a:pPr algn="ctr"/>
-            <a:endParaRPr lang="en-NL"/>
-          </a:p>
-        </p:txBody>
-      </p:sp>
-      <p:pic>
-        <p:nvPicPr>
-          <p:cNvPr id="5" name="Picture 4" descr="A picture containing food, drawing&#10;&#10;Description automatically generated">
-            <a:extLst>
-              <a:ext uri="{FF2B5EF4-FFF2-40B4-BE49-F238E27FC236}">
-                <a16:creationId xmlns:a16="http://schemas.microsoft.com/office/drawing/2014/main" id="{27611709-3190-2A4B-BCE4-4D329000A8EB}"/>
-              </a:ext>
-            </a:extLst>
-          </p:cNvPr>
-          <p:cNvPicPr>
-            <a:picLocks noChangeAspect="1"/>
-          </p:cNvPicPr>
-          <p:nvPr/>
-        </p:nvPicPr>
-        <p:blipFill>
-          <a:blip r:embed="rId3"/>
-          <a:stretch>
-            <a:fillRect/>
-          </a:stretch>
-        </p:blipFill>
-        <p:spPr>
-          <a:xfrm>
-            <a:off x="350837" y="-765175"/>
-            <a:ext cx="6858000" cy="6858000"/>
-          </a:xfrm>
-          <a:prstGeom prst="rect">
-            <a:avLst/>
-          </a:prstGeom>
-        </p:spPr>
-      </p:pic>
-    </p:spTree>
-    <p:extLst>
-      <p:ext uri="{BB962C8B-B14F-4D97-AF65-F5344CB8AC3E}">
-        <p14:creationId xmlns:p14="http://schemas.microsoft.com/office/powerpoint/2010/main" val="1452892043"/>
-      </p:ext>
-    </p:extLst>
-  </p:cSld>
-  <p:clrMapOvr>
-    <a:masterClrMapping/>
-  </p:clrMapOvr>
-</p:sld>
-</file>
-
-<file path=ppt/slides/slide60.xml><?xml version="1.0" encoding="utf-8"?>
+<file path=ppt/slides/slide64.xml><?xml version="1.0" encoding="utf-8"?>
 <p:sld xmlns:a="http://schemas.openxmlformats.org/drawingml/2006/main" xmlns:r="http://schemas.openxmlformats.org/officeDocument/2006/relationships" xmlns:p="http://schemas.openxmlformats.org/presentationml/2006/main">
   <p:cSld>
     <p:spTree>
@@ -19843,7 +20810,7 @@
 </p:sld>
 </file>
 
-<file path=ppt/slides/slide61.xml><?xml version="1.0" encoding="utf-8"?>
+<file path=ppt/slides/slide65.xml><?xml version="1.0" encoding="utf-8"?>
 <p:sld xmlns:a="http://schemas.openxmlformats.org/drawingml/2006/main" xmlns:r="http://schemas.openxmlformats.org/officeDocument/2006/relationships" xmlns:p="http://schemas.openxmlformats.org/presentationml/2006/main">
   <p:cSld>
     <p:spTree>
@@ -20151,7 +21118,7 @@
 </p:sld>
 </file>
 
-<file path=ppt/slides/slide62.xml><?xml version="1.0" encoding="utf-8"?>
+<file path=ppt/slides/slide66.xml><?xml version="1.0" encoding="utf-8"?>
 <p:sld xmlns:a="http://schemas.openxmlformats.org/drawingml/2006/main" xmlns:r="http://schemas.openxmlformats.org/officeDocument/2006/relationships" xmlns:p="http://schemas.openxmlformats.org/presentationml/2006/main">
   <p:cSld>
     <p:spTree>
@@ -20320,7 +21287,7 @@
 </p:sld>
 </file>
 
-<file path=ppt/slides/slide63.xml><?xml version="1.0" encoding="utf-8"?>
+<file path=ppt/slides/slide67.xml><?xml version="1.0" encoding="utf-8"?>
 <p:sld xmlns:a="http://schemas.openxmlformats.org/drawingml/2006/main" xmlns:r="http://schemas.openxmlformats.org/officeDocument/2006/relationships" xmlns:p="http://schemas.openxmlformats.org/presentationml/2006/main">
   <p:cSld>
     <p:spTree>
@@ -20640,7 +21607,7 @@
 </p:sld>
 </file>
 
-<file path=ppt/slides/slide64.xml><?xml version="1.0" encoding="utf-8"?>
+<file path=ppt/slides/slide68.xml><?xml version="1.0" encoding="utf-8"?>
 <p:sld xmlns:a="http://schemas.openxmlformats.org/drawingml/2006/main" xmlns:r="http://schemas.openxmlformats.org/officeDocument/2006/relationships" xmlns:p="http://schemas.openxmlformats.org/presentationml/2006/main">
   <p:cSld>
     <p:spTree>
@@ -20809,7 +21776,7 @@
 </p:sld>
 </file>
 
-<file path=ppt/slides/slide65.xml><?xml version="1.0" encoding="utf-8"?>
+<file path=ppt/slides/slide69.xml><?xml version="1.0" encoding="utf-8"?>
 <p:sld xmlns:a="http://schemas.openxmlformats.org/drawingml/2006/main" xmlns:r="http://schemas.openxmlformats.org/officeDocument/2006/relationships" xmlns:p="http://schemas.openxmlformats.org/presentationml/2006/main">
   <p:cSld>
     <p:spTree>
@@ -21117,588 +22084,6 @@
 </p:sld>
 </file>
 
-<file path=ppt/slides/slide66.xml><?xml version="1.0" encoding="utf-8"?>
-<p:sld xmlns:a="http://schemas.openxmlformats.org/drawingml/2006/main" xmlns:r="http://schemas.openxmlformats.org/officeDocument/2006/relationships" xmlns:p="http://schemas.openxmlformats.org/presentationml/2006/main">
-  <p:cSld>
-    <p:spTree>
-      <p:nvGrpSpPr>
-        <p:cNvPr id="1" name=""/>
-        <p:cNvGrpSpPr/>
-        <p:nvPr/>
-      </p:nvGrpSpPr>
-      <p:grpSpPr>
-        <a:xfrm>
-          <a:off x="0" y="0"/>
-          <a:ext cx="0" cy="0"/>
-          <a:chOff x="0" y="0"/>
-          <a:chExt cx="0" cy="0"/>
-        </a:xfrm>
-      </p:grpSpPr>
-      <p:sp>
-        <p:nvSpPr>
-          <p:cNvPr id="2" name="Title 1">
-            <a:extLst>
-              <a:ext uri="{FF2B5EF4-FFF2-40B4-BE49-F238E27FC236}">
-                <a16:creationId xmlns:a16="http://schemas.microsoft.com/office/drawing/2014/main" id="{CFCDF3DA-1D3D-E743-8E21-6B353B4D96A4}"/>
-              </a:ext>
-            </a:extLst>
-          </p:cNvPr>
-          <p:cNvSpPr>
-            <a:spLocks noGrp="1"/>
-          </p:cNvSpPr>
-          <p:nvPr>
-            <p:ph type="title"/>
-          </p:nvPr>
-        </p:nvSpPr>
-        <p:spPr/>
-        <p:txBody>
-          <a:bodyPr/>
-          <a:lstStyle/>
-          <a:p>
-            <a:endParaRPr lang="en-NL"/>
-          </a:p>
-        </p:txBody>
-      </p:sp>
-      <p:sp>
-        <p:nvSpPr>
-          <p:cNvPr id="3" name="Content Placeholder 2">
-            <a:extLst>
-              <a:ext uri="{FF2B5EF4-FFF2-40B4-BE49-F238E27FC236}">
-                <a16:creationId xmlns:a16="http://schemas.microsoft.com/office/drawing/2014/main" id="{40A525DA-CA85-AD48-8A85-52A75E1E5317}"/>
-              </a:ext>
-            </a:extLst>
-          </p:cNvPr>
-          <p:cNvSpPr>
-            <a:spLocks noGrp="1"/>
-          </p:cNvSpPr>
-          <p:nvPr>
-            <p:ph idx="1"/>
-          </p:nvPr>
-        </p:nvSpPr>
-        <p:spPr/>
-        <p:txBody>
-          <a:bodyPr/>
-          <a:lstStyle/>
-          <a:p>
-            <a:endParaRPr lang="en-NL"/>
-          </a:p>
-        </p:txBody>
-      </p:sp>
-      <p:sp>
-        <p:nvSpPr>
-          <p:cNvPr id="4" name="Rounded Rectangle 3">
-            <a:extLst>
-              <a:ext uri="{FF2B5EF4-FFF2-40B4-BE49-F238E27FC236}">
-                <a16:creationId xmlns:a16="http://schemas.microsoft.com/office/drawing/2014/main" id="{6B890BB6-3544-1A4E-A833-93135A597BB4}"/>
-              </a:ext>
-            </a:extLst>
-          </p:cNvPr>
-          <p:cNvSpPr/>
-          <p:nvPr/>
-        </p:nvSpPr>
-        <p:spPr>
-          <a:xfrm>
-            <a:off x="0" y="0"/>
-            <a:ext cx="7559675" cy="5327650"/>
-          </a:xfrm>
-          <a:prstGeom prst="roundRect">
-            <a:avLst>
-              <a:gd name="adj" fmla="val 0"/>
-            </a:avLst>
-          </a:prstGeom>
-          <a:blipFill>
-            <a:blip r:embed="rId2"/>
-            <a:stretch>
-              <a:fillRect/>
-            </a:stretch>
-          </a:blipFill>
-          <a:ln>
-            <a:solidFill>
-              <a:schemeClr val="bg2"/>
-            </a:solidFill>
-          </a:ln>
-        </p:spPr>
-        <p:style>
-          <a:lnRef idx="2">
-            <a:schemeClr val="accent1">
-              <a:shade val="50000"/>
-            </a:schemeClr>
-          </a:lnRef>
-          <a:fillRef idx="1">
-            <a:schemeClr val="accent1"/>
-          </a:fillRef>
-          <a:effectRef idx="0">
-            <a:schemeClr val="accent1"/>
-          </a:effectRef>
-          <a:fontRef idx="minor">
-            <a:schemeClr val="lt1"/>
-          </a:fontRef>
-        </p:style>
-        <p:txBody>
-          <a:bodyPr rtlCol="0" anchor="ctr"/>
-          <a:lstStyle/>
-          <a:p>
-            <a:pPr algn="ctr"/>
-            <a:endParaRPr lang="en-NL"/>
-          </a:p>
-        </p:txBody>
-      </p:sp>
-      <p:pic>
-        <p:nvPicPr>
-          <p:cNvPr id="5" name="Picture 4" descr="A picture containing food, drawing&#10;&#10;Description automatically generated">
-            <a:extLst>
-              <a:ext uri="{FF2B5EF4-FFF2-40B4-BE49-F238E27FC236}">
-                <a16:creationId xmlns:a16="http://schemas.microsoft.com/office/drawing/2014/main" id="{27611709-3190-2A4B-BCE4-4D329000A8EB}"/>
-              </a:ext>
-            </a:extLst>
-          </p:cNvPr>
-          <p:cNvPicPr>
-            <a:picLocks noChangeAspect="1"/>
-          </p:cNvPicPr>
-          <p:nvPr/>
-        </p:nvPicPr>
-        <p:blipFill>
-          <a:blip r:embed="rId3"/>
-          <a:stretch>
-            <a:fillRect/>
-          </a:stretch>
-        </p:blipFill>
-        <p:spPr>
-          <a:xfrm>
-            <a:off x="350837" y="-765175"/>
-            <a:ext cx="6858000" cy="6858000"/>
-          </a:xfrm>
-          <a:prstGeom prst="rect">
-            <a:avLst/>
-          </a:prstGeom>
-        </p:spPr>
-      </p:pic>
-    </p:spTree>
-    <p:extLst>
-      <p:ext uri="{BB962C8B-B14F-4D97-AF65-F5344CB8AC3E}">
-        <p14:creationId xmlns:p14="http://schemas.microsoft.com/office/powerpoint/2010/main" val="141956057"/>
-      </p:ext>
-    </p:extLst>
-  </p:cSld>
-  <p:clrMapOvr>
-    <a:masterClrMapping/>
-  </p:clrMapOvr>
-</p:sld>
-</file>
-
-<file path=ppt/slides/slide67.xml><?xml version="1.0" encoding="utf-8"?>
-<p:sld xmlns:a="http://schemas.openxmlformats.org/drawingml/2006/main" xmlns:r="http://schemas.openxmlformats.org/officeDocument/2006/relationships" xmlns:p="http://schemas.openxmlformats.org/presentationml/2006/main">
-  <p:cSld>
-    <p:spTree>
-      <p:nvGrpSpPr>
-        <p:cNvPr id="1" name=""/>
-        <p:cNvGrpSpPr/>
-        <p:nvPr/>
-      </p:nvGrpSpPr>
-      <p:grpSpPr>
-        <a:xfrm>
-          <a:off x="0" y="0"/>
-          <a:ext cx="0" cy="0"/>
-          <a:chOff x="0" y="0"/>
-          <a:chExt cx="0" cy="0"/>
-        </a:xfrm>
-      </p:grpSpPr>
-      <p:sp>
-        <p:nvSpPr>
-          <p:cNvPr id="7" name="Rounded Rectangle 6">
-            <a:extLst>
-              <a:ext uri="{FF2B5EF4-FFF2-40B4-BE49-F238E27FC236}">
-                <a16:creationId xmlns:a16="http://schemas.microsoft.com/office/drawing/2014/main" id="{B3DC599D-AD1B-104D-B158-5C2A6823AC16}"/>
-              </a:ext>
-            </a:extLst>
-          </p:cNvPr>
-          <p:cNvSpPr/>
-          <p:nvPr/>
-        </p:nvSpPr>
-        <p:spPr>
-          <a:xfrm>
-            <a:off x="0" y="0"/>
-            <a:ext cx="7559675" cy="5327650"/>
-          </a:xfrm>
-          <a:prstGeom prst="roundRect">
-            <a:avLst>
-              <a:gd name="adj" fmla="val 0"/>
-            </a:avLst>
-          </a:prstGeom>
-          <a:solidFill>
-            <a:srgbClr val="FFC2E8"/>
-          </a:solidFill>
-          <a:ln>
-            <a:noFill/>
-          </a:ln>
-        </p:spPr>
-        <p:style>
-          <a:lnRef idx="2">
-            <a:schemeClr val="accent1">
-              <a:shade val="50000"/>
-            </a:schemeClr>
-          </a:lnRef>
-          <a:fillRef idx="1">
-            <a:schemeClr val="accent1"/>
-          </a:fillRef>
-          <a:effectRef idx="0">
-            <a:schemeClr val="accent1"/>
-          </a:effectRef>
-          <a:fontRef idx="minor">
-            <a:schemeClr val="lt1"/>
-          </a:fontRef>
-        </p:style>
-        <p:txBody>
-          <a:bodyPr rtlCol="0" anchor="ctr"/>
-          <a:lstStyle/>
-          <a:p>
-            <a:pPr algn="ctr"/>
-            <a:endParaRPr lang="en-NL"/>
-          </a:p>
-        </p:txBody>
-      </p:sp>
-      <p:sp>
-        <p:nvSpPr>
-          <p:cNvPr id="6" name="TextBox 5">
-            <a:extLst>
-              <a:ext uri="{FF2B5EF4-FFF2-40B4-BE49-F238E27FC236}">
-                <a16:creationId xmlns:a16="http://schemas.microsoft.com/office/drawing/2014/main" id="{009EAD6C-D563-D744-AFCA-AE8CA95E6630}"/>
-              </a:ext>
-            </a:extLst>
-          </p:cNvPr>
-          <p:cNvSpPr txBox="1"/>
-          <p:nvPr/>
-        </p:nvSpPr>
-        <p:spPr>
-          <a:xfrm>
-            <a:off x="329715" y="1463496"/>
-            <a:ext cx="6900243" cy="2400657"/>
-          </a:xfrm>
-          <a:prstGeom prst="rect">
-            <a:avLst/>
-          </a:prstGeom>
-          <a:noFill/>
-        </p:spPr>
-        <p:txBody>
-          <a:bodyPr wrap="square" rtlCol="0">
-            <a:spAutoFit/>
-          </a:bodyPr>
-          <a:lstStyle/>
-          <a:p>
-            <a:pPr algn="ctr"/>
-            <a:r>
-              <a:rPr lang="en-NL" sz="5000" b="1" dirty="0">
-                <a:latin typeface="Ubuntu" panose="020B0504030602030204" pitchFamily="34" charset="0"/>
-              </a:rPr>
-              <a:t>Don’t measure Output. Measure Outcomes</a:t>
-            </a:r>
-          </a:p>
-        </p:txBody>
-      </p:sp>
-    </p:spTree>
-    <p:extLst>
-      <p:ext uri="{BB962C8B-B14F-4D97-AF65-F5344CB8AC3E}">
-        <p14:creationId xmlns:p14="http://schemas.microsoft.com/office/powerpoint/2010/main" val="3384980287"/>
-      </p:ext>
-    </p:extLst>
-  </p:cSld>
-  <p:clrMapOvr>
-    <a:masterClrMapping/>
-  </p:clrMapOvr>
-</p:sld>
-</file>
-
-<file path=ppt/slides/slide68.xml><?xml version="1.0" encoding="utf-8"?>
-<p:sld xmlns:a="http://schemas.openxmlformats.org/drawingml/2006/main" xmlns:r="http://schemas.openxmlformats.org/officeDocument/2006/relationships" xmlns:p="http://schemas.openxmlformats.org/presentationml/2006/main">
-  <p:cSld>
-    <p:spTree>
-      <p:nvGrpSpPr>
-        <p:cNvPr id="1" name=""/>
-        <p:cNvGrpSpPr/>
-        <p:nvPr/>
-      </p:nvGrpSpPr>
-      <p:grpSpPr>
-        <a:xfrm>
-          <a:off x="0" y="0"/>
-          <a:ext cx="0" cy="0"/>
-          <a:chOff x="0" y="0"/>
-          <a:chExt cx="0" cy="0"/>
-        </a:xfrm>
-      </p:grpSpPr>
-      <p:sp>
-        <p:nvSpPr>
-          <p:cNvPr id="2" name="Title 1">
-            <a:extLst>
-              <a:ext uri="{FF2B5EF4-FFF2-40B4-BE49-F238E27FC236}">
-                <a16:creationId xmlns:a16="http://schemas.microsoft.com/office/drawing/2014/main" id="{CFCDF3DA-1D3D-E743-8E21-6B353B4D96A4}"/>
-              </a:ext>
-            </a:extLst>
-          </p:cNvPr>
-          <p:cNvSpPr>
-            <a:spLocks noGrp="1"/>
-          </p:cNvSpPr>
-          <p:nvPr>
-            <p:ph type="title"/>
-          </p:nvPr>
-        </p:nvSpPr>
-        <p:spPr/>
-        <p:txBody>
-          <a:bodyPr/>
-          <a:lstStyle/>
-          <a:p>
-            <a:endParaRPr lang="en-NL"/>
-          </a:p>
-        </p:txBody>
-      </p:sp>
-      <p:sp>
-        <p:nvSpPr>
-          <p:cNvPr id="3" name="Content Placeholder 2">
-            <a:extLst>
-              <a:ext uri="{FF2B5EF4-FFF2-40B4-BE49-F238E27FC236}">
-                <a16:creationId xmlns:a16="http://schemas.microsoft.com/office/drawing/2014/main" id="{40A525DA-CA85-AD48-8A85-52A75E1E5317}"/>
-              </a:ext>
-            </a:extLst>
-          </p:cNvPr>
-          <p:cNvSpPr>
-            <a:spLocks noGrp="1"/>
-          </p:cNvSpPr>
-          <p:nvPr>
-            <p:ph idx="1"/>
-          </p:nvPr>
-        </p:nvSpPr>
-        <p:spPr/>
-        <p:txBody>
-          <a:bodyPr/>
-          <a:lstStyle/>
-          <a:p>
-            <a:endParaRPr lang="en-NL"/>
-          </a:p>
-        </p:txBody>
-      </p:sp>
-      <p:sp>
-        <p:nvSpPr>
-          <p:cNvPr id="4" name="Rounded Rectangle 3">
-            <a:extLst>
-              <a:ext uri="{FF2B5EF4-FFF2-40B4-BE49-F238E27FC236}">
-                <a16:creationId xmlns:a16="http://schemas.microsoft.com/office/drawing/2014/main" id="{6B890BB6-3544-1A4E-A833-93135A597BB4}"/>
-              </a:ext>
-            </a:extLst>
-          </p:cNvPr>
-          <p:cNvSpPr/>
-          <p:nvPr/>
-        </p:nvSpPr>
-        <p:spPr>
-          <a:xfrm>
-            <a:off x="0" y="0"/>
-            <a:ext cx="7559675" cy="5327650"/>
-          </a:xfrm>
-          <a:prstGeom prst="roundRect">
-            <a:avLst>
-              <a:gd name="adj" fmla="val 0"/>
-            </a:avLst>
-          </a:prstGeom>
-          <a:blipFill>
-            <a:blip r:embed="rId2"/>
-            <a:stretch>
-              <a:fillRect/>
-            </a:stretch>
-          </a:blipFill>
-          <a:ln>
-            <a:solidFill>
-              <a:schemeClr val="bg2"/>
-            </a:solidFill>
-          </a:ln>
-        </p:spPr>
-        <p:style>
-          <a:lnRef idx="2">
-            <a:schemeClr val="accent1">
-              <a:shade val="50000"/>
-            </a:schemeClr>
-          </a:lnRef>
-          <a:fillRef idx="1">
-            <a:schemeClr val="accent1"/>
-          </a:fillRef>
-          <a:effectRef idx="0">
-            <a:schemeClr val="accent1"/>
-          </a:effectRef>
-          <a:fontRef idx="minor">
-            <a:schemeClr val="lt1"/>
-          </a:fontRef>
-        </p:style>
-        <p:txBody>
-          <a:bodyPr rtlCol="0" anchor="ctr"/>
-          <a:lstStyle/>
-          <a:p>
-            <a:pPr algn="ctr"/>
-            <a:endParaRPr lang="en-NL"/>
-          </a:p>
-        </p:txBody>
-      </p:sp>
-      <p:pic>
-        <p:nvPicPr>
-          <p:cNvPr id="5" name="Picture 4" descr="A picture containing food, drawing&#10;&#10;Description automatically generated">
-            <a:extLst>
-              <a:ext uri="{FF2B5EF4-FFF2-40B4-BE49-F238E27FC236}">
-                <a16:creationId xmlns:a16="http://schemas.microsoft.com/office/drawing/2014/main" id="{27611709-3190-2A4B-BCE4-4D329000A8EB}"/>
-              </a:ext>
-            </a:extLst>
-          </p:cNvPr>
-          <p:cNvPicPr>
-            <a:picLocks noChangeAspect="1"/>
-          </p:cNvPicPr>
-          <p:nvPr/>
-        </p:nvPicPr>
-        <p:blipFill>
-          <a:blip r:embed="rId3"/>
-          <a:stretch>
-            <a:fillRect/>
-          </a:stretch>
-        </p:blipFill>
-        <p:spPr>
-          <a:xfrm>
-            <a:off x="350837" y="-765175"/>
-            <a:ext cx="6858000" cy="6858000"/>
-          </a:xfrm>
-          <a:prstGeom prst="rect">
-            <a:avLst/>
-          </a:prstGeom>
-        </p:spPr>
-      </p:pic>
-    </p:spTree>
-    <p:extLst>
-      <p:ext uri="{BB962C8B-B14F-4D97-AF65-F5344CB8AC3E}">
-        <p14:creationId xmlns:p14="http://schemas.microsoft.com/office/powerpoint/2010/main" val="609235282"/>
-      </p:ext>
-    </p:extLst>
-  </p:cSld>
-  <p:clrMapOvr>
-    <a:masterClrMapping/>
-  </p:clrMapOvr>
-</p:sld>
-</file>
-
-<file path=ppt/slides/slide69.xml><?xml version="1.0" encoding="utf-8"?>
-<p:sld xmlns:a="http://schemas.openxmlformats.org/drawingml/2006/main" xmlns:r="http://schemas.openxmlformats.org/officeDocument/2006/relationships" xmlns:p="http://schemas.openxmlformats.org/presentationml/2006/main">
-  <p:cSld>
-    <p:spTree>
-      <p:nvGrpSpPr>
-        <p:cNvPr id="1" name=""/>
-        <p:cNvGrpSpPr/>
-        <p:nvPr/>
-      </p:nvGrpSpPr>
-      <p:grpSpPr>
-        <a:xfrm>
-          <a:off x="0" y="0"/>
-          <a:ext cx="0" cy="0"/>
-          <a:chOff x="0" y="0"/>
-          <a:chExt cx="0" cy="0"/>
-        </a:xfrm>
-      </p:grpSpPr>
-      <p:sp>
-        <p:nvSpPr>
-          <p:cNvPr id="7" name="Rounded Rectangle 6">
-            <a:extLst>
-              <a:ext uri="{FF2B5EF4-FFF2-40B4-BE49-F238E27FC236}">
-                <a16:creationId xmlns:a16="http://schemas.microsoft.com/office/drawing/2014/main" id="{B3DC599D-AD1B-104D-B158-5C2A6823AC16}"/>
-              </a:ext>
-            </a:extLst>
-          </p:cNvPr>
-          <p:cNvSpPr/>
-          <p:nvPr/>
-        </p:nvSpPr>
-        <p:spPr>
-          <a:xfrm>
-            <a:off x="0" y="0"/>
-            <a:ext cx="7559675" cy="5327650"/>
-          </a:xfrm>
-          <a:prstGeom prst="roundRect">
-            <a:avLst>
-              <a:gd name="adj" fmla="val 0"/>
-            </a:avLst>
-          </a:prstGeom>
-          <a:solidFill>
-            <a:srgbClr val="FFC2E8"/>
-          </a:solidFill>
-          <a:ln>
-            <a:noFill/>
-          </a:ln>
-        </p:spPr>
-        <p:style>
-          <a:lnRef idx="2">
-            <a:schemeClr val="accent1">
-              <a:shade val="50000"/>
-            </a:schemeClr>
-          </a:lnRef>
-          <a:fillRef idx="1">
-            <a:schemeClr val="accent1"/>
-          </a:fillRef>
-          <a:effectRef idx="0">
-            <a:schemeClr val="accent1"/>
-          </a:effectRef>
-          <a:fontRef idx="minor">
-            <a:schemeClr val="lt1"/>
-          </a:fontRef>
-        </p:style>
-        <p:txBody>
-          <a:bodyPr rtlCol="0" anchor="ctr"/>
-          <a:lstStyle/>
-          <a:p>
-            <a:pPr algn="ctr"/>
-            <a:endParaRPr lang="en-NL"/>
-          </a:p>
-        </p:txBody>
-      </p:sp>
-      <p:sp>
-        <p:nvSpPr>
-          <p:cNvPr id="6" name="TextBox 5">
-            <a:extLst>
-              <a:ext uri="{FF2B5EF4-FFF2-40B4-BE49-F238E27FC236}">
-                <a16:creationId xmlns:a16="http://schemas.microsoft.com/office/drawing/2014/main" id="{009EAD6C-D563-D744-AFCA-AE8CA95E6630}"/>
-              </a:ext>
-            </a:extLst>
-          </p:cNvPr>
-          <p:cNvSpPr txBox="1"/>
-          <p:nvPr/>
-        </p:nvSpPr>
-        <p:spPr>
-          <a:xfrm>
-            <a:off x="329715" y="1463496"/>
-            <a:ext cx="6900243" cy="2400657"/>
-          </a:xfrm>
-          <a:prstGeom prst="rect">
-            <a:avLst/>
-          </a:prstGeom>
-          <a:noFill/>
-        </p:spPr>
-        <p:txBody>
-          <a:bodyPr wrap="square" rtlCol="0">
-            <a:spAutoFit/>
-          </a:bodyPr>
-          <a:lstStyle/>
-          <a:p>
-            <a:pPr algn="ctr"/>
-            <a:r>
-              <a:rPr lang="en-NL" sz="5000" b="1">
-                <a:latin typeface="Ubuntu" panose="020B0504030602030204" pitchFamily="34" charset="0"/>
-              </a:rPr>
-              <a:t>It’s not about the Metrics, but about the Conversation</a:t>
-            </a:r>
-          </a:p>
-        </p:txBody>
-      </p:sp>
-    </p:spTree>
-    <p:extLst>
-      <p:ext uri="{BB962C8B-B14F-4D97-AF65-F5344CB8AC3E}">
-        <p14:creationId xmlns:p14="http://schemas.microsoft.com/office/powerpoint/2010/main" val="3864524999"/>
-      </p:ext>
-    </p:extLst>
-  </p:cSld>
-  <p:clrMapOvr>
-    <a:masterClrMapping/>
-  </p:clrMapOvr>
-</p:sld>
-</file>
-
 <file path=ppt/slides/slide7.xml><?xml version="1.0" encoding="utf-8"?>
 <p:sld xmlns:a="http://schemas.openxmlformats.org/drawingml/2006/main" xmlns:r="http://schemas.openxmlformats.org/officeDocument/2006/relationships" xmlns:p="http://schemas.openxmlformats.org/presentationml/2006/main">
   <p:cSld>
@@ -22897,7 +23282,7 @@
     </p:spTree>
     <p:extLst>
       <p:ext uri="{BB962C8B-B14F-4D97-AF65-F5344CB8AC3E}">
-        <p14:creationId xmlns:p14="http://schemas.microsoft.com/office/powerpoint/2010/main" val="2834202860"/>
+        <p14:creationId xmlns:p14="http://schemas.microsoft.com/office/powerpoint/2010/main" val="141956057"/>
       </p:ext>
     </p:extLst>
   </p:cSld>
@@ -22992,6 +23377,588 @@
         </p:nvSpPr>
         <p:spPr>
           <a:xfrm>
+            <a:off x="329715" y="1463496"/>
+            <a:ext cx="6900243" cy="2400657"/>
+          </a:xfrm>
+          <a:prstGeom prst="rect">
+            <a:avLst/>
+          </a:prstGeom>
+          <a:noFill/>
+        </p:spPr>
+        <p:txBody>
+          <a:bodyPr wrap="square" rtlCol="0">
+            <a:spAutoFit/>
+          </a:bodyPr>
+          <a:lstStyle/>
+          <a:p>
+            <a:pPr algn="ctr"/>
+            <a:r>
+              <a:rPr lang="en-NL" sz="5000" b="1" dirty="0">
+                <a:latin typeface="Ubuntu" panose="020B0504030602030204" pitchFamily="34" charset="0"/>
+              </a:rPr>
+              <a:t>Don’t measure Output. Measure Outcomes</a:t>
+            </a:r>
+          </a:p>
+        </p:txBody>
+      </p:sp>
+    </p:spTree>
+    <p:extLst>
+      <p:ext uri="{BB962C8B-B14F-4D97-AF65-F5344CB8AC3E}">
+        <p14:creationId xmlns:p14="http://schemas.microsoft.com/office/powerpoint/2010/main" val="3384980287"/>
+      </p:ext>
+    </p:extLst>
+  </p:cSld>
+  <p:clrMapOvr>
+    <a:masterClrMapping/>
+  </p:clrMapOvr>
+</p:sld>
+</file>
+
+<file path=ppt/slides/slide72.xml><?xml version="1.0" encoding="utf-8"?>
+<p:sld xmlns:a="http://schemas.openxmlformats.org/drawingml/2006/main" xmlns:r="http://schemas.openxmlformats.org/officeDocument/2006/relationships" xmlns:p="http://schemas.openxmlformats.org/presentationml/2006/main">
+  <p:cSld>
+    <p:spTree>
+      <p:nvGrpSpPr>
+        <p:cNvPr id="1" name=""/>
+        <p:cNvGrpSpPr/>
+        <p:nvPr/>
+      </p:nvGrpSpPr>
+      <p:grpSpPr>
+        <a:xfrm>
+          <a:off x="0" y="0"/>
+          <a:ext cx="0" cy="0"/>
+          <a:chOff x="0" y="0"/>
+          <a:chExt cx="0" cy="0"/>
+        </a:xfrm>
+      </p:grpSpPr>
+      <p:sp>
+        <p:nvSpPr>
+          <p:cNvPr id="2" name="Title 1">
+            <a:extLst>
+              <a:ext uri="{FF2B5EF4-FFF2-40B4-BE49-F238E27FC236}">
+                <a16:creationId xmlns:a16="http://schemas.microsoft.com/office/drawing/2014/main" id="{CFCDF3DA-1D3D-E743-8E21-6B353B4D96A4}"/>
+              </a:ext>
+            </a:extLst>
+          </p:cNvPr>
+          <p:cNvSpPr>
+            <a:spLocks noGrp="1"/>
+          </p:cNvSpPr>
+          <p:nvPr>
+            <p:ph type="title"/>
+          </p:nvPr>
+        </p:nvSpPr>
+        <p:spPr/>
+        <p:txBody>
+          <a:bodyPr/>
+          <a:lstStyle/>
+          <a:p>
+            <a:endParaRPr lang="en-NL"/>
+          </a:p>
+        </p:txBody>
+      </p:sp>
+      <p:sp>
+        <p:nvSpPr>
+          <p:cNvPr id="3" name="Content Placeholder 2">
+            <a:extLst>
+              <a:ext uri="{FF2B5EF4-FFF2-40B4-BE49-F238E27FC236}">
+                <a16:creationId xmlns:a16="http://schemas.microsoft.com/office/drawing/2014/main" id="{40A525DA-CA85-AD48-8A85-52A75E1E5317}"/>
+              </a:ext>
+            </a:extLst>
+          </p:cNvPr>
+          <p:cNvSpPr>
+            <a:spLocks noGrp="1"/>
+          </p:cNvSpPr>
+          <p:nvPr>
+            <p:ph idx="1"/>
+          </p:nvPr>
+        </p:nvSpPr>
+        <p:spPr/>
+        <p:txBody>
+          <a:bodyPr/>
+          <a:lstStyle/>
+          <a:p>
+            <a:endParaRPr lang="en-NL"/>
+          </a:p>
+        </p:txBody>
+      </p:sp>
+      <p:sp>
+        <p:nvSpPr>
+          <p:cNvPr id="4" name="Rounded Rectangle 3">
+            <a:extLst>
+              <a:ext uri="{FF2B5EF4-FFF2-40B4-BE49-F238E27FC236}">
+                <a16:creationId xmlns:a16="http://schemas.microsoft.com/office/drawing/2014/main" id="{6B890BB6-3544-1A4E-A833-93135A597BB4}"/>
+              </a:ext>
+            </a:extLst>
+          </p:cNvPr>
+          <p:cNvSpPr/>
+          <p:nvPr/>
+        </p:nvSpPr>
+        <p:spPr>
+          <a:xfrm>
+            <a:off x="0" y="0"/>
+            <a:ext cx="7559675" cy="5327650"/>
+          </a:xfrm>
+          <a:prstGeom prst="roundRect">
+            <a:avLst>
+              <a:gd name="adj" fmla="val 0"/>
+            </a:avLst>
+          </a:prstGeom>
+          <a:blipFill>
+            <a:blip r:embed="rId2"/>
+            <a:stretch>
+              <a:fillRect/>
+            </a:stretch>
+          </a:blipFill>
+          <a:ln>
+            <a:solidFill>
+              <a:schemeClr val="bg2"/>
+            </a:solidFill>
+          </a:ln>
+        </p:spPr>
+        <p:style>
+          <a:lnRef idx="2">
+            <a:schemeClr val="accent1">
+              <a:shade val="50000"/>
+            </a:schemeClr>
+          </a:lnRef>
+          <a:fillRef idx="1">
+            <a:schemeClr val="accent1"/>
+          </a:fillRef>
+          <a:effectRef idx="0">
+            <a:schemeClr val="accent1"/>
+          </a:effectRef>
+          <a:fontRef idx="minor">
+            <a:schemeClr val="lt1"/>
+          </a:fontRef>
+        </p:style>
+        <p:txBody>
+          <a:bodyPr rtlCol="0" anchor="ctr"/>
+          <a:lstStyle/>
+          <a:p>
+            <a:pPr algn="ctr"/>
+            <a:endParaRPr lang="en-NL"/>
+          </a:p>
+        </p:txBody>
+      </p:sp>
+      <p:pic>
+        <p:nvPicPr>
+          <p:cNvPr id="5" name="Picture 4" descr="A picture containing food, drawing&#10;&#10;Description automatically generated">
+            <a:extLst>
+              <a:ext uri="{FF2B5EF4-FFF2-40B4-BE49-F238E27FC236}">
+                <a16:creationId xmlns:a16="http://schemas.microsoft.com/office/drawing/2014/main" id="{27611709-3190-2A4B-BCE4-4D329000A8EB}"/>
+              </a:ext>
+            </a:extLst>
+          </p:cNvPr>
+          <p:cNvPicPr>
+            <a:picLocks noChangeAspect="1"/>
+          </p:cNvPicPr>
+          <p:nvPr/>
+        </p:nvPicPr>
+        <p:blipFill>
+          <a:blip r:embed="rId3"/>
+          <a:stretch>
+            <a:fillRect/>
+          </a:stretch>
+        </p:blipFill>
+        <p:spPr>
+          <a:xfrm>
+            <a:off x="350837" y="-765175"/>
+            <a:ext cx="6858000" cy="6858000"/>
+          </a:xfrm>
+          <a:prstGeom prst="rect">
+            <a:avLst/>
+          </a:prstGeom>
+        </p:spPr>
+      </p:pic>
+    </p:spTree>
+    <p:extLst>
+      <p:ext uri="{BB962C8B-B14F-4D97-AF65-F5344CB8AC3E}">
+        <p14:creationId xmlns:p14="http://schemas.microsoft.com/office/powerpoint/2010/main" val="609235282"/>
+      </p:ext>
+    </p:extLst>
+  </p:cSld>
+  <p:clrMapOvr>
+    <a:masterClrMapping/>
+  </p:clrMapOvr>
+</p:sld>
+</file>
+
+<file path=ppt/slides/slide73.xml><?xml version="1.0" encoding="utf-8"?>
+<p:sld xmlns:a="http://schemas.openxmlformats.org/drawingml/2006/main" xmlns:r="http://schemas.openxmlformats.org/officeDocument/2006/relationships" xmlns:p="http://schemas.openxmlformats.org/presentationml/2006/main">
+  <p:cSld>
+    <p:spTree>
+      <p:nvGrpSpPr>
+        <p:cNvPr id="1" name=""/>
+        <p:cNvGrpSpPr/>
+        <p:nvPr/>
+      </p:nvGrpSpPr>
+      <p:grpSpPr>
+        <a:xfrm>
+          <a:off x="0" y="0"/>
+          <a:ext cx="0" cy="0"/>
+          <a:chOff x="0" y="0"/>
+          <a:chExt cx="0" cy="0"/>
+        </a:xfrm>
+      </p:grpSpPr>
+      <p:sp>
+        <p:nvSpPr>
+          <p:cNvPr id="7" name="Rounded Rectangle 6">
+            <a:extLst>
+              <a:ext uri="{FF2B5EF4-FFF2-40B4-BE49-F238E27FC236}">
+                <a16:creationId xmlns:a16="http://schemas.microsoft.com/office/drawing/2014/main" id="{B3DC599D-AD1B-104D-B158-5C2A6823AC16}"/>
+              </a:ext>
+            </a:extLst>
+          </p:cNvPr>
+          <p:cNvSpPr/>
+          <p:nvPr/>
+        </p:nvSpPr>
+        <p:spPr>
+          <a:xfrm>
+            <a:off x="0" y="0"/>
+            <a:ext cx="7559675" cy="5327650"/>
+          </a:xfrm>
+          <a:prstGeom prst="roundRect">
+            <a:avLst>
+              <a:gd name="adj" fmla="val 0"/>
+            </a:avLst>
+          </a:prstGeom>
+          <a:solidFill>
+            <a:srgbClr val="FFC2E8"/>
+          </a:solidFill>
+          <a:ln>
+            <a:noFill/>
+          </a:ln>
+        </p:spPr>
+        <p:style>
+          <a:lnRef idx="2">
+            <a:schemeClr val="accent1">
+              <a:shade val="50000"/>
+            </a:schemeClr>
+          </a:lnRef>
+          <a:fillRef idx="1">
+            <a:schemeClr val="accent1"/>
+          </a:fillRef>
+          <a:effectRef idx="0">
+            <a:schemeClr val="accent1"/>
+          </a:effectRef>
+          <a:fontRef idx="minor">
+            <a:schemeClr val="lt1"/>
+          </a:fontRef>
+        </p:style>
+        <p:txBody>
+          <a:bodyPr rtlCol="0" anchor="ctr"/>
+          <a:lstStyle/>
+          <a:p>
+            <a:pPr algn="ctr"/>
+            <a:endParaRPr lang="en-NL"/>
+          </a:p>
+        </p:txBody>
+      </p:sp>
+      <p:sp>
+        <p:nvSpPr>
+          <p:cNvPr id="6" name="TextBox 5">
+            <a:extLst>
+              <a:ext uri="{FF2B5EF4-FFF2-40B4-BE49-F238E27FC236}">
+                <a16:creationId xmlns:a16="http://schemas.microsoft.com/office/drawing/2014/main" id="{009EAD6C-D563-D744-AFCA-AE8CA95E6630}"/>
+              </a:ext>
+            </a:extLst>
+          </p:cNvPr>
+          <p:cNvSpPr txBox="1"/>
+          <p:nvPr/>
+        </p:nvSpPr>
+        <p:spPr>
+          <a:xfrm>
+            <a:off x="329715" y="1463496"/>
+            <a:ext cx="6900243" cy="2400657"/>
+          </a:xfrm>
+          <a:prstGeom prst="rect">
+            <a:avLst/>
+          </a:prstGeom>
+          <a:noFill/>
+        </p:spPr>
+        <p:txBody>
+          <a:bodyPr wrap="square" rtlCol="0">
+            <a:spAutoFit/>
+          </a:bodyPr>
+          <a:lstStyle/>
+          <a:p>
+            <a:pPr algn="ctr"/>
+            <a:r>
+              <a:rPr lang="en-NL" sz="5000" b="1">
+                <a:latin typeface="Ubuntu" panose="020B0504030602030204" pitchFamily="34" charset="0"/>
+              </a:rPr>
+              <a:t>It’s not about the Metrics, but about the Conversation</a:t>
+            </a:r>
+          </a:p>
+        </p:txBody>
+      </p:sp>
+    </p:spTree>
+    <p:extLst>
+      <p:ext uri="{BB962C8B-B14F-4D97-AF65-F5344CB8AC3E}">
+        <p14:creationId xmlns:p14="http://schemas.microsoft.com/office/powerpoint/2010/main" val="3864524999"/>
+      </p:ext>
+    </p:extLst>
+  </p:cSld>
+  <p:clrMapOvr>
+    <a:masterClrMapping/>
+  </p:clrMapOvr>
+</p:sld>
+</file>
+
+<file path=ppt/slides/slide74.xml><?xml version="1.0" encoding="utf-8"?>
+<p:sld xmlns:a="http://schemas.openxmlformats.org/drawingml/2006/main" xmlns:r="http://schemas.openxmlformats.org/officeDocument/2006/relationships" xmlns:p="http://schemas.openxmlformats.org/presentationml/2006/main">
+  <p:cSld>
+    <p:spTree>
+      <p:nvGrpSpPr>
+        <p:cNvPr id="1" name=""/>
+        <p:cNvGrpSpPr/>
+        <p:nvPr/>
+      </p:nvGrpSpPr>
+      <p:grpSpPr>
+        <a:xfrm>
+          <a:off x="0" y="0"/>
+          <a:ext cx="0" cy="0"/>
+          <a:chOff x="0" y="0"/>
+          <a:chExt cx="0" cy="0"/>
+        </a:xfrm>
+      </p:grpSpPr>
+      <p:sp>
+        <p:nvSpPr>
+          <p:cNvPr id="2" name="Title 1">
+            <a:extLst>
+              <a:ext uri="{FF2B5EF4-FFF2-40B4-BE49-F238E27FC236}">
+                <a16:creationId xmlns:a16="http://schemas.microsoft.com/office/drawing/2014/main" id="{CFCDF3DA-1D3D-E743-8E21-6B353B4D96A4}"/>
+              </a:ext>
+            </a:extLst>
+          </p:cNvPr>
+          <p:cNvSpPr>
+            <a:spLocks noGrp="1"/>
+          </p:cNvSpPr>
+          <p:nvPr>
+            <p:ph type="title"/>
+          </p:nvPr>
+        </p:nvSpPr>
+        <p:spPr/>
+        <p:txBody>
+          <a:bodyPr/>
+          <a:lstStyle/>
+          <a:p>
+            <a:endParaRPr lang="en-NL"/>
+          </a:p>
+        </p:txBody>
+      </p:sp>
+      <p:sp>
+        <p:nvSpPr>
+          <p:cNvPr id="3" name="Content Placeholder 2">
+            <a:extLst>
+              <a:ext uri="{FF2B5EF4-FFF2-40B4-BE49-F238E27FC236}">
+                <a16:creationId xmlns:a16="http://schemas.microsoft.com/office/drawing/2014/main" id="{40A525DA-CA85-AD48-8A85-52A75E1E5317}"/>
+              </a:ext>
+            </a:extLst>
+          </p:cNvPr>
+          <p:cNvSpPr>
+            <a:spLocks noGrp="1"/>
+          </p:cNvSpPr>
+          <p:nvPr>
+            <p:ph idx="1"/>
+          </p:nvPr>
+        </p:nvSpPr>
+        <p:spPr/>
+        <p:txBody>
+          <a:bodyPr/>
+          <a:lstStyle/>
+          <a:p>
+            <a:endParaRPr lang="en-NL"/>
+          </a:p>
+        </p:txBody>
+      </p:sp>
+      <p:sp>
+        <p:nvSpPr>
+          <p:cNvPr id="4" name="Rounded Rectangle 3">
+            <a:extLst>
+              <a:ext uri="{FF2B5EF4-FFF2-40B4-BE49-F238E27FC236}">
+                <a16:creationId xmlns:a16="http://schemas.microsoft.com/office/drawing/2014/main" id="{6B890BB6-3544-1A4E-A833-93135A597BB4}"/>
+              </a:ext>
+            </a:extLst>
+          </p:cNvPr>
+          <p:cNvSpPr/>
+          <p:nvPr/>
+        </p:nvSpPr>
+        <p:spPr>
+          <a:xfrm>
+            <a:off x="0" y="0"/>
+            <a:ext cx="7559675" cy="5327650"/>
+          </a:xfrm>
+          <a:prstGeom prst="roundRect">
+            <a:avLst>
+              <a:gd name="adj" fmla="val 0"/>
+            </a:avLst>
+          </a:prstGeom>
+          <a:blipFill>
+            <a:blip r:embed="rId2"/>
+            <a:stretch>
+              <a:fillRect/>
+            </a:stretch>
+          </a:blipFill>
+          <a:ln>
+            <a:solidFill>
+              <a:schemeClr val="bg2"/>
+            </a:solidFill>
+          </a:ln>
+        </p:spPr>
+        <p:style>
+          <a:lnRef idx="2">
+            <a:schemeClr val="accent1">
+              <a:shade val="50000"/>
+            </a:schemeClr>
+          </a:lnRef>
+          <a:fillRef idx="1">
+            <a:schemeClr val="accent1"/>
+          </a:fillRef>
+          <a:effectRef idx="0">
+            <a:schemeClr val="accent1"/>
+          </a:effectRef>
+          <a:fontRef idx="minor">
+            <a:schemeClr val="lt1"/>
+          </a:fontRef>
+        </p:style>
+        <p:txBody>
+          <a:bodyPr rtlCol="0" anchor="ctr"/>
+          <a:lstStyle/>
+          <a:p>
+            <a:pPr algn="ctr"/>
+            <a:endParaRPr lang="en-NL"/>
+          </a:p>
+        </p:txBody>
+      </p:sp>
+      <p:pic>
+        <p:nvPicPr>
+          <p:cNvPr id="5" name="Picture 4" descr="A picture containing food, drawing&#10;&#10;Description automatically generated">
+            <a:extLst>
+              <a:ext uri="{FF2B5EF4-FFF2-40B4-BE49-F238E27FC236}">
+                <a16:creationId xmlns:a16="http://schemas.microsoft.com/office/drawing/2014/main" id="{27611709-3190-2A4B-BCE4-4D329000A8EB}"/>
+              </a:ext>
+            </a:extLst>
+          </p:cNvPr>
+          <p:cNvPicPr>
+            <a:picLocks noChangeAspect="1"/>
+          </p:cNvPicPr>
+          <p:nvPr/>
+        </p:nvPicPr>
+        <p:blipFill>
+          <a:blip r:embed="rId3"/>
+          <a:stretch>
+            <a:fillRect/>
+          </a:stretch>
+        </p:blipFill>
+        <p:spPr>
+          <a:xfrm>
+            <a:off x="350837" y="-765175"/>
+            <a:ext cx="6858000" cy="6858000"/>
+          </a:xfrm>
+          <a:prstGeom prst="rect">
+            <a:avLst/>
+          </a:prstGeom>
+        </p:spPr>
+      </p:pic>
+    </p:spTree>
+    <p:extLst>
+      <p:ext uri="{BB962C8B-B14F-4D97-AF65-F5344CB8AC3E}">
+        <p14:creationId xmlns:p14="http://schemas.microsoft.com/office/powerpoint/2010/main" val="2834202860"/>
+      </p:ext>
+    </p:extLst>
+  </p:cSld>
+  <p:clrMapOvr>
+    <a:masterClrMapping/>
+  </p:clrMapOvr>
+</p:sld>
+</file>
+
+<file path=ppt/slides/slide75.xml><?xml version="1.0" encoding="utf-8"?>
+<p:sld xmlns:a="http://schemas.openxmlformats.org/drawingml/2006/main" xmlns:r="http://schemas.openxmlformats.org/officeDocument/2006/relationships" xmlns:p="http://schemas.openxmlformats.org/presentationml/2006/main">
+  <p:cSld>
+    <p:spTree>
+      <p:nvGrpSpPr>
+        <p:cNvPr id="1" name=""/>
+        <p:cNvGrpSpPr/>
+        <p:nvPr/>
+      </p:nvGrpSpPr>
+      <p:grpSpPr>
+        <a:xfrm>
+          <a:off x="0" y="0"/>
+          <a:ext cx="0" cy="0"/>
+          <a:chOff x="0" y="0"/>
+          <a:chExt cx="0" cy="0"/>
+        </a:xfrm>
+      </p:grpSpPr>
+      <p:sp>
+        <p:nvSpPr>
+          <p:cNvPr id="7" name="Rounded Rectangle 6">
+            <a:extLst>
+              <a:ext uri="{FF2B5EF4-FFF2-40B4-BE49-F238E27FC236}">
+                <a16:creationId xmlns:a16="http://schemas.microsoft.com/office/drawing/2014/main" id="{B3DC599D-AD1B-104D-B158-5C2A6823AC16}"/>
+              </a:ext>
+            </a:extLst>
+          </p:cNvPr>
+          <p:cNvSpPr/>
+          <p:nvPr/>
+        </p:nvSpPr>
+        <p:spPr>
+          <a:xfrm>
+            <a:off x="0" y="0"/>
+            <a:ext cx="7559675" cy="5327650"/>
+          </a:xfrm>
+          <a:prstGeom prst="roundRect">
+            <a:avLst>
+              <a:gd name="adj" fmla="val 0"/>
+            </a:avLst>
+          </a:prstGeom>
+          <a:solidFill>
+            <a:srgbClr val="FFC2E8"/>
+          </a:solidFill>
+          <a:ln>
+            <a:noFill/>
+          </a:ln>
+        </p:spPr>
+        <p:style>
+          <a:lnRef idx="2">
+            <a:schemeClr val="accent1">
+              <a:shade val="50000"/>
+            </a:schemeClr>
+          </a:lnRef>
+          <a:fillRef idx="1">
+            <a:schemeClr val="accent1"/>
+          </a:fillRef>
+          <a:effectRef idx="0">
+            <a:schemeClr val="accent1"/>
+          </a:effectRef>
+          <a:fontRef idx="minor">
+            <a:schemeClr val="lt1"/>
+          </a:fontRef>
+        </p:style>
+        <p:txBody>
+          <a:bodyPr rtlCol="0" anchor="ctr"/>
+          <a:lstStyle/>
+          <a:p>
+            <a:pPr algn="ctr"/>
+            <a:endParaRPr lang="en-NL"/>
+          </a:p>
+        </p:txBody>
+      </p:sp>
+      <p:sp>
+        <p:nvSpPr>
+          <p:cNvPr id="6" name="TextBox 5">
+            <a:extLst>
+              <a:ext uri="{FF2B5EF4-FFF2-40B4-BE49-F238E27FC236}">
+                <a16:creationId xmlns:a16="http://schemas.microsoft.com/office/drawing/2014/main" id="{009EAD6C-D563-D744-AFCA-AE8CA95E6630}"/>
+              </a:ext>
+            </a:extLst>
+          </p:cNvPr>
+          <p:cNvSpPr txBox="1"/>
+          <p:nvPr/>
+        </p:nvSpPr>
+        <p:spPr>
+          <a:xfrm>
             <a:off x="329715" y="1078775"/>
             <a:ext cx="6900243" cy="3170099"/>
           </a:xfrm>
@@ -23059,7 +24026,7 @@
 </p:sld>
 </file>
 
-<file path=ppt/slides/slide72.xml><?xml version="1.0" encoding="utf-8"?>
+<file path=ppt/slides/slide76.xml><?xml version="1.0" encoding="utf-8"?>
 <p:sld xmlns:a="http://schemas.openxmlformats.org/drawingml/2006/main" xmlns:r="http://schemas.openxmlformats.org/officeDocument/2006/relationships" xmlns:p="http://schemas.openxmlformats.org/presentationml/2006/main">
   <p:cSld>
     <p:spTree>
@@ -23228,7 +24195,7 @@
 </p:sld>
 </file>
 
-<file path=ppt/slides/slide73.xml><?xml version="1.0" encoding="utf-8"?>
+<file path=ppt/slides/slide77.xml><?xml version="1.0" encoding="utf-8"?>
 <p:sld xmlns:a="http://schemas.openxmlformats.org/drawingml/2006/main" xmlns:r="http://schemas.openxmlformats.org/officeDocument/2006/relationships" xmlns:p="http://schemas.openxmlformats.org/presentationml/2006/main">
   <p:cSld>
     <p:spTree>
@@ -23519,7 +24486,7 @@
 </p:sld>
 </file>
 
-<file path=ppt/slides/slide74.xml><?xml version="1.0" encoding="utf-8"?>
+<file path=ppt/slides/slide78.xml><?xml version="1.0" encoding="utf-8"?>
 <p:sld xmlns:a="http://schemas.openxmlformats.org/drawingml/2006/main" xmlns:r="http://schemas.openxmlformats.org/officeDocument/2006/relationships" xmlns:p="http://schemas.openxmlformats.org/presentationml/2006/main">
   <p:cSld>
     <p:spTree>

</xml_diff>

<commit_message>
removed all comments since all changes of 2020 guide were implemented for issue #12
</commit_message>
<xml_diff>
--- a/Measuring Outcome v2 - 2020 update.pptx
+++ b/Measuring Outcome v2 - 2020 update.pptx
@@ -232,106 +232,6 @@
     </p:extLst>
   </p:cmAuthor>
 </p:cmAuthorLst>
-</file>
-
-<file path=ppt/comments/comment1.xml><?xml version="1.0" encoding="utf-8"?>
-<p:cmLst xmlns:a="http://schemas.openxmlformats.org/drawingml/2006/main" xmlns:r="http://schemas.openxmlformats.org/officeDocument/2006/relationships" xmlns:p="http://schemas.openxmlformats.org/presentationml/2006/main">
-  <p:cm authorId="1" dt="2021-01-03T20:58:45.186" idx="3">
-    <p:pos x="10" y="10"/>
-    <p:text>To be changed for 2020 update</p:text>
-    <p:extLst>
-      <p:ext uri="{C676402C-5697-4E1C-873F-D02D1690AC5C}">
-        <p15:threadingInfo xmlns:p15="http://schemas.microsoft.com/office/powerpoint/2012/main" timeZoneBias="-60"/>
-      </p:ext>
-    </p:extLst>
-  </p:cm>
-  <p:cm authorId="1" dt="2021-01-03T21:02:07.781" idx="5">
-    <p:pos x="10" y="146"/>
-    <p:text>changed trend to count</p:text>
-    <p:extLst>
-      <p:ext uri="{C676402C-5697-4E1C-873F-D02D1690AC5C}">
-        <p15:threadingInfo xmlns:p15="http://schemas.microsoft.com/office/powerpoint/2012/main" timeZoneBias="-60">
-          <p15:parentCm authorId="1" idx="3"/>
-        </p15:threadingInfo>
-      </p:ext>
-    </p:extLst>
-  </p:cm>
-</p:cmLst>
-</file>
-
-<file path=ppt/comments/comment2.xml><?xml version="1.0" encoding="utf-8"?>
-<p:cmLst xmlns:a="http://schemas.openxmlformats.org/drawingml/2006/main" xmlns:r="http://schemas.openxmlformats.org/officeDocument/2006/relationships" xmlns:p="http://schemas.openxmlformats.org/presentationml/2006/main">
-  <p:cm authorId="1" dt="2021-01-03T20:57:30.668" idx="1">
-    <p:pos x="10" y="10"/>
-    <p:text>To be changed for 2020 update</p:text>
-    <p:extLst>
-      <p:ext uri="{C676402C-5697-4E1C-873F-D02D1690AC5C}">
-        <p15:threadingInfo xmlns:p15="http://schemas.microsoft.com/office/powerpoint/2012/main" timeZoneBias="-60"/>
-      </p:ext>
-    </p:extLst>
-  </p:cm>
-  <p:cm authorId="1" dt="2021-01-03T21:06:19.924" idx="8">
-    <p:pos x="10" y="146"/>
-    <p:text>added 'customer'</p:text>
-    <p:extLst>
-      <p:ext uri="{C676402C-5697-4E1C-873F-D02D1690AC5C}">
-        <p15:threadingInfo xmlns:p15="http://schemas.microsoft.com/office/powerpoint/2012/main" timeZoneBias="-60">
-          <p15:parentCm authorId="1" idx="1"/>
-        </p15:threadingInfo>
-      </p:ext>
-    </p:extLst>
-  </p:cm>
-</p:cmLst>
-</file>
-
-<file path=ppt/comments/comment3.xml><?xml version="1.0" encoding="utf-8"?>
-<p:cmLst xmlns:a="http://schemas.openxmlformats.org/drawingml/2006/main" xmlns:r="http://schemas.openxmlformats.org/officeDocument/2006/relationships" xmlns:p="http://schemas.openxmlformats.org/presentationml/2006/main">
-  <p:cm authorId="1" dt="2021-01-03T20:59:01.215" idx="4">
-    <p:pos x="10" y="10"/>
-    <p:text>To be changed for 2020 update</p:text>
-    <p:extLst>
-      <p:ext uri="{C676402C-5697-4E1C-873F-D02D1690AC5C}">
-        <p15:threadingInfo xmlns:p15="http://schemas.microsoft.com/office/powerpoint/2012/main" timeZoneBias="-60"/>
-      </p:ext>
-    </p:extLst>
-  </p:cm>
-  <p:cm authorId="1" dt="2021-01-03T21:03:57.328" idx="7">
-    <p:pos x="10" y="146"/>
-    <p:text>split and reworded</p:text>
-    <p:extLst>
-      <p:ext uri="{C676402C-5697-4E1C-873F-D02D1690AC5C}">
-        <p15:threadingInfo xmlns:p15="http://schemas.microsoft.com/office/powerpoint/2012/main" timeZoneBias="-60">
-          <p15:parentCm authorId="1" idx="4"/>
-        </p15:threadingInfo>
-      </p:ext>
-    </p:extLst>
-  </p:cm>
-</p:cmLst>
-</file>
-
-<file path=ppt/comments/comment4.xml><?xml version="1.0" encoding="utf-8"?>
-<p:cmLst xmlns:a="http://schemas.openxmlformats.org/drawingml/2006/main" xmlns:r="http://schemas.openxmlformats.org/officeDocument/2006/relationships" xmlns:p="http://schemas.openxmlformats.org/presentationml/2006/main">
-  <p:cm authorId="1" dt="2021-01-03T20:59:01.215" idx="4">
-    <p:pos x="10" y="10"/>
-    <p:text>To be changed for 2020 update</p:text>
-    <p:extLst>
-      <p:ext uri="{C676402C-5697-4E1C-873F-D02D1690AC5C}">
-        <p15:threadingInfo xmlns:p15="http://schemas.microsoft.com/office/powerpoint/2012/main" timeZoneBias="-60"/>
-      </p:ext>
-    </p:extLst>
-  </p:cm>
-  <p:cm authorId="1" dt="2021-01-03T21:03:48.450" idx="6">
-    <p:pos x="10" y="146"/>
-    <p:text>Split and reworded</p:text>
-    <p:extLst>
-      <p:ext uri="{C676402C-5697-4E1C-873F-D02D1690AC5C}">
-        <p15:threadingInfo xmlns:p15="http://schemas.microsoft.com/office/powerpoint/2012/main" timeZoneBias="-60">
-          <p15:parentCm authorId="1" idx="4"/>
-        </p15:threadingInfo>
-      </p:ext>
-    </p:extLst>
-  </p:cm>
-</p:cmLst>
 </file>
 
 <file path=ppt/ink/ink1.xml><?xml version="1.0" encoding="utf-8"?>
@@ -19959,7 +19859,7 @@
             <a:p>
               <a:pPr algn="ctr"/>
               <a:r>
-                <a:rPr lang="en-GB" sz="5000" b="1">
+                <a:rPr lang="en-GB" sz="5000" b="1" dirty="0">
                   <a:solidFill>
                     <a:schemeClr val="bg1"/>
                   </a:solidFill>
@@ -19971,7 +19871,7 @@
             <a:p>
               <a:pPr algn="ctr"/>
               <a:r>
-                <a:rPr lang="en-GB" sz="5000" b="1">
+                <a:rPr lang="en-GB" sz="5000" b="1" dirty="0">
                   <a:solidFill>
                     <a:schemeClr val="bg1"/>
                   </a:solidFill>

</xml_diff>